<commit_message>
Added powerpoint version of align icons
#35
</commit_message>
<xml_diff>
--- a/doc/Icons-PositionsLab.pptx
+++ b/doc/Icons-PositionsLab.pptx
@@ -5,10 +5,15 @@
     <p:sldMasterId id="2147483648" r:id="rId1"/>
   </p:sldMasterIdLst>
   <p:notesMasterIdLst>
-    <p:notesMasterId r:id="rId3"/>
+    <p:notesMasterId r:id="rId8"/>
   </p:notesMasterIdLst>
   <p:sldIdLst>
     <p:sldId id="269" r:id="rId2"/>
+    <p:sldId id="271" r:id="rId3"/>
+    <p:sldId id="270" r:id="rId4"/>
+    <p:sldId id="272" r:id="rId5"/>
+    <p:sldId id="273" r:id="rId6"/>
+    <p:sldId id="274" r:id="rId7"/>
   </p:sldIdLst>
   <p:sldSz cx="9144000" cy="6858000" type="screen4x3"/>
   <p:notesSz cx="6858000" cy="9144000"/>
@@ -208,7 +213,7 @@
           <a:p>
             <a:fld id="{6699ACB9-486C-4D62-A3A7-AF98E13EFDA3}" type="datetimeFigureOut">
               <a:rPr lang="en-US" smtClean="0"/>
-              <a:t>2/25/2016</a:t>
+              <a:t>3/23/2016</a:t>
             </a:fld>
             <a:endParaRPr lang="en-US"/>
           </a:p>
@@ -272,38 +277,37 @@
           <a:p>
             <a:pPr lvl="0"/>
             <a:r>
-              <a:rPr lang="en-US" smtClean="0"/>
+              <a:rPr lang="en-US"/>
               <a:t>Click to edit Master text styles</a:t>
             </a:r>
           </a:p>
           <a:p>
             <a:pPr lvl="1"/>
             <a:r>
-              <a:rPr lang="en-US" smtClean="0"/>
+              <a:rPr lang="en-US"/>
               <a:t>Second level</a:t>
             </a:r>
           </a:p>
           <a:p>
             <a:pPr lvl="2"/>
             <a:r>
-              <a:rPr lang="en-US" smtClean="0"/>
+              <a:rPr lang="en-US"/>
               <a:t>Third level</a:t>
             </a:r>
           </a:p>
           <a:p>
             <a:pPr lvl="3"/>
             <a:r>
-              <a:rPr lang="en-US" smtClean="0"/>
+              <a:rPr lang="en-US"/>
               <a:t>Fourth level</a:t>
             </a:r>
           </a:p>
           <a:p>
             <a:pPr lvl="4"/>
             <a:r>
-              <a:rPr lang="en-US" smtClean="0"/>
+              <a:rPr lang="en-US"/>
               <a:t>Fifth level</a:t>
             </a:r>
-            <a:endParaRPr lang="en-US"/>
           </a:p>
         </p:txBody>
       </p:sp>
@@ -514,10 +518,9 @@
           <a:lstStyle/>
           <a:p>
             <a:r>
-              <a:rPr lang="en-US" smtClean="0"/>
+              <a:rPr lang="en-US"/>
               <a:t>Click to edit Master title style</a:t>
             </a:r>
-            <a:endParaRPr lang="en-US"/>
           </a:p>
         </p:txBody>
       </p:sp>
@@ -633,10 +636,9 @@
           </a:lstStyle>
           <a:p>
             <a:r>
-              <a:rPr lang="en-US" smtClean="0"/>
+              <a:rPr lang="en-US"/>
               <a:t>Click to edit Master subtitle style</a:t>
             </a:r>
-            <a:endParaRPr lang="en-US"/>
           </a:p>
         </p:txBody>
       </p:sp>
@@ -658,7 +660,7 @@
             <a:fld id="{1D8BD707-D9CF-40AE-B4C6-C98DA3205C09}" type="datetimeFigureOut">
               <a:rPr lang="en-US" smtClean="0"/>
               <a:pPr/>
-              <a:t>2/25/2016</a:t>
+              <a:t>3/23/2016</a:t>
             </a:fld>
             <a:endParaRPr lang="en-US"/>
           </a:p>
@@ -748,10 +750,9 @@
           <a:lstStyle/>
           <a:p>
             <a:r>
-              <a:rPr lang="en-US" smtClean="0"/>
+              <a:rPr lang="en-US"/>
               <a:t>Click to edit Master title style</a:t>
             </a:r>
-            <a:endParaRPr lang="en-US"/>
           </a:p>
         </p:txBody>
       </p:sp>
@@ -772,38 +773,37 @@
           <a:p>
             <a:pPr lvl="0"/>
             <a:r>
-              <a:rPr lang="en-US" smtClean="0"/>
+              <a:rPr lang="en-US"/>
               <a:t>Click to edit Master text styles</a:t>
             </a:r>
           </a:p>
           <a:p>
             <a:pPr lvl="1"/>
             <a:r>
-              <a:rPr lang="en-US" smtClean="0"/>
+              <a:rPr lang="en-US"/>
               <a:t>Second level</a:t>
             </a:r>
           </a:p>
           <a:p>
             <a:pPr lvl="2"/>
             <a:r>
-              <a:rPr lang="en-US" smtClean="0"/>
+              <a:rPr lang="en-US"/>
               <a:t>Third level</a:t>
             </a:r>
           </a:p>
           <a:p>
             <a:pPr lvl="3"/>
             <a:r>
-              <a:rPr lang="en-US" smtClean="0"/>
+              <a:rPr lang="en-US"/>
               <a:t>Fourth level</a:t>
             </a:r>
           </a:p>
           <a:p>
             <a:pPr lvl="4"/>
             <a:r>
-              <a:rPr lang="en-US" smtClean="0"/>
+              <a:rPr lang="en-US"/>
               <a:t>Fifth level</a:t>
             </a:r>
-            <a:endParaRPr lang="en-US"/>
           </a:p>
         </p:txBody>
       </p:sp>
@@ -825,7 +825,7 @@
             <a:fld id="{1D8BD707-D9CF-40AE-B4C6-C98DA3205C09}" type="datetimeFigureOut">
               <a:rPr lang="en-US" smtClean="0"/>
               <a:pPr/>
-              <a:t>2/25/2016</a:t>
+              <a:t>3/23/2016</a:t>
             </a:fld>
             <a:endParaRPr lang="en-US"/>
           </a:p>
@@ -920,10 +920,9 @@
           <a:lstStyle/>
           <a:p>
             <a:r>
-              <a:rPr lang="en-US" smtClean="0"/>
+              <a:rPr lang="en-US"/>
               <a:t>Click to edit Master title style</a:t>
             </a:r>
-            <a:endParaRPr lang="en-US"/>
           </a:p>
         </p:txBody>
       </p:sp>
@@ -949,38 +948,37 @@
           <a:p>
             <a:pPr lvl="0"/>
             <a:r>
-              <a:rPr lang="en-US" smtClean="0"/>
+              <a:rPr lang="en-US"/>
               <a:t>Click to edit Master text styles</a:t>
             </a:r>
           </a:p>
           <a:p>
             <a:pPr lvl="1"/>
             <a:r>
-              <a:rPr lang="en-US" smtClean="0"/>
+              <a:rPr lang="en-US"/>
               <a:t>Second level</a:t>
             </a:r>
           </a:p>
           <a:p>
             <a:pPr lvl="2"/>
             <a:r>
-              <a:rPr lang="en-US" smtClean="0"/>
+              <a:rPr lang="en-US"/>
               <a:t>Third level</a:t>
             </a:r>
           </a:p>
           <a:p>
             <a:pPr lvl="3"/>
             <a:r>
-              <a:rPr lang="en-US" smtClean="0"/>
+              <a:rPr lang="en-US"/>
               <a:t>Fourth level</a:t>
             </a:r>
           </a:p>
           <a:p>
             <a:pPr lvl="4"/>
             <a:r>
-              <a:rPr lang="en-US" smtClean="0"/>
+              <a:rPr lang="en-US"/>
               <a:t>Fifth level</a:t>
             </a:r>
-            <a:endParaRPr lang="en-US"/>
           </a:p>
         </p:txBody>
       </p:sp>
@@ -1002,7 +1000,7 @@
             <a:fld id="{1D8BD707-D9CF-40AE-B4C6-C98DA3205C09}" type="datetimeFigureOut">
               <a:rPr lang="en-US" smtClean="0"/>
               <a:pPr/>
-              <a:t>2/25/2016</a:t>
+              <a:t>3/23/2016</a:t>
             </a:fld>
             <a:endParaRPr lang="en-US"/>
           </a:p>
@@ -1092,10 +1090,9 @@
           <a:lstStyle/>
           <a:p>
             <a:r>
-              <a:rPr lang="en-US" smtClean="0"/>
+              <a:rPr lang="en-US"/>
               <a:t>Click to edit Master title style</a:t>
             </a:r>
-            <a:endParaRPr lang="en-US"/>
           </a:p>
         </p:txBody>
       </p:sp>
@@ -1116,38 +1113,37 @@
           <a:p>
             <a:pPr lvl="0"/>
             <a:r>
-              <a:rPr lang="en-US" smtClean="0"/>
+              <a:rPr lang="en-US"/>
               <a:t>Click to edit Master text styles</a:t>
             </a:r>
           </a:p>
           <a:p>
             <a:pPr lvl="1"/>
             <a:r>
-              <a:rPr lang="en-US" smtClean="0"/>
+              <a:rPr lang="en-US"/>
               <a:t>Second level</a:t>
             </a:r>
           </a:p>
           <a:p>
             <a:pPr lvl="2"/>
             <a:r>
-              <a:rPr lang="en-US" smtClean="0"/>
+              <a:rPr lang="en-US"/>
               <a:t>Third level</a:t>
             </a:r>
           </a:p>
           <a:p>
             <a:pPr lvl="3"/>
             <a:r>
-              <a:rPr lang="en-US" smtClean="0"/>
+              <a:rPr lang="en-US"/>
               <a:t>Fourth level</a:t>
             </a:r>
           </a:p>
           <a:p>
             <a:pPr lvl="4"/>
             <a:r>
-              <a:rPr lang="en-US" smtClean="0"/>
+              <a:rPr lang="en-US"/>
               <a:t>Fifth level</a:t>
             </a:r>
-            <a:endParaRPr lang="en-US"/>
           </a:p>
         </p:txBody>
       </p:sp>
@@ -1169,7 +1165,7 @@
             <a:fld id="{1D8BD707-D9CF-40AE-B4C6-C98DA3205C09}" type="datetimeFigureOut">
               <a:rPr lang="en-US" smtClean="0"/>
               <a:pPr/>
-              <a:t>2/25/2016</a:t>
+              <a:t>3/23/2016</a:t>
             </a:fld>
             <a:endParaRPr lang="en-US"/>
           </a:p>
@@ -1268,10 +1264,9 @@
           </a:lstStyle>
           <a:p>
             <a:r>
-              <a:rPr lang="en-US" smtClean="0"/>
+              <a:rPr lang="en-US"/>
               <a:t>Click to edit Master title style</a:t>
             </a:r>
-            <a:endParaRPr lang="en-US"/>
           </a:p>
         </p:txBody>
       </p:sp>
@@ -1388,7 +1383,7 @@
           <a:p>
             <a:pPr lvl="0"/>
             <a:r>
-              <a:rPr lang="en-US" smtClean="0"/>
+              <a:rPr lang="en-US"/>
               <a:t>Click to edit Master text styles</a:t>
             </a:r>
           </a:p>
@@ -1412,7 +1407,7 @@
             <a:fld id="{1D8BD707-D9CF-40AE-B4C6-C98DA3205C09}" type="datetimeFigureOut">
               <a:rPr lang="en-US" smtClean="0"/>
               <a:pPr/>
-              <a:t>2/25/2016</a:t>
+              <a:t>3/23/2016</a:t>
             </a:fld>
             <a:endParaRPr lang="en-US"/>
           </a:p>
@@ -1502,10 +1497,9 @@
           <a:lstStyle/>
           <a:p>
             <a:r>
-              <a:rPr lang="en-US" smtClean="0"/>
+              <a:rPr lang="en-US"/>
               <a:t>Click to edit Master title style</a:t>
             </a:r>
-            <a:endParaRPr lang="en-US"/>
           </a:p>
         </p:txBody>
       </p:sp>
@@ -1559,38 +1553,37 @@
           <a:p>
             <a:pPr lvl="0"/>
             <a:r>
-              <a:rPr lang="en-US" smtClean="0"/>
+              <a:rPr lang="en-US"/>
               <a:t>Click to edit Master text styles</a:t>
             </a:r>
           </a:p>
           <a:p>
             <a:pPr lvl="1"/>
             <a:r>
-              <a:rPr lang="en-US" smtClean="0"/>
+              <a:rPr lang="en-US"/>
               <a:t>Second level</a:t>
             </a:r>
           </a:p>
           <a:p>
             <a:pPr lvl="2"/>
             <a:r>
-              <a:rPr lang="en-US" smtClean="0"/>
+              <a:rPr lang="en-US"/>
               <a:t>Third level</a:t>
             </a:r>
           </a:p>
           <a:p>
             <a:pPr lvl="3"/>
             <a:r>
-              <a:rPr lang="en-US" smtClean="0"/>
+              <a:rPr lang="en-US"/>
               <a:t>Fourth level</a:t>
             </a:r>
           </a:p>
           <a:p>
             <a:pPr lvl="4"/>
             <a:r>
-              <a:rPr lang="en-US" smtClean="0"/>
+              <a:rPr lang="en-US"/>
               <a:t>Fifth level</a:t>
             </a:r>
-            <a:endParaRPr lang="en-US"/>
           </a:p>
         </p:txBody>
       </p:sp>
@@ -1644,38 +1637,37 @@
           <a:p>
             <a:pPr lvl="0"/>
             <a:r>
-              <a:rPr lang="en-US" smtClean="0"/>
+              <a:rPr lang="en-US"/>
               <a:t>Click to edit Master text styles</a:t>
             </a:r>
           </a:p>
           <a:p>
             <a:pPr lvl="1"/>
             <a:r>
-              <a:rPr lang="en-US" smtClean="0"/>
+              <a:rPr lang="en-US"/>
               <a:t>Second level</a:t>
             </a:r>
           </a:p>
           <a:p>
             <a:pPr lvl="2"/>
             <a:r>
-              <a:rPr lang="en-US" smtClean="0"/>
+              <a:rPr lang="en-US"/>
               <a:t>Third level</a:t>
             </a:r>
           </a:p>
           <a:p>
             <a:pPr lvl="3"/>
             <a:r>
-              <a:rPr lang="en-US" smtClean="0"/>
+              <a:rPr lang="en-US"/>
               <a:t>Fourth level</a:t>
             </a:r>
           </a:p>
           <a:p>
             <a:pPr lvl="4"/>
             <a:r>
-              <a:rPr lang="en-US" smtClean="0"/>
+              <a:rPr lang="en-US"/>
               <a:t>Fifth level</a:t>
             </a:r>
-            <a:endParaRPr lang="en-US"/>
           </a:p>
         </p:txBody>
       </p:sp>
@@ -1697,7 +1689,7 @@
             <a:fld id="{1D8BD707-D9CF-40AE-B4C6-C98DA3205C09}" type="datetimeFigureOut">
               <a:rPr lang="en-US" smtClean="0"/>
               <a:pPr/>
-              <a:t>2/25/2016</a:t>
+              <a:t>3/23/2016</a:t>
             </a:fld>
             <a:endParaRPr lang="en-US"/>
           </a:p>
@@ -1791,10 +1783,9 @@
           </a:lstStyle>
           <a:p>
             <a:r>
-              <a:rPr lang="en-US" smtClean="0"/>
+              <a:rPr lang="en-US"/>
               <a:t>Click to edit Master title style</a:t>
             </a:r>
-            <a:endParaRPr lang="en-US"/>
           </a:p>
         </p:txBody>
       </p:sp>
@@ -1857,7 +1848,7 @@
           <a:p>
             <a:pPr lvl="0"/>
             <a:r>
-              <a:rPr lang="en-US" smtClean="0"/>
+              <a:rPr lang="en-US"/>
               <a:t>Click to edit Master text styles</a:t>
             </a:r>
           </a:p>
@@ -1913,38 +1904,37 @@
           <a:p>
             <a:pPr lvl="0"/>
             <a:r>
-              <a:rPr lang="en-US" smtClean="0"/>
+              <a:rPr lang="en-US"/>
               <a:t>Click to edit Master text styles</a:t>
             </a:r>
           </a:p>
           <a:p>
             <a:pPr lvl="1"/>
             <a:r>
-              <a:rPr lang="en-US" smtClean="0"/>
+              <a:rPr lang="en-US"/>
               <a:t>Second level</a:t>
             </a:r>
           </a:p>
           <a:p>
             <a:pPr lvl="2"/>
             <a:r>
-              <a:rPr lang="en-US" smtClean="0"/>
+              <a:rPr lang="en-US"/>
               <a:t>Third level</a:t>
             </a:r>
           </a:p>
           <a:p>
             <a:pPr lvl="3"/>
             <a:r>
-              <a:rPr lang="en-US" smtClean="0"/>
+              <a:rPr lang="en-US"/>
               <a:t>Fourth level</a:t>
             </a:r>
           </a:p>
           <a:p>
             <a:pPr lvl="4"/>
             <a:r>
-              <a:rPr lang="en-US" smtClean="0"/>
+              <a:rPr lang="en-US"/>
               <a:t>Fifth level</a:t>
             </a:r>
-            <a:endParaRPr lang="en-US"/>
           </a:p>
         </p:txBody>
       </p:sp>
@@ -2007,7 +1997,7 @@
           <a:p>
             <a:pPr lvl="0"/>
             <a:r>
-              <a:rPr lang="en-US" smtClean="0"/>
+              <a:rPr lang="en-US"/>
               <a:t>Click to edit Master text styles</a:t>
             </a:r>
           </a:p>
@@ -2063,38 +2053,37 @@
           <a:p>
             <a:pPr lvl="0"/>
             <a:r>
-              <a:rPr lang="en-US" smtClean="0"/>
+              <a:rPr lang="en-US"/>
               <a:t>Click to edit Master text styles</a:t>
             </a:r>
           </a:p>
           <a:p>
             <a:pPr lvl="1"/>
             <a:r>
-              <a:rPr lang="en-US" smtClean="0"/>
+              <a:rPr lang="en-US"/>
               <a:t>Second level</a:t>
             </a:r>
           </a:p>
           <a:p>
             <a:pPr lvl="2"/>
             <a:r>
-              <a:rPr lang="en-US" smtClean="0"/>
+              <a:rPr lang="en-US"/>
               <a:t>Third level</a:t>
             </a:r>
           </a:p>
           <a:p>
             <a:pPr lvl="3"/>
             <a:r>
-              <a:rPr lang="en-US" smtClean="0"/>
+              <a:rPr lang="en-US"/>
               <a:t>Fourth level</a:t>
             </a:r>
           </a:p>
           <a:p>
             <a:pPr lvl="4"/>
             <a:r>
-              <a:rPr lang="en-US" smtClean="0"/>
+              <a:rPr lang="en-US"/>
               <a:t>Fifth level</a:t>
             </a:r>
-            <a:endParaRPr lang="en-US"/>
           </a:p>
         </p:txBody>
       </p:sp>
@@ -2116,7 +2105,7 @@
             <a:fld id="{1D8BD707-D9CF-40AE-B4C6-C98DA3205C09}" type="datetimeFigureOut">
               <a:rPr lang="en-US" smtClean="0"/>
               <a:pPr/>
-              <a:t>2/25/2016</a:t>
+              <a:t>3/23/2016</a:t>
             </a:fld>
             <a:endParaRPr lang="en-US"/>
           </a:p>
@@ -2206,10 +2195,9 @@
           <a:lstStyle/>
           <a:p>
             <a:r>
-              <a:rPr lang="en-US" smtClean="0"/>
+              <a:rPr lang="en-US"/>
               <a:t>Click to edit Master title style</a:t>
             </a:r>
-            <a:endParaRPr lang="en-US"/>
           </a:p>
         </p:txBody>
       </p:sp>
@@ -2231,7 +2219,7 @@
             <a:fld id="{1D8BD707-D9CF-40AE-B4C6-C98DA3205C09}" type="datetimeFigureOut">
               <a:rPr lang="en-US" smtClean="0"/>
               <a:pPr/>
-              <a:t>2/25/2016</a:t>
+              <a:t>3/23/2016</a:t>
             </a:fld>
             <a:endParaRPr lang="en-US"/>
           </a:p>
@@ -2323,7 +2311,7 @@
             <a:fld id="{1D8BD707-D9CF-40AE-B4C6-C98DA3205C09}" type="datetimeFigureOut">
               <a:rPr lang="en-US" smtClean="0"/>
               <a:pPr/>
-              <a:t>2/25/2016</a:t>
+              <a:t>3/23/2016</a:t>
             </a:fld>
             <a:endParaRPr lang="en-US"/>
           </a:p>
@@ -2422,10 +2410,9 @@
           </a:lstStyle>
           <a:p>
             <a:r>
-              <a:rPr lang="en-US" smtClean="0"/>
+              <a:rPr lang="en-US"/>
               <a:t>Click to edit Master title style</a:t>
             </a:r>
-            <a:endParaRPr lang="en-US"/>
           </a:p>
         </p:txBody>
       </p:sp>
@@ -2479,38 +2466,37 @@
           <a:p>
             <a:pPr lvl="0"/>
             <a:r>
-              <a:rPr lang="en-US" smtClean="0"/>
+              <a:rPr lang="en-US"/>
               <a:t>Click to edit Master text styles</a:t>
             </a:r>
           </a:p>
           <a:p>
             <a:pPr lvl="1"/>
             <a:r>
-              <a:rPr lang="en-US" smtClean="0"/>
+              <a:rPr lang="en-US"/>
               <a:t>Second level</a:t>
             </a:r>
           </a:p>
           <a:p>
             <a:pPr lvl="2"/>
             <a:r>
-              <a:rPr lang="en-US" smtClean="0"/>
+              <a:rPr lang="en-US"/>
               <a:t>Third level</a:t>
             </a:r>
           </a:p>
           <a:p>
             <a:pPr lvl="3"/>
             <a:r>
-              <a:rPr lang="en-US" smtClean="0"/>
+              <a:rPr lang="en-US"/>
               <a:t>Fourth level</a:t>
             </a:r>
           </a:p>
           <a:p>
             <a:pPr lvl="4"/>
             <a:r>
-              <a:rPr lang="en-US" smtClean="0"/>
+              <a:rPr lang="en-US"/>
               <a:t>Fifth level</a:t>
             </a:r>
-            <a:endParaRPr lang="en-US"/>
           </a:p>
         </p:txBody>
       </p:sp>
@@ -2573,7 +2559,7 @@
           <a:p>
             <a:pPr lvl="0"/>
             <a:r>
-              <a:rPr lang="en-US" smtClean="0"/>
+              <a:rPr lang="en-US"/>
               <a:t>Click to edit Master text styles</a:t>
             </a:r>
           </a:p>
@@ -2597,7 +2583,7 @@
             <a:fld id="{1D8BD707-D9CF-40AE-B4C6-C98DA3205C09}" type="datetimeFigureOut">
               <a:rPr lang="en-US" smtClean="0"/>
               <a:pPr/>
-              <a:t>2/25/2016</a:t>
+              <a:t>3/23/2016</a:t>
             </a:fld>
             <a:endParaRPr lang="en-US"/>
           </a:p>
@@ -2696,10 +2682,9 @@
           </a:lstStyle>
           <a:p>
             <a:r>
-              <a:rPr lang="en-US" smtClean="0"/>
+              <a:rPr lang="en-US"/>
               <a:t>Click to edit Master title style</a:t>
             </a:r>
-            <a:endParaRPr lang="en-US"/>
           </a:p>
         </p:txBody>
       </p:sp>
@@ -2823,7 +2808,7 @@
           <a:p>
             <a:pPr lvl="0"/>
             <a:r>
-              <a:rPr lang="en-US" smtClean="0"/>
+              <a:rPr lang="en-US"/>
               <a:t>Click to edit Master text styles</a:t>
             </a:r>
           </a:p>
@@ -2847,7 +2832,7 @@
             <a:fld id="{1D8BD707-D9CF-40AE-B4C6-C98DA3205C09}" type="datetimeFigureOut">
               <a:rPr lang="en-US" smtClean="0"/>
               <a:pPr/>
-              <a:t>2/25/2016</a:t>
+              <a:t>3/23/2016</a:t>
             </a:fld>
             <a:endParaRPr lang="en-US"/>
           </a:p>
@@ -2952,10 +2937,9 @@
           <a:lstStyle/>
           <a:p>
             <a:r>
-              <a:rPr lang="en-US" smtClean="0"/>
+              <a:rPr lang="en-US"/>
               <a:t>Click to edit Master title style</a:t>
             </a:r>
-            <a:endParaRPr lang="en-US"/>
           </a:p>
         </p:txBody>
       </p:sp>
@@ -2986,38 +2970,37 @@
           <a:p>
             <a:pPr lvl="0"/>
             <a:r>
-              <a:rPr lang="en-US" smtClean="0"/>
+              <a:rPr lang="en-US"/>
               <a:t>Click to edit Master text styles</a:t>
             </a:r>
           </a:p>
           <a:p>
             <a:pPr lvl="1"/>
             <a:r>
-              <a:rPr lang="en-US" smtClean="0"/>
+              <a:rPr lang="en-US"/>
               <a:t>Second level</a:t>
             </a:r>
           </a:p>
           <a:p>
             <a:pPr lvl="2"/>
             <a:r>
-              <a:rPr lang="en-US" smtClean="0"/>
+              <a:rPr lang="en-US"/>
               <a:t>Third level</a:t>
             </a:r>
           </a:p>
           <a:p>
             <a:pPr lvl="3"/>
             <a:r>
-              <a:rPr lang="en-US" smtClean="0"/>
+              <a:rPr lang="en-US"/>
               <a:t>Fourth level</a:t>
             </a:r>
           </a:p>
           <a:p>
             <a:pPr lvl="4"/>
             <a:r>
-              <a:rPr lang="en-US" smtClean="0"/>
+              <a:rPr lang="en-US"/>
               <a:t>Fifth level</a:t>
             </a:r>
-            <a:endParaRPr lang="en-US"/>
           </a:p>
         </p:txBody>
       </p:sp>
@@ -3057,7 +3040,7 @@
             <a:fld id="{1D8BD707-D9CF-40AE-B4C6-C98DA3205C09}" type="datetimeFigureOut">
               <a:rPr lang="en-US" smtClean="0"/>
               <a:pPr/>
-              <a:t>2/25/2016</a:t>
+              <a:t>3/23/2016</a:t>
             </a:fld>
             <a:endParaRPr lang="en-US"/>
           </a:p>
@@ -3440,30 +3423,195 @@
       </p:grpSpPr>
       <p:grpSp>
         <p:nvGrpSpPr>
-          <p:cNvPr id="73" name="Group 72"/>
-          <p:cNvGrpSpPr>
-            <a:grpSpLocks/>
-          </p:cNvGrpSpPr>
+          <p:cNvPr id="3" name="Group 2"/>
+          <p:cNvGrpSpPr/>
           <p:nvPr/>
         </p:nvGrpSpPr>
         <p:grpSpPr>
           <a:xfrm>
-            <a:off x="1002575" y="1231726"/>
+            <a:off x="7638765" y="5649817"/>
             <a:ext cx="838200" cy="838200"/>
-            <a:chOff x="375266" y="5397326"/>
+            <a:chOff x="7638765" y="5649817"/>
             <a:chExt cx="838200" cy="838200"/>
           </a:xfrm>
         </p:grpSpPr>
-        <p:sp>
-          <p:nvSpPr>
-            <p:cNvPr id="74" name="Rectangle 73"/>
-            <p:cNvSpPr/>
+        <p:grpSp>
+          <p:nvGrpSpPr>
+            <p:cNvPr id="73" name="Group 72"/>
+            <p:cNvGrpSpPr>
+              <a:grpSpLocks/>
+            </p:cNvGrpSpPr>
             <p:nvPr/>
-          </p:nvSpPr>
-          <p:spPr>
+          </p:nvGrpSpPr>
+          <p:grpSpPr>
             <a:xfrm>
-              <a:off x="375266" y="5397326"/>
+              <a:off x="7638765" y="5649817"/>
               <a:ext cx="838200" cy="838200"/>
+              <a:chOff x="375266" y="5397326"/>
+              <a:chExt cx="838200" cy="838200"/>
+            </a:xfrm>
+          </p:grpSpPr>
+          <p:sp>
+            <p:nvSpPr>
+              <p:cNvPr id="74" name="Rectangle 73"/>
+              <p:cNvSpPr/>
+              <p:nvPr/>
+            </p:nvSpPr>
+            <p:spPr>
+              <a:xfrm>
+                <a:off x="375266" y="5397326"/>
+                <a:ext cx="838200" cy="838200"/>
+              </a:xfrm>
+              <a:prstGeom prst="rect">
+                <a:avLst/>
+              </a:prstGeom>
+              <a:noFill/>
+              <a:ln>
+                <a:noFill/>
+              </a:ln>
+            </p:spPr>
+            <p:style>
+              <a:lnRef idx="2">
+                <a:schemeClr val="accent1">
+                  <a:shade val="50000"/>
+                </a:schemeClr>
+              </a:lnRef>
+              <a:fillRef idx="1">
+                <a:schemeClr val="accent1"/>
+              </a:fillRef>
+              <a:effectRef idx="0">
+                <a:schemeClr val="accent1"/>
+              </a:effectRef>
+              <a:fontRef idx="minor">
+                <a:schemeClr val="lt1"/>
+              </a:fontRef>
+            </p:style>
+            <p:txBody>
+              <a:bodyPr rtlCol="0" anchor="ctr"/>
+              <a:lstStyle/>
+              <a:p>
+                <a:pPr algn="ctr"/>
+                <a:endParaRPr lang="en-SG"/>
+              </a:p>
+            </p:txBody>
+          </p:sp>
+          <p:sp>
+            <p:nvSpPr>
+              <p:cNvPr id="75" name="Rectangle 4"/>
+              <p:cNvSpPr/>
+              <p:nvPr/>
+            </p:nvSpPr>
+            <p:spPr>
+              <a:xfrm rot="16200000">
+                <a:off x="444221" y="5470529"/>
+                <a:ext cx="700291" cy="690781"/>
+              </a:xfrm>
+              <a:custGeom>
+                <a:avLst/>
+                <a:gdLst/>
+                <a:ahLst/>
+                <a:cxnLst/>
+                <a:rect l="l" t="t" r="r" b="b"/>
+                <a:pathLst>
+                  <a:path w="1752603" h="1752600">
+                    <a:moveTo>
+                      <a:pt x="533400" y="0"/>
+                    </a:moveTo>
+                    <a:lnTo>
+                      <a:pt x="533403" y="0"/>
+                    </a:lnTo>
+                    <a:lnTo>
+                      <a:pt x="1066800" y="0"/>
+                    </a:lnTo>
+                    <a:lnTo>
+                      <a:pt x="1752603" y="0"/>
+                    </a:lnTo>
+                    <a:lnTo>
+                      <a:pt x="1752603" y="1752600"/>
+                    </a:lnTo>
+                    <a:lnTo>
+                      <a:pt x="1219203" y="1752600"/>
+                    </a:lnTo>
+                    <a:lnTo>
+                      <a:pt x="533403" y="1752600"/>
+                    </a:lnTo>
+                    <a:lnTo>
+                      <a:pt x="3" y="1752600"/>
+                    </a:lnTo>
+                    <a:lnTo>
+                      <a:pt x="3" y="533430"/>
+                    </a:lnTo>
+                    <a:cubicBezTo>
+                      <a:pt x="0" y="533420"/>
+                      <a:pt x="0" y="533410"/>
+                      <a:pt x="0" y="533400"/>
+                    </a:cubicBezTo>
+                    <a:cubicBezTo>
+                      <a:pt x="0" y="238811"/>
+                      <a:pt x="238811" y="0"/>
+                      <a:pt x="533400" y="0"/>
+                    </a:cubicBezTo>
+                    <a:close/>
+                  </a:path>
+                </a:pathLst>
+              </a:custGeom>
+              <a:noFill/>
+              <a:ln w="76200" cmpd="sng">
+                <a:solidFill>
+                  <a:srgbClr val="0070C0"/>
+                </a:solidFill>
+                <a:miter lim="800000"/>
+              </a:ln>
+            </p:spPr>
+            <p:style>
+              <a:lnRef idx="2">
+                <a:schemeClr val="accent1">
+                  <a:shade val="50000"/>
+                </a:schemeClr>
+              </a:lnRef>
+              <a:fillRef idx="1">
+                <a:schemeClr val="accent1"/>
+              </a:fillRef>
+              <a:effectRef idx="0">
+                <a:schemeClr val="accent1"/>
+              </a:effectRef>
+              <a:fontRef idx="minor">
+                <a:schemeClr val="lt1"/>
+              </a:fontRef>
+            </p:style>
+            <p:txBody>
+              <a:bodyPr rtlCol="0" anchor="ctr"/>
+              <a:lstStyle/>
+              <a:p>
+                <a:pPr algn="ctr"/>
+                <a:endParaRPr lang="en-US"/>
+              </a:p>
+            </p:txBody>
+          </p:sp>
+        </p:grpSp>
+        <p:pic>
+          <p:nvPicPr>
+            <p:cNvPr id="1030" name="Picture 6"/>
+            <p:cNvPicPr>
+              <a:picLocks noChangeArrowheads="1"/>
+            </p:cNvPicPr>
+            <p:nvPr/>
+          </p:nvPicPr>
+          <p:blipFill rotWithShape="1">
+            <a:blip r:embed="rId2">
+              <a:extLst>
+                <a:ext uri="{28A0092B-C50C-407E-A947-70E740481C1C}">
+                  <a14:useLocalDpi xmlns:a14="http://schemas.microsoft.com/office/drawing/2010/main" val="0"/>
+                </a:ext>
+              </a:extLst>
+            </a:blip>
+            <a:srcRect l="28329" t="20417" r="22434" b="34414"/>
+            <a:stretch/>
+          </p:blipFill>
+          <p:spPr bwMode="auto">
+            <a:xfrm>
+              <a:off x="7783908" y="5758469"/>
+              <a:ext cx="411139" cy="387926"/>
             </a:xfrm>
             <a:prstGeom prst="rect">
               <a:avLst/>
@@ -3472,98 +3620,291 @@
             <a:ln>
               <a:noFill/>
             </a:ln>
+            <a:effectLst/>
+            <a:extLst>
+              <a:ext uri="{909E8E84-426E-40DD-AFC4-6F175D3DCCD1}">
+                <a14:hiddenFill xmlns:a14="http://schemas.microsoft.com/office/drawing/2010/main">
+                  <a:solidFill>
+                    <a:schemeClr val="accent1"/>
+                  </a:solidFill>
+                </a14:hiddenFill>
+              </a:ext>
+              <a:ext uri="{91240B29-F687-4F45-9708-019B960494DF}">
+                <a14:hiddenLine xmlns:a14="http://schemas.microsoft.com/office/drawing/2010/main" w="9525">
+                  <a:solidFill>
+                    <a:schemeClr val="tx1"/>
+                  </a:solidFill>
+                  <a:miter lim="800000"/>
+                  <a:headEnd/>
+                  <a:tailEnd/>
+                </a14:hiddenLine>
+              </a:ext>
+              <a:ext uri="{AF507438-7753-43E0-B8FC-AC1667EBCBE1}">
+                <a14:hiddenEffects xmlns:a14="http://schemas.microsoft.com/office/drawing/2010/main">
+                  <a:effectLst>
+                    <a:outerShdw dist="35921" dir="2700000" algn="ctr" rotWithShape="0">
+                      <a:schemeClr val="bg2"/>
+                    </a:outerShdw>
+                  </a:effectLst>
+                </a14:hiddenEffects>
+              </a:ext>
+            </a:extLst>
           </p:spPr>
-          <p:style>
-            <a:lnRef idx="2">
-              <a:schemeClr val="accent1">
-                <a:shade val="50000"/>
-              </a:schemeClr>
-            </a:lnRef>
-            <a:fillRef idx="1">
-              <a:schemeClr val="accent1"/>
-            </a:fillRef>
-            <a:effectRef idx="0">
-              <a:schemeClr val="accent1"/>
-            </a:effectRef>
-            <a:fontRef idx="minor">
-              <a:schemeClr val="lt1"/>
-            </a:fontRef>
-          </p:style>
-          <p:txBody>
-            <a:bodyPr rtlCol="0" anchor="ctr"/>
-            <a:lstStyle/>
-            <a:p>
-              <a:pPr algn="ctr"/>
-              <a:endParaRPr lang="en-SG"/>
-            </a:p>
-          </p:txBody>
-        </p:sp>
+        </p:pic>
+        <p:pic>
+          <p:nvPicPr>
+            <p:cNvPr id="1031" name="Picture 7"/>
+            <p:cNvPicPr>
+              <a:picLocks noChangeArrowheads="1"/>
+            </p:cNvPicPr>
+            <p:nvPr/>
+          </p:nvPicPr>
+          <p:blipFill rotWithShape="1">
+            <a:blip r:embed="rId3">
+              <a:extLst>
+                <a:ext uri="{28A0092B-C50C-407E-A947-70E740481C1C}">
+                  <a14:useLocalDpi xmlns:a14="http://schemas.microsoft.com/office/drawing/2010/main" val="0"/>
+                </a:ext>
+              </a:extLst>
+            </a:blip>
+            <a:srcRect l="28955" t="27411" r="18564" b="23920"/>
+            <a:stretch/>
+          </p:blipFill>
+          <p:spPr bwMode="auto">
+            <a:xfrm>
+              <a:off x="7907913" y="5989855"/>
+              <a:ext cx="450723" cy="406400"/>
+            </a:xfrm>
+            <a:prstGeom prst="rect">
+              <a:avLst/>
+            </a:prstGeom>
+            <a:noFill/>
+            <a:ln>
+              <a:noFill/>
+            </a:ln>
+            <a:effectLst/>
+            <a:extLst>
+              <a:ext uri="{909E8E84-426E-40DD-AFC4-6F175D3DCCD1}">
+                <a14:hiddenFill xmlns:a14="http://schemas.microsoft.com/office/drawing/2010/main">
+                  <a:solidFill>
+                    <a:schemeClr val="accent1"/>
+                  </a:solidFill>
+                </a14:hiddenFill>
+              </a:ext>
+              <a:ext uri="{91240B29-F687-4F45-9708-019B960494DF}">
+                <a14:hiddenLine xmlns:a14="http://schemas.microsoft.com/office/drawing/2010/main" w="9525">
+                  <a:solidFill>
+                    <a:schemeClr val="tx1"/>
+                  </a:solidFill>
+                  <a:miter lim="800000"/>
+                  <a:headEnd/>
+                  <a:tailEnd/>
+                </a14:hiddenLine>
+              </a:ext>
+              <a:ext uri="{AF507438-7753-43E0-B8FC-AC1667EBCBE1}">
+                <a14:hiddenEffects xmlns:a14="http://schemas.microsoft.com/office/drawing/2010/main">
+                  <a:effectLst>
+                    <a:outerShdw dist="35921" dir="2700000" algn="ctr" rotWithShape="0">
+                      <a:schemeClr val="bg2"/>
+                    </a:outerShdw>
+                  </a:effectLst>
+                </a14:hiddenEffects>
+              </a:ext>
+            </a:extLst>
+          </p:spPr>
+        </p:pic>
+      </p:grpSp>
+      <p:grpSp>
+        <p:nvGrpSpPr>
+          <p:cNvPr id="2" name="Group 1"/>
+          <p:cNvGrpSpPr/>
+          <p:nvPr/>
+        </p:nvGrpSpPr>
+        <p:grpSpPr>
+          <a:xfrm>
+            <a:off x="2577501" y="2848729"/>
+            <a:ext cx="838200" cy="856097"/>
+            <a:chOff x="2640875" y="3228975"/>
+            <a:chExt cx="838200" cy="856097"/>
+          </a:xfrm>
+        </p:grpSpPr>
+        <p:grpSp>
+          <p:nvGrpSpPr>
+            <p:cNvPr id="7" name="Group 6"/>
+            <p:cNvGrpSpPr>
+              <a:grpSpLocks/>
+            </p:cNvGrpSpPr>
+            <p:nvPr/>
+          </p:nvGrpSpPr>
+          <p:grpSpPr>
+            <a:xfrm>
+              <a:off x="2640875" y="3228975"/>
+              <a:ext cx="838200" cy="856097"/>
+              <a:chOff x="375266" y="5397326"/>
+              <a:chExt cx="838200" cy="838200"/>
+            </a:xfrm>
+          </p:grpSpPr>
+          <p:sp>
+            <p:nvSpPr>
+              <p:cNvPr id="8" name="Rectangle 7"/>
+              <p:cNvSpPr/>
+              <p:nvPr/>
+            </p:nvSpPr>
+            <p:spPr>
+              <a:xfrm>
+                <a:off x="375266" y="5397326"/>
+                <a:ext cx="838200" cy="838200"/>
+              </a:xfrm>
+              <a:prstGeom prst="rect">
+                <a:avLst/>
+              </a:prstGeom>
+              <a:noFill/>
+              <a:ln>
+                <a:noFill/>
+              </a:ln>
+            </p:spPr>
+            <p:style>
+              <a:lnRef idx="2">
+                <a:schemeClr val="accent1">
+                  <a:shade val="50000"/>
+                </a:schemeClr>
+              </a:lnRef>
+              <a:fillRef idx="1">
+                <a:schemeClr val="accent1"/>
+              </a:fillRef>
+              <a:effectRef idx="0">
+                <a:schemeClr val="accent1"/>
+              </a:effectRef>
+              <a:fontRef idx="minor">
+                <a:schemeClr val="lt1"/>
+              </a:fontRef>
+            </p:style>
+            <p:txBody>
+              <a:bodyPr rtlCol="0" anchor="ctr"/>
+              <a:lstStyle/>
+              <a:p>
+                <a:pPr algn="ctr"/>
+                <a:endParaRPr lang="en-SG"/>
+              </a:p>
+            </p:txBody>
+          </p:sp>
+          <p:sp>
+            <p:nvSpPr>
+              <p:cNvPr id="9" name="Rectangle 4"/>
+              <p:cNvSpPr/>
+              <p:nvPr/>
+            </p:nvSpPr>
+            <p:spPr>
+              <a:xfrm rot="16200000">
+                <a:off x="444221" y="5470529"/>
+                <a:ext cx="700291" cy="690781"/>
+              </a:xfrm>
+              <a:custGeom>
+                <a:avLst/>
+                <a:gdLst/>
+                <a:ahLst/>
+                <a:cxnLst/>
+                <a:rect l="l" t="t" r="r" b="b"/>
+                <a:pathLst>
+                  <a:path w="1752603" h="1752600">
+                    <a:moveTo>
+                      <a:pt x="533400" y="0"/>
+                    </a:moveTo>
+                    <a:lnTo>
+                      <a:pt x="533403" y="0"/>
+                    </a:lnTo>
+                    <a:lnTo>
+                      <a:pt x="1066800" y="0"/>
+                    </a:lnTo>
+                    <a:lnTo>
+                      <a:pt x="1752603" y="0"/>
+                    </a:lnTo>
+                    <a:lnTo>
+                      <a:pt x="1752603" y="1752600"/>
+                    </a:lnTo>
+                    <a:lnTo>
+                      <a:pt x="1219203" y="1752600"/>
+                    </a:lnTo>
+                    <a:lnTo>
+                      <a:pt x="533403" y="1752600"/>
+                    </a:lnTo>
+                    <a:lnTo>
+                      <a:pt x="3" y="1752600"/>
+                    </a:lnTo>
+                    <a:lnTo>
+                      <a:pt x="3" y="533430"/>
+                    </a:lnTo>
+                    <a:cubicBezTo>
+                      <a:pt x="0" y="533420"/>
+                      <a:pt x="0" y="533410"/>
+                      <a:pt x="0" y="533400"/>
+                    </a:cubicBezTo>
+                    <a:cubicBezTo>
+                      <a:pt x="0" y="238811"/>
+                      <a:pt x="238811" y="0"/>
+                      <a:pt x="533400" y="0"/>
+                    </a:cubicBezTo>
+                    <a:close/>
+                  </a:path>
+                </a:pathLst>
+              </a:custGeom>
+              <a:noFill/>
+              <a:ln w="76200" cmpd="sng">
+                <a:solidFill>
+                  <a:srgbClr val="0070C0"/>
+                </a:solidFill>
+                <a:miter lim="800000"/>
+              </a:ln>
+            </p:spPr>
+            <p:style>
+              <a:lnRef idx="2">
+                <a:schemeClr val="accent1">
+                  <a:shade val="50000"/>
+                </a:schemeClr>
+              </a:lnRef>
+              <a:fillRef idx="1">
+                <a:schemeClr val="accent1"/>
+              </a:fillRef>
+              <a:effectRef idx="0">
+                <a:schemeClr val="accent1"/>
+              </a:effectRef>
+              <a:fontRef idx="minor">
+                <a:schemeClr val="lt1"/>
+              </a:fontRef>
+            </p:style>
+            <p:txBody>
+              <a:bodyPr rtlCol="0" anchor="ctr"/>
+              <a:lstStyle/>
+              <a:p>
+                <a:pPr algn="ctr"/>
+                <a:endParaRPr lang="en-US"/>
+              </a:p>
+            </p:txBody>
+          </p:sp>
+        </p:grpSp>
         <p:sp>
           <p:nvSpPr>
-            <p:cNvPr id="75" name="Rectangle 4"/>
-            <p:cNvSpPr/>
+            <p:cNvPr id="10" name="Rectangle 7"/>
+            <p:cNvSpPr>
+              <a:spLocks/>
+            </p:cNvSpPr>
             <p:nvPr/>
           </p:nvSpPr>
           <p:spPr>
-            <a:xfrm rot="16200000">
-              <a:off x="444221" y="5470529"/>
-              <a:ext cx="700291" cy="690781"/>
+            <a:xfrm>
+              <a:off x="2827025" y="3438926"/>
+              <a:ext cx="209130" cy="215499"/>
             </a:xfrm>
-            <a:custGeom>
+            <a:prstGeom prst="rect">
               <a:avLst/>
-              <a:gdLst/>
-              <a:ahLst/>
-              <a:cxnLst/>
-              <a:rect l="l" t="t" r="r" b="b"/>
-              <a:pathLst>
-                <a:path w="1752603" h="1752600">
-                  <a:moveTo>
-                    <a:pt x="533400" y="0"/>
-                  </a:moveTo>
-                  <a:lnTo>
-                    <a:pt x="533403" y="0"/>
-                  </a:lnTo>
-                  <a:lnTo>
-                    <a:pt x="1066800" y="0"/>
-                  </a:lnTo>
-                  <a:lnTo>
-                    <a:pt x="1752603" y="0"/>
-                  </a:lnTo>
-                  <a:lnTo>
-                    <a:pt x="1752603" y="1752600"/>
-                  </a:lnTo>
-                  <a:lnTo>
-                    <a:pt x="1219203" y="1752600"/>
-                  </a:lnTo>
-                  <a:lnTo>
-                    <a:pt x="533403" y="1752600"/>
-                  </a:lnTo>
-                  <a:lnTo>
-                    <a:pt x="3" y="1752600"/>
-                  </a:lnTo>
-                  <a:lnTo>
-                    <a:pt x="3" y="533430"/>
-                  </a:lnTo>
-                  <a:cubicBezTo>
-                    <a:pt x="0" y="533420"/>
-                    <a:pt x="0" y="533410"/>
-                    <a:pt x="0" y="533400"/>
-                  </a:cubicBezTo>
-                  <a:cubicBezTo>
-                    <a:pt x="0" y="238811"/>
-                    <a:pt x="238811" y="0"/>
-                    <a:pt x="533400" y="0"/>
-                  </a:cubicBezTo>
-                  <a:close/>
-                </a:path>
-              </a:pathLst>
-            </a:custGeom>
-            <a:noFill/>
-            <a:ln w="76200" cmpd="sng">
+            </a:prstGeom>
+            <a:solidFill>
+              <a:srgbClr val="E46B09"/>
+            </a:solidFill>
+            <a:ln>
               <a:solidFill>
-                <a:srgbClr val="0070C0"/>
+                <a:srgbClr val="E46B09"/>
               </a:solidFill>
-              <a:miter lim="800000"/>
             </a:ln>
           </p:spPr>
           <p:style>
@@ -3591,257 +3932,29 @@
             </a:p>
           </p:txBody>
         </p:sp>
-      </p:grpSp>
-      <p:pic>
-        <p:nvPicPr>
-          <p:cNvPr id="1030" name="Picture 6"/>
-          <p:cNvPicPr>
-            <a:picLocks noChangeArrowheads="1"/>
-          </p:cNvPicPr>
-          <p:nvPr/>
-        </p:nvPicPr>
-        <p:blipFill rotWithShape="1">
-          <a:blip r:embed="rId2">
-            <a:extLst>
-              <a:ext uri="{28A0092B-C50C-407E-A947-70E740481C1C}">
-                <a14:useLocalDpi xmlns:a14="http://schemas.microsoft.com/office/drawing/2010/main" val="0"/>
-              </a:ext>
-            </a:extLst>
-          </a:blip>
-          <a:srcRect l="28329" t="20417" r="22434" b="34414"/>
-          <a:stretch/>
-        </p:blipFill>
-        <p:spPr bwMode="auto">
-          <a:xfrm>
-            <a:off x="1147718" y="1340378"/>
-            <a:ext cx="411139" cy="387926"/>
-          </a:xfrm>
-          <a:prstGeom prst="rect">
-            <a:avLst/>
-          </a:prstGeom>
-          <a:noFill/>
-          <a:ln>
-            <a:noFill/>
-          </a:ln>
-          <a:effectLst/>
-          <a:extLst>
-            <a:ext uri="{909E8E84-426E-40DD-AFC4-6F175D3DCCD1}">
-              <a14:hiddenFill xmlns:a14="http://schemas.microsoft.com/office/drawing/2010/main">
-                <a:solidFill>
-                  <a:schemeClr val="accent1"/>
-                </a:solidFill>
-              </a14:hiddenFill>
-            </a:ext>
-            <a:ext uri="{91240B29-F687-4F45-9708-019B960494DF}">
-              <a14:hiddenLine xmlns:a14="http://schemas.microsoft.com/office/drawing/2010/main" w="9525">
-                <a:solidFill>
-                  <a:schemeClr val="tx1"/>
-                </a:solidFill>
-                <a:miter lim="800000"/>
-                <a:headEnd/>
-                <a:tailEnd/>
-              </a14:hiddenLine>
-            </a:ext>
-            <a:ext uri="{AF507438-7753-43E0-B8FC-AC1667EBCBE1}">
-              <a14:hiddenEffects xmlns:a14="http://schemas.microsoft.com/office/drawing/2010/main">
-                <a:effectLst>
-                  <a:outerShdw dist="35921" dir="2700000" algn="ctr" rotWithShape="0">
-                    <a:schemeClr val="bg2"/>
-                  </a:outerShdw>
-                </a:effectLst>
-              </a14:hiddenEffects>
-            </a:ext>
-          </a:extLst>
-        </p:spPr>
-      </p:pic>
-      <p:pic>
-        <p:nvPicPr>
-          <p:cNvPr id="1031" name="Picture 7"/>
-          <p:cNvPicPr>
-            <a:picLocks noChangeArrowheads="1"/>
-          </p:cNvPicPr>
-          <p:nvPr/>
-        </p:nvPicPr>
-        <p:blipFill rotWithShape="1">
-          <a:blip r:embed="rId3">
-            <a:extLst>
-              <a:ext uri="{28A0092B-C50C-407E-A947-70E740481C1C}">
-                <a14:useLocalDpi xmlns:a14="http://schemas.microsoft.com/office/drawing/2010/main" val="0"/>
-              </a:ext>
-            </a:extLst>
-          </a:blip>
-          <a:srcRect l="28955" t="27411" r="18564" b="23920"/>
-          <a:stretch/>
-        </p:blipFill>
-        <p:spPr bwMode="auto">
-          <a:xfrm>
-            <a:off x="1271723" y="1571764"/>
-            <a:ext cx="450723" cy="406400"/>
-          </a:xfrm>
-          <a:prstGeom prst="rect">
-            <a:avLst/>
-          </a:prstGeom>
-          <a:noFill/>
-          <a:ln>
-            <a:noFill/>
-          </a:ln>
-          <a:effectLst/>
-          <a:extLst>
-            <a:ext uri="{909E8E84-426E-40DD-AFC4-6F175D3DCCD1}">
-              <a14:hiddenFill xmlns:a14="http://schemas.microsoft.com/office/drawing/2010/main">
-                <a:solidFill>
-                  <a:schemeClr val="accent1"/>
-                </a:solidFill>
-              </a14:hiddenFill>
-            </a:ext>
-            <a:ext uri="{91240B29-F687-4F45-9708-019B960494DF}">
-              <a14:hiddenLine xmlns:a14="http://schemas.microsoft.com/office/drawing/2010/main" w="9525">
-                <a:solidFill>
-                  <a:schemeClr val="tx1"/>
-                </a:solidFill>
-                <a:miter lim="800000"/>
-                <a:headEnd/>
-                <a:tailEnd/>
-              </a14:hiddenLine>
-            </a:ext>
-            <a:ext uri="{AF507438-7753-43E0-B8FC-AC1667EBCBE1}">
-              <a14:hiddenEffects xmlns:a14="http://schemas.microsoft.com/office/drawing/2010/main">
-                <a:effectLst>
-                  <a:outerShdw dist="35921" dir="2700000" algn="ctr" rotWithShape="0">
-                    <a:schemeClr val="bg2"/>
-                  </a:outerShdw>
-                </a:effectLst>
-              </a14:hiddenEffects>
-            </a:ext>
-          </a:extLst>
-        </p:spPr>
-      </p:pic>
-      <p:grpSp>
-        <p:nvGrpSpPr>
-          <p:cNvPr id="7" name="Group 6"/>
-          <p:cNvGrpSpPr>
-            <a:grpSpLocks/>
-          </p:cNvGrpSpPr>
-          <p:nvPr/>
-        </p:nvGrpSpPr>
-        <p:grpSpPr>
-          <a:xfrm>
-            <a:off x="2640875" y="3228975"/>
-            <a:ext cx="838200" cy="856097"/>
-            <a:chOff x="375266" y="5397326"/>
-            <a:chExt cx="838200" cy="838200"/>
-          </a:xfrm>
-        </p:grpSpPr>
         <p:sp>
           <p:nvSpPr>
-            <p:cNvPr id="8" name="Rectangle 7"/>
-            <p:cNvSpPr/>
+            <p:cNvPr id="11" name="Rectangle 7"/>
+            <p:cNvSpPr>
+              <a:spLocks/>
+            </p:cNvSpPr>
             <p:nvPr/>
           </p:nvSpPr>
           <p:spPr>
             <a:xfrm>
-              <a:off x="375266" y="5397326"/>
-              <a:ext cx="838200" cy="838200"/>
+              <a:off x="3163992" y="3759428"/>
+              <a:ext cx="155053" cy="159775"/>
             </a:xfrm>
             <a:prstGeom prst="rect">
               <a:avLst/>
             </a:prstGeom>
-            <a:noFill/>
+            <a:solidFill>
+              <a:srgbClr val="E46B09"/>
+            </a:solidFill>
             <a:ln>
-              <a:noFill/>
-            </a:ln>
-          </p:spPr>
-          <p:style>
-            <a:lnRef idx="2">
-              <a:schemeClr val="accent1">
-                <a:shade val="50000"/>
-              </a:schemeClr>
-            </a:lnRef>
-            <a:fillRef idx="1">
-              <a:schemeClr val="accent1"/>
-            </a:fillRef>
-            <a:effectRef idx="0">
-              <a:schemeClr val="accent1"/>
-            </a:effectRef>
-            <a:fontRef idx="minor">
-              <a:schemeClr val="lt1"/>
-            </a:fontRef>
-          </p:style>
-          <p:txBody>
-            <a:bodyPr rtlCol="0" anchor="ctr"/>
-            <a:lstStyle/>
-            <a:p>
-              <a:pPr algn="ctr"/>
-              <a:endParaRPr lang="en-SG"/>
-            </a:p>
-          </p:txBody>
-        </p:sp>
-        <p:sp>
-          <p:nvSpPr>
-            <p:cNvPr id="9" name="Rectangle 4"/>
-            <p:cNvSpPr/>
-            <p:nvPr/>
-          </p:nvSpPr>
-          <p:spPr>
-            <a:xfrm rot="16200000">
-              <a:off x="444221" y="5470529"/>
-              <a:ext cx="700291" cy="690781"/>
-            </a:xfrm>
-            <a:custGeom>
-              <a:avLst/>
-              <a:gdLst/>
-              <a:ahLst/>
-              <a:cxnLst/>
-              <a:rect l="l" t="t" r="r" b="b"/>
-              <a:pathLst>
-                <a:path w="1752603" h="1752600">
-                  <a:moveTo>
-                    <a:pt x="533400" y="0"/>
-                  </a:moveTo>
-                  <a:lnTo>
-                    <a:pt x="533403" y="0"/>
-                  </a:lnTo>
-                  <a:lnTo>
-                    <a:pt x="1066800" y="0"/>
-                  </a:lnTo>
-                  <a:lnTo>
-                    <a:pt x="1752603" y="0"/>
-                  </a:lnTo>
-                  <a:lnTo>
-                    <a:pt x="1752603" y="1752600"/>
-                  </a:lnTo>
-                  <a:lnTo>
-                    <a:pt x="1219203" y="1752600"/>
-                  </a:lnTo>
-                  <a:lnTo>
-                    <a:pt x="533403" y="1752600"/>
-                  </a:lnTo>
-                  <a:lnTo>
-                    <a:pt x="3" y="1752600"/>
-                  </a:lnTo>
-                  <a:lnTo>
-                    <a:pt x="3" y="533430"/>
-                  </a:lnTo>
-                  <a:cubicBezTo>
-                    <a:pt x="0" y="533420"/>
-                    <a:pt x="0" y="533410"/>
-                    <a:pt x="0" y="533400"/>
-                  </a:cubicBezTo>
-                  <a:cubicBezTo>
-                    <a:pt x="0" y="238811"/>
-                    <a:pt x="238811" y="0"/>
-                    <a:pt x="533400" y="0"/>
-                  </a:cubicBezTo>
-                  <a:close/>
-                </a:path>
-              </a:pathLst>
-            </a:custGeom>
-            <a:noFill/>
-            <a:ln w="76200" cmpd="sng">
               <a:solidFill>
-                <a:srgbClr val="0070C0"/>
+                <a:srgbClr val="E46B09"/>
               </a:solidFill>
-              <a:miter lim="800000"/>
             </a:ln>
           </p:spPr>
           <p:style>
@@ -3869,19 +3982,187 @@
             </a:p>
           </p:txBody>
         </p:sp>
+        <p:cxnSp>
+          <p:nvCxnSpPr>
+            <p:cNvPr id="12" name="Straight Connector 11"/>
+            <p:cNvCxnSpPr/>
+            <p:nvPr/>
+          </p:nvCxnSpPr>
+          <p:spPr>
+            <a:xfrm>
+              <a:off x="3099806" y="3364539"/>
+              <a:ext cx="0" cy="584397"/>
+            </a:xfrm>
+            <a:prstGeom prst="line">
+              <a:avLst/>
+            </a:prstGeom>
+            <a:ln w="9525">
+              <a:solidFill>
+                <a:srgbClr val="0070C0"/>
+              </a:solidFill>
+            </a:ln>
+          </p:spPr>
+          <p:style>
+            <a:lnRef idx="1">
+              <a:schemeClr val="accent1"/>
+            </a:lnRef>
+            <a:fillRef idx="0">
+              <a:schemeClr val="accent1"/>
+            </a:fillRef>
+            <a:effectRef idx="0">
+              <a:schemeClr val="accent1"/>
+            </a:effectRef>
+            <a:fontRef idx="minor">
+              <a:schemeClr val="tx1"/>
+            </a:fontRef>
+          </p:style>
+        </p:cxnSp>
       </p:grpSp>
       <p:sp>
         <p:nvSpPr>
-          <p:cNvPr id="10" name="Rectangle 7"/>
-          <p:cNvSpPr>
-            <a:spLocks/>
-          </p:cNvSpPr>
+          <p:cNvPr id="4" name="TextBox 3"/>
+          <p:cNvSpPr txBox="1"/>
           <p:nvPr/>
         </p:nvSpPr>
         <p:spPr>
           <a:xfrm>
-            <a:off x="2827025" y="3438926"/>
-            <a:ext cx="209130" cy="215499"/>
+            <a:off x="3243463" y="706170"/>
+            <a:ext cx="2657074" cy="707886"/>
+          </a:xfrm>
+          <a:prstGeom prst="rect">
+            <a:avLst/>
+          </a:prstGeom>
+          <a:noFill/>
+        </p:spPr>
+        <p:txBody>
+          <a:bodyPr wrap="none" rtlCol="0">
+            <a:spAutoFit/>
+          </a:bodyPr>
+          <a:lstStyle/>
+          <a:p>
+            <a:pPr algn="ctr"/>
+            <a:r>
+              <a:rPr lang="en-US" sz="4000" dirty="0"/>
+              <a:t>Ribbon Icon</a:t>
+            </a:r>
+          </a:p>
+        </p:txBody>
+      </p:sp>
+    </p:spTree>
+    <p:extLst>
+      <p:ext uri="{BB962C8B-B14F-4D97-AF65-F5344CB8AC3E}">
+        <p14:creationId xmlns:p14="http://schemas.microsoft.com/office/powerpoint/2010/main" val="1863451993"/>
+      </p:ext>
+    </p:extLst>
+  </p:cSld>
+  <p:clrMapOvr>
+    <a:masterClrMapping/>
+  </p:clrMapOvr>
+</p:sld>
+</file>
+
+<file path=ppt/slides/slide2.xml><?xml version="1.0" encoding="utf-8"?>
+<p:sld xmlns:a="http://schemas.openxmlformats.org/drawingml/2006/main" xmlns:r="http://schemas.openxmlformats.org/officeDocument/2006/relationships" xmlns:p="http://schemas.openxmlformats.org/presentationml/2006/main">
+  <p:cSld>
+    <p:bg>
+      <p:bgPr>
+        <a:solidFill>
+          <a:schemeClr val="bg1">
+            <a:lumMod val="95000"/>
+          </a:schemeClr>
+        </a:solidFill>
+        <a:effectLst/>
+      </p:bgPr>
+    </p:bg>
+    <p:spTree>
+      <p:nvGrpSpPr>
+        <p:cNvPr id="1" name=""/>
+        <p:cNvGrpSpPr/>
+        <p:nvPr/>
+      </p:nvGrpSpPr>
+      <p:grpSpPr>
+        <a:xfrm>
+          <a:off x="0" y="0"/>
+          <a:ext cx="0" cy="0"/>
+          <a:chOff x="0" y="0"/>
+          <a:chExt cx="0" cy="0"/>
+        </a:xfrm>
+      </p:grpSpPr>
+      <p:sp>
+        <p:nvSpPr>
+          <p:cNvPr id="4" name="TextBox 3"/>
+          <p:cNvSpPr txBox="1"/>
+          <p:nvPr/>
+        </p:nvSpPr>
+        <p:spPr>
+          <a:xfrm>
+            <a:off x="3359682" y="729400"/>
+            <a:ext cx="2424638" cy="707886"/>
+          </a:xfrm>
+          <a:prstGeom prst="rect">
+            <a:avLst/>
+          </a:prstGeom>
+          <a:noFill/>
+        </p:spPr>
+        <p:txBody>
+          <a:bodyPr wrap="none" rtlCol="0">
+            <a:spAutoFit/>
+          </a:bodyPr>
+          <a:lstStyle/>
+          <a:p>
+            <a:pPr algn="ctr"/>
+            <a:r>
+              <a:rPr lang="en-US" sz="4000" dirty="0"/>
+              <a:t>Align Icons</a:t>
+            </a:r>
+          </a:p>
+        </p:txBody>
+      </p:sp>
+      <p:cxnSp>
+        <p:nvCxnSpPr>
+          <p:cNvPr id="5" name="Straight Connector 4"/>
+          <p:cNvCxnSpPr/>
+          <p:nvPr/>
+        </p:nvCxnSpPr>
+        <p:spPr>
+          <a:xfrm flipH="1">
+            <a:off x="1133449" y="3265418"/>
+            <a:ext cx="2382" cy="552450"/>
+          </a:xfrm>
+          <a:prstGeom prst="line">
+            <a:avLst/>
+          </a:prstGeom>
+          <a:ln w="19050">
+            <a:solidFill>
+              <a:schemeClr val="tx1"/>
+            </a:solidFill>
+          </a:ln>
+        </p:spPr>
+        <p:style>
+          <a:lnRef idx="1">
+            <a:schemeClr val="dk1"/>
+          </a:lnRef>
+          <a:fillRef idx="0">
+            <a:schemeClr val="dk1"/>
+          </a:fillRef>
+          <a:effectRef idx="0">
+            <a:schemeClr val="dk1"/>
+          </a:effectRef>
+          <a:fontRef idx="minor">
+            <a:schemeClr val="tx1"/>
+          </a:fontRef>
+        </p:style>
+      </p:cxnSp>
+      <p:sp>
+        <p:nvSpPr>
+          <p:cNvPr id="7" name="Rectangle 6"/>
+          <p:cNvSpPr/>
+          <p:nvPr/>
+        </p:nvSpPr>
+        <p:spPr>
+          <a:xfrm>
+            <a:off x="1192980" y="3293993"/>
+            <a:ext cx="340518" cy="145256"/>
           </a:xfrm>
           <a:prstGeom prst="rect">
             <a:avLst/>
@@ -3889,9 +4170,9 @@
           <a:solidFill>
             <a:srgbClr val="E46B09"/>
           </a:solidFill>
-          <a:ln>
+          <a:ln w="12700">
             <a:solidFill>
-              <a:srgbClr val="E46B09"/>
+              <a:schemeClr val="tx1"/>
             </a:solidFill>
           </a:ln>
         </p:spPr>
@@ -3922,26 +4203,24 @@
       </p:sp>
       <p:sp>
         <p:nvSpPr>
-          <p:cNvPr id="11" name="Rectangle 7"/>
-          <p:cNvSpPr>
-            <a:spLocks/>
-          </p:cNvSpPr>
+          <p:cNvPr id="8" name="Rectangle 7"/>
+          <p:cNvSpPr/>
           <p:nvPr/>
         </p:nvSpPr>
         <p:spPr>
           <a:xfrm>
-            <a:off x="3163992" y="3759428"/>
-            <a:ext cx="155053" cy="159775"/>
+            <a:off x="1192980" y="3498780"/>
+            <a:ext cx="486928" cy="145256"/>
           </a:xfrm>
           <a:prstGeom prst="rect">
             <a:avLst/>
           </a:prstGeom>
           <a:solidFill>
-            <a:srgbClr val="E46B09"/>
+            <a:schemeClr val="bg1"/>
           </a:solidFill>
-          <a:ln>
+          <a:ln w="12700">
             <a:solidFill>
-              <a:srgbClr val="E46B09"/>
+              <a:schemeClr val="tx1"/>
             </a:solidFill>
           </a:ln>
         </p:spPr>
@@ -3972,22 +4251,23 @@
       </p:sp>
       <p:cxnSp>
         <p:nvCxnSpPr>
-          <p:cNvPr id="12" name="Straight Connector 11"/>
+          <p:cNvPr id="10" name="Straight Arrow Connector 9"/>
           <p:cNvCxnSpPr/>
           <p:nvPr/>
         </p:nvCxnSpPr>
         <p:spPr>
-          <a:xfrm>
-            <a:off x="3099806" y="3364539"/>
-            <a:ext cx="0" cy="584397"/>
-          </a:xfrm>
-          <a:prstGeom prst="line">
+          <a:xfrm flipH="1">
+            <a:off x="1212463" y="3741667"/>
+            <a:ext cx="373857" cy="0"/>
+          </a:xfrm>
+          <a:prstGeom prst="straightConnector1">
             <a:avLst/>
           </a:prstGeom>
-          <a:ln w="9525">
+          <a:ln>
             <a:solidFill>
-              <a:srgbClr val="0070C0"/>
+              <a:srgbClr val="0071C2"/>
             </a:solidFill>
+            <a:tailEnd type="triangle"/>
           </a:ln>
         </p:spPr>
         <p:style>
@@ -4005,23 +4285,1438 @@
           </a:fontRef>
         </p:style>
       </p:cxnSp>
+      <p:sp>
+        <p:nvSpPr>
+          <p:cNvPr id="12" name="TextBox 11"/>
+          <p:cNvSpPr txBox="1"/>
+          <p:nvPr/>
+        </p:nvSpPr>
+        <p:spPr>
+          <a:xfrm>
+            <a:off x="896186" y="2166686"/>
+            <a:ext cx="1020985" cy="369332"/>
+          </a:xfrm>
+          <a:prstGeom prst="rect">
+            <a:avLst/>
+          </a:prstGeom>
+          <a:noFill/>
+        </p:spPr>
+        <p:txBody>
+          <a:bodyPr wrap="none" rtlCol="0">
+            <a:spAutoFit/>
+          </a:bodyPr>
+          <a:lstStyle/>
+          <a:p>
+            <a:r>
+              <a:rPr lang="en-US" dirty="0"/>
+              <a:t>Align left</a:t>
+            </a:r>
+          </a:p>
+        </p:txBody>
+      </p:sp>
+      <p:sp>
+        <p:nvSpPr>
+          <p:cNvPr id="13" name="TextBox 12"/>
+          <p:cNvSpPr txBox="1"/>
+          <p:nvPr/>
+        </p:nvSpPr>
+        <p:spPr>
+          <a:xfrm>
+            <a:off x="2813356" y="2166686"/>
+            <a:ext cx="1190839" cy="369332"/>
+          </a:xfrm>
+          <a:prstGeom prst="rect">
+            <a:avLst/>
+          </a:prstGeom>
+          <a:noFill/>
+        </p:spPr>
+        <p:txBody>
+          <a:bodyPr wrap="none" rtlCol="0">
+            <a:spAutoFit/>
+          </a:bodyPr>
+          <a:lstStyle/>
+          <a:p>
+            <a:r>
+              <a:rPr lang="en-US" dirty="0"/>
+              <a:t>Align Right</a:t>
+            </a:r>
+          </a:p>
+        </p:txBody>
+      </p:sp>
+      <p:sp>
+        <p:nvSpPr>
+          <p:cNvPr id="14" name="TextBox 13"/>
+          <p:cNvSpPr txBox="1">
+            <a:spLocks/>
+          </p:cNvSpPr>
+          <p:nvPr/>
+        </p:nvSpPr>
+        <p:spPr>
+          <a:xfrm>
+            <a:off x="4900381" y="2166686"/>
+            <a:ext cx="1042593" cy="369332"/>
+          </a:xfrm>
+          <a:prstGeom prst="rect">
+            <a:avLst/>
+          </a:prstGeom>
+          <a:noFill/>
+        </p:spPr>
+        <p:txBody>
+          <a:bodyPr wrap="none" rtlCol="0">
+            <a:spAutoFit/>
+          </a:bodyPr>
+          <a:lstStyle/>
+          <a:p>
+            <a:r>
+              <a:rPr lang="en-US" dirty="0"/>
+              <a:t>Align Top</a:t>
+            </a:r>
+          </a:p>
+        </p:txBody>
+      </p:sp>
+      <p:sp>
+        <p:nvSpPr>
+          <p:cNvPr id="20" name="TextBox 19"/>
+          <p:cNvSpPr txBox="1">
+            <a:spLocks/>
+          </p:cNvSpPr>
+          <p:nvPr/>
+        </p:nvSpPr>
+        <p:spPr>
+          <a:xfrm>
+            <a:off x="6839160" y="2166686"/>
+            <a:ext cx="1408655" cy="369332"/>
+          </a:xfrm>
+          <a:prstGeom prst="rect">
+            <a:avLst/>
+          </a:prstGeom>
+          <a:noFill/>
+        </p:spPr>
+        <p:txBody>
+          <a:bodyPr wrap="none" rtlCol="0">
+            <a:spAutoFit/>
+          </a:bodyPr>
+          <a:lstStyle/>
+          <a:p>
+            <a:r>
+              <a:rPr lang="en-US" dirty="0"/>
+              <a:t>Align Bottom</a:t>
+            </a:r>
+          </a:p>
+        </p:txBody>
+      </p:sp>
+      <p:cxnSp>
+        <p:nvCxnSpPr>
+          <p:cNvPr id="66" name="Straight Connector 65"/>
+          <p:cNvCxnSpPr/>
+          <p:nvPr/>
+        </p:nvCxnSpPr>
+        <p:spPr>
+          <a:xfrm>
+            <a:off x="3679623" y="3265418"/>
+            <a:ext cx="2382" cy="552450"/>
+          </a:xfrm>
+          <a:prstGeom prst="line">
+            <a:avLst/>
+          </a:prstGeom>
+          <a:ln w="19050">
+            <a:solidFill>
+              <a:schemeClr val="tx1"/>
+            </a:solidFill>
+          </a:ln>
+        </p:spPr>
+        <p:style>
+          <a:lnRef idx="1">
+            <a:schemeClr val="dk1"/>
+          </a:lnRef>
+          <a:fillRef idx="0">
+            <a:schemeClr val="dk1"/>
+          </a:fillRef>
+          <a:effectRef idx="0">
+            <a:schemeClr val="dk1"/>
+          </a:effectRef>
+          <a:fontRef idx="minor">
+            <a:schemeClr val="tx1"/>
+          </a:fontRef>
+        </p:style>
+      </p:cxnSp>
+      <p:sp>
+        <p:nvSpPr>
+          <p:cNvPr id="67" name="Rectangle 66"/>
+          <p:cNvSpPr/>
+          <p:nvPr/>
+        </p:nvSpPr>
+        <p:spPr>
+          <a:xfrm flipH="1">
+            <a:off x="3281956" y="3293993"/>
+            <a:ext cx="340518" cy="145256"/>
+          </a:xfrm>
+          <a:prstGeom prst="rect">
+            <a:avLst/>
+          </a:prstGeom>
+          <a:solidFill>
+            <a:srgbClr val="E46B09"/>
+          </a:solidFill>
+          <a:ln w="12700">
+            <a:solidFill>
+              <a:schemeClr val="tx1"/>
+            </a:solidFill>
+          </a:ln>
+        </p:spPr>
+        <p:style>
+          <a:lnRef idx="2">
+            <a:schemeClr val="accent1">
+              <a:shade val="50000"/>
+            </a:schemeClr>
+          </a:lnRef>
+          <a:fillRef idx="1">
+            <a:schemeClr val="accent1"/>
+          </a:fillRef>
+          <a:effectRef idx="0">
+            <a:schemeClr val="accent1"/>
+          </a:effectRef>
+          <a:fontRef idx="minor">
+            <a:schemeClr val="lt1"/>
+          </a:fontRef>
+        </p:style>
+        <p:txBody>
+          <a:bodyPr rtlCol="0" anchor="ctr"/>
+          <a:lstStyle/>
+          <a:p>
+            <a:pPr algn="ctr"/>
+            <a:endParaRPr lang="en-US"/>
+          </a:p>
+        </p:txBody>
+      </p:sp>
+      <p:sp>
+        <p:nvSpPr>
+          <p:cNvPr id="68" name="Rectangle 67"/>
+          <p:cNvSpPr/>
+          <p:nvPr/>
+        </p:nvSpPr>
+        <p:spPr>
+          <a:xfrm flipH="1">
+            <a:off x="3135546" y="3498780"/>
+            <a:ext cx="486928" cy="145256"/>
+          </a:xfrm>
+          <a:prstGeom prst="rect">
+            <a:avLst/>
+          </a:prstGeom>
+          <a:solidFill>
+            <a:schemeClr val="bg1"/>
+          </a:solidFill>
+          <a:ln w="12700">
+            <a:solidFill>
+              <a:schemeClr val="tx1"/>
+            </a:solidFill>
+          </a:ln>
+        </p:spPr>
+        <p:style>
+          <a:lnRef idx="2">
+            <a:schemeClr val="accent1">
+              <a:shade val="50000"/>
+            </a:schemeClr>
+          </a:lnRef>
+          <a:fillRef idx="1">
+            <a:schemeClr val="accent1"/>
+          </a:fillRef>
+          <a:effectRef idx="0">
+            <a:schemeClr val="accent1"/>
+          </a:effectRef>
+          <a:fontRef idx="minor">
+            <a:schemeClr val="lt1"/>
+          </a:fontRef>
+        </p:style>
+        <p:txBody>
+          <a:bodyPr rtlCol="0" anchor="ctr"/>
+          <a:lstStyle/>
+          <a:p>
+            <a:pPr algn="ctr"/>
+            <a:endParaRPr lang="en-US"/>
+          </a:p>
+        </p:txBody>
+      </p:sp>
+      <p:cxnSp>
+        <p:nvCxnSpPr>
+          <p:cNvPr id="69" name="Straight Arrow Connector 68"/>
+          <p:cNvCxnSpPr/>
+          <p:nvPr/>
+        </p:nvCxnSpPr>
+        <p:spPr>
+          <a:xfrm>
+            <a:off x="3229134" y="3741667"/>
+            <a:ext cx="373857" cy="0"/>
+          </a:xfrm>
+          <a:prstGeom prst="straightConnector1">
+            <a:avLst/>
+          </a:prstGeom>
+          <a:ln>
+            <a:solidFill>
+              <a:srgbClr val="0071C2"/>
+            </a:solidFill>
+            <a:tailEnd type="triangle"/>
+          </a:ln>
+        </p:spPr>
+        <p:style>
+          <a:lnRef idx="1">
+            <a:schemeClr val="accent1"/>
+          </a:lnRef>
+          <a:fillRef idx="0">
+            <a:schemeClr val="accent1"/>
+          </a:fillRef>
+          <a:effectRef idx="0">
+            <a:schemeClr val="accent1"/>
+          </a:effectRef>
+          <a:fontRef idx="minor">
+            <a:schemeClr val="tx1"/>
+          </a:fontRef>
+        </p:style>
+      </p:cxnSp>
+      <p:cxnSp>
+        <p:nvCxnSpPr>
+          <p:cNvPr id="71" name="Straight Connector 70"/>
+          <p:cNvCxnSpPr/>
+          <p:nvPr/>
+        </p:nvCxnSpPr>
+        <p:spPr>
+          <a:xfrm rot="16200000">
+            <a:off x="5423483" y="2987389"/>
+            <a:ext cx="2382" cy="552450"/>
+          </a:xfrm>
+          <a:prstGeom prst="line">
+            <a:avLst/>
+          </a:prstGeom>
+          <a:ln w="19050">
+            <a:solidFill>
+              <a:schemeClr val="tx1"/>
+            </a:solidFill>
+          </a:ln>
+        </p:spPr>
+        <p:style>
+          <a:lnRef idx="1">
+            <a:schemeClr val="dk1"/>
+          </a:lnRef>
+          <a:fillRef idx="0">
+            <a:schemeClr val="dk1"/>
+          </a:fillRef>
+          <a:effectRef idx="0">
+            <a:schemeClr val="dk1"/>
+          </a:effectRef>
+          <a:fontRef idx="minor">
+            <a:schemeClr val="tx1"/>
+          </a:fontRef>
+        </p:style>
+      </p:cxnSp>
+      <p:sp>
+        <p:nvSpPr>
+          <p:cNvPr id="72" name="Rectangle 71"/>
+          <p:cNvSpPr/>
+          <p:nvPr/>
+        </p:nvSpPr>
+        <p:spPr>
+          <a:xfrm rot="16200000" flipH="1">
+            <a:off x="5079393" y="3419585"/>
+            <a:ext cx="340518" cy="145256"/>
+          </a:xfrm>
+          <a:prstGeom prst="rect">
+            <a:avLst/>
+          </a:prstGeom>
+          <a:solidFill>
+            <a:srgbClr val="E46B09"/>
+          </a:solidFill>
+          <a:ln w="12700">
+            <a:solidFill>
+              <a:schemeClr val="tx1"/>
+            </a:solidFill>
+          </a:ln>
+        </p:spPr>
+        <p:style>
+          <a:lnRef idx="2">
+            <a:schemeClr val="accent1">
+              <a:shade val="50000"/>
+            </a:schemeClr>
+          </a:lnRef>
+          <a:fillRef idx="1">
+            <a:schemeClr val="accent1"/>
+          </a:fillRef>
+          <a:effectRef idx="0">
+            <a:schemeClr val="accent1"/>
+          </a:effectRef>
+          <a:fontRef idx="minor">
+            <a:schemeClr val="lt1"/>
+          </a:fontRef>
+        </p:style>
+        <p:txBody>
+          <a:bodyPr rtlCol="0" anchor="ctr"/>
+          <a:lstStyle/>
+          <a:p>
+            <a:pPr algn="ctr"/>
+            <a:endParaRPr lang="en-US"/>
+          </a:p>
+        </p:txBody>
+      </p:sp>
+      <p:sp>
+        <p:nvSpPr>
+          <p:cNvPr id="73" name="Rectangle 72"/>
+          <p:cNvSpPr/>
+          <p:nvPr/>
+        </p:nvSpPr>
+        <p:spPr>
+          <a:xfrm rot="16200000" flipH="1">
+            <a:off x="5210976" y="3492790"/>
+            <a:ext cx="486928" cy="145256"/>
+          </a:xfrm>
+          <a:prstGeom prst="rect">
+            <a:avLst/>
+          </a:prstGeom>
+          <a:solidFill>
+            <a:schemeClr val="bg1"/>
+          </a:solidFill>
+          <a:ln w="12700">
+            <a:solidFill>
+              <a:schemeClr val="tx1"/>
+            </a:solidFill>
+          </a:ln>
+        </p:spPr>
+        <p:style>
+          <a:lnRef idx="2">
+            <a:schemeClr val="accent1">
+              <a:shade val="50000"/>
+            </a:schemeClr>
+          </a:lnRef>
+          <a:fillRef idx="1">
+            <a:schemeClr val="accent1"/>
+          </a:fillRef>
+          <a:effectRef idx="0">
+            <a:schemeClr val="accent1"/>
+          </a:effectRef>
+          <a:fontRef idx="minor">
+            <a:schemeClr val="lt1"/>
+          </a:fontRef>
+        </p:style>
+        <p:txBody>
+          <a:bodyPr rtlCol="0" anchor="ctr"/>
+          <a:lstStyle/>
+          <a:p>
+            <a:pPr algn="ctr"/>
+            <a:endParaRPr lang="en-US"/>
+          </a:p>
+        </p:txBody>
+      </p:sp>
+      <p:cxnSp>
+        <p:nvCxnSpPr>
+          <p:cNvPr id="74" name="Straight Arrow Connector 73"/>
+          <p:cNvCxnSpPr/>
+          <p:nvPr/>
+        </p:nvCxnSpPr>
+        <p:spPr>
+          <a:xfrm rot="16200000">
+            <a:off x="5437769" y="3528365"/>
+            <a:ext cx="373857" cy="0"/>
+          </a:xfrm>
+          <a:prstGeom prst="straightConnector1">
+            <a:avLst/>
+          </a:prstGeom>
+          <a:ln>
+            <a:solidFill>
+              <a:srgbClr val="0071C2"/>
+            </a:solidFill>
+            <a:tailEnd type="triangle"/>
+          </a:ln>
+        </p:spPr>
+        <p:style>
+          <a:lnRef idx="1">
+            <a:schemeClr val="accent1"/>
+          </a:lnRef>
+          <a:fillRef idx="0">
+            <a:schemeClr val="accent1"/>
+          </a:fillRef>
+          <a:effectRef idx="0">
+            <a:schemeClr val="accent1"/>
+          </a:effectRef>
+          <a:fontRef idx="minor">
+            <a:schemeClr val="tx1"/>
+          </a:fontRef>
+        </p:style>
+      </p:cxnSp>
+      <p:cxnSp>
+        <p:nvCxnSpPr>
+          <p:cNvPr id="76" name="Straight Connector 75"/>
+          <p:cNvCxnSpPr/>
+          <p:nvPr/>
+        </p:nvCxnSpPr>
+        <p:spPr>
+          <a:xfrm rot="5400000" flipV="1">
+            <a:off x="7545292" y="3534462"/>
+            <a:ext cx="2382" cy="552450"/>
+          </a:xfrm>
+          <a:prstGeom prst="line">
+            <a:avLst/>
+          </a:prstGeom>
+          <a:ln w="19050">
+            <a:solidFill>
+              <a:schemeClr val="tx1"/>
+            </a:solidFill>
+          </a:ln>
+        </p:spPr>
+        <p:style>
+          <a:lnRef idx="1">
+            <a:schemeClr val="dk1"/>
+          </a:lnRef>
+          <a:fillRef idx="0">
+            <a:schemeClr val="dk1"/>
+          </a:fillRef>
+          <a:effectRef idx="0">
+            <a:schemeClr val="dk1"/>
+          </a:effectRef>
+          <a:fontRef idx="minor">
+            <a:schemeClr val="tx1"/>
+          </a:fontRef>
+        </p:style>
+      </p:cxnSp>
+      <p:sp>
+        <p:nvSpPr>
+          <p:cNvPr id="77" name="Rectangle 76"/>
+          <p:cNvSpPr/>
+          <p:nvPr/>
+        </p:nvSpPr>
+        <p:spPr>
+          <a:xfrm rot="5400000" flipH="1" flipV="1">
+            <a:off x="7201202" y="3509460"/>
+            <a:ext cx="340518" cy="145256"/>
+          </a:xfrm>
+          <a:prstGeom prst="rect">
+            <a:avLst/>
+          </a:prstGeom>
+          <a:solidFill>
+            <a:srgbClr val="E46B09"/>
+          </a:solidFill>
+          <a:ln w="12700">
+            <a:solidFill>
+              <a:schemeClr val="tx1"/>
+            </a:solidFill>
+          </a:ln>
+        </p:spPr>
+        <p:style>
+          <a:lnRef idx="2">
+            <a:schemeClr val="accent1">
+              <a:shade val="50000"/>
+            </a:schemeClr>
+          </a:lnRef>
+          <a:fillRef idx="1">
+            <a:schemeClr val="accent1"/>
+          </a:fillRef>
+          <a:effectRef idx="0">
+            <a:schemeClr val="accent1"/>
+          </a:effectRef>
+          <a:fontRef idx="minor">
+            <a:schemeClr val="lt1"/>
+          </a:fontRef>
+        </p:style>
+        <p:txBody>
+          <a:bodyPr rtlCol="0" anchor="ctr"/>
+          <a:lstStyle/>
+          <a:p>
+            <a:pPr algn="ctr"/>
+            <a:endParaRPr lang="en-US"/>
+          </a:p>
+        </p:txBody>
+      </p:sp>
+      <p:sp>
+        <p:nvSpPr>
+          <p:cNvPr id="78" name="Rectangle 77"/>
+          <p:cNvSpPr/>
+          <p:nvPr/>
+        </p:nvSpPr>
+        <p:spPr>
+          <a:xfrm rot="5400000" flipH="1" flipV="1">
+            <a:off x="7332784" y="3436255"/>
+            <a:ext cx="486928" cy="145256"/>
+          </a:xfrm>
+          <a:prstGeom prst="rect">
+            <a:avLst/>
+          </a:prstGeom>
+          <a:solidFill>
+            <a:schemeClr val="bg1"/>
+          </a:solidFill>
+          <a:ln w="12700">
+            <a:solidFill>
+              <a:schemeClr val="tx1"/>
+            </a:solidFill>
+          </a:ln>
+        </p:spPr>
+        <p:style>
+          <a:lnRef idx="2">
+            <a:schemeClr val="accent1">
+              <a:shade val="50000"/>
+            </a:schemeClr>
+          </a:lnRef>
+          <a:fillRef idx="1">
+            <a:schemeClr val="accent1"/>
+          </a:fillRef>
+          <a:effectRef idx="0">
+            <a:schemeClr val="accent1"/>
+          </a:effectRef>
+          <a:fontRef idx="minor">
+            <a:schemeClr val="lt1"/>
+          </a:fontRef>
+        </p:style>
+        <p:txBody>
+          <a:bodyPr rtlCol="0" anchor="ctr"/>
+          <a:lstStyle/>
+          <a:p>
+            <a:pPr algn="ctr"/>
+            <a:endParaRPr lang="en-US"/>
+          </a:p>
+        </p:txBody>
+      </p:sp>
+      <p:cxnSp>
+        <p:nvCxnSpPr>
+          <p:cNvPr id="79" name="Straight Arrow Connector 78"/>
+          <p:cNvCxnSpPr/>
+          <p:nvPr/>
+        </p:nvCxnSpPr>
+        <p:spPr>
+          <a:xfrm rot="5400000" flipV="1">
+            <a:off x="7559578" y="3545935"/>
+            <a:ext cx="373857" cy="0"/>
+          </a:xfrm>
+          <a:prstGeom prst="straightConnector1">
+            <a:avLst/>
+          </a:prstGeom>
+          <a:ln>
+            <a:solidFill>
+              <a:srgbClr val="0071C2"/>
+            </a:solidFill>
+            <a:tailEnd type="triangle"/>
+          </a:ln>
+        </p:spPr>
+        <p:style>
+          <a:lnRef idx="1">
+            <a:schemeClr val="accent1"/>
+          </a:lnRef>
+          <a:fillRef idx="0">
+            <a:schemeClr val="accent1"/>
+          </a:fillRef>
+          <a:effectRef idx="0">
+            <a:schemeClr val="accent1"/>
+          </a:effectRef>
+          <a:fontRef idx="minor">
+            <a:schemeClr val="tx1"/>
+          </a:fontRef>
+        </p:style>
+      </p:cxnSp>
+      <p:sp>
+        <p:nvSpPr>
+          <p:cNvPr id="328" name="TextBox 327"/>
+          <p:cNvSpPr txBox="1"/>
+          <p:nvPr/>
+        </p:nvSpPr>
+        <p:spPr>
+          <a:xfrm>
+            <a:off x="502520" y="4547268"/>
+            <a:ext cx="1808316" cy="369332"/>
+          </a:xfrm>
+          <a:prstGeom prst="rect">
+            <a:avLst/>
+          </a:prstGeom>
+          <a:noFill/>
+        </p:spPr>
+        <p:txBody>
+          <a:bodyPr wrap="none" rtlCol="0">
+            <a:spAutoFit/>
+          </a:bodyPr>
+          <a:lstStyle/>
+          <a:p>
+            <a:r>
+              <a:rPr lang="en-US" dirty="0"/>
+              <a:t>horizontal Center</a:t>
+            </a:r>
+          </a:p>
+        </p:txBody>
+      </p:sp>
+      <p:sp>
+        <p:nvSpPr>
+          <p:cNvPr id="329" name="TextBox 328"/>
+          <p:cNvSpPr txBox="1"/>
+          <p:nvPr/>
+        </p:nvSpPr>
+        <p:spPr>
+          <a:xfrm>
+            <a:off x="2623336" y="4547268"/>
+            <a:ext cx="1570879" cy="369332"/>
+          </a:xfrm>
+          <a:prstGeom prst="rect">
+            <a:avLst/>
+          </a:prstGeom>
+          <a:noFill/>
+        </p:spPr>
+        <p:txBody>
+          <a:bodyPr wrap="none" rtlCol="0">
+            <a:spAutoFit/>
+          </a:bodyPr>
+          <a:lstStyle/>
+          <a:p>
+            <a:r>
+              <a:rPr lang="en-US" dirty="0"/>
+              <a:t>Vertical Center</a:t>
+            </a:r>
+          </a:p>
+        </p:txBody>
+      </p:sp>
+      <p:sp>
+        <p:nvSpPr>
+          <p:cNvPr id="330" name="TextBox 329"/>
+          <p:cNvSpPr txBox="1">
+            <a:spLocks/>
+          </p:cNvSpPr>
+          <p:nvPr/>
+        </p:nvSpPr>
+        <p:spPr>
+          <a:xfrm>
+            <a:off x="5015060" y="4547268"/>
+            <a:ext cx="813236" cy="369332"/>
+          </a:xfrm>
+          <a:prstGeom prst="rect">
+            <a:avLst/>
+          </a:prstGeom>
+          <a:noFill/>
+        </p:spPr>
+        <p:txBody>
+          <a:bodyPr wrap="none" rtlCol="0">
+            <a:spAutoFit/>
+          </a:bodyPr>
+          <a:lstStyle/>
+          <a:p>
+            <a:r>
+              <a:rPr lang="en-US" dirty="0"/>
+              <a:t>Center</a:t>
+            </a:r>
+          </a:p>
+        </p:txBody>
+      </p:sp>
+      <p:cxnSp>
+        <p:nvCxnSpPr>
+          <p:cNvPr id="388" name="Straight Connector 387"/>
+          <p:cNvCxnSpPr/>
+          <p:nvPr/>
+        </p:nvCxnSpPr>
+        <p:spPr>
+          <a:xfrm>
+            <a:off x="1130453" y="5886531"/>
+            <a:ext cx="552450" cy="0"/>
+          </a:xfrm>
+          <a:prstGeom prst="line">
+            <a:avLst/>
+          </a:prstGeom>
+          <a:ln w="19050">
+            <a:solidFill>
+              <a:schemeClr val="tx1"/>
+            </a:solidFill>
+          </a:ln>
+        </p:spPr>
+        <p:style>
+          <a:lnRef idx="1">
+            <a:schemeClr val="accent1"/>
+          </a:lnRef>
+          <a:fillRef idx="0">
+            <a:schemeClr val="accent1"/>
+          </a:fillRef>
+          <a:effectRef idx="0">
+            <a:schemeClr val="accent1"/>
+          </a:effectRef>
+          <a:fontRef idx="minor">
+            <a:schemeClr val="tx1"/>
+          </a:fontRef>
+        </p:style>
+      </p:cxnSp>
+      <p:sp>
+        <p:nvSpPr>
+          <p:cNvPr id="395" name="Rectangle 394"/>
+          <p:cNvSpPr/>
+          <p:nvPr/>
+        </p:nvSpPr>
+        <p:spPr>
+          <a:xfrm>
+            <a:off x="1214146" y="5727897"/>
+            <a:ext cx="128587" cy="330994"/>
+          </a:xfrm>
+          <a:prstGeom prst="rect">
+            <a:avLst/>
+          </a:prstGeom>
+          <a:solidFill>
+            <a:srgbClr val="E46B09"/>
+          </a:solidFill>
+          <a:ln w="12700">
+            <a:solidFill>
+              <a:schemeClr val="tx1"/>
+            </a:solidFill>
+          </a:ln>
+        </p:spPr>
+        <p:style>
+          <a:lnRef idx="2">
+            <a:schemeClr val="accent1">
+              <a:shade val="50000"/>
+            </a:schemeClr>
+          </a:lnRef>
+          <a:fillRef idx="1">
+            <a:schemeClr val="accent1"/>
+          </a:fillRef>
+          <a:effectRef idx="0">
+            <a:schemeClr val="accent1"/>
+          </a:effectRef>
+          <a:fontRef idx="minor">
+            <a:schemeClr val="lt1"/>
+          </a:fontRef>
+        </p:style>
+        <p:txBody>
+          <a:bodyPr rtlCol="0" anchor="ctr"/>
+          <a:lstStyle/>
+          <a:p>
+            <a:pPr algn="ctr"/>
+            <a:endParaRPr lang="en-US"/>
+          </a:p>
+        </p:txBody>
+      </p:sp>
+      <p:sp>
+        <p:nvSpPr>
+          <p:cNvPr id="396" name="Rectangle 395"/>
+          <p:cNvSpPr/>
+          <p:nvPr/>
+        </p:nvSpPr>
+        <p:spPr>
+          <a:xfrm>
+            <a:off x="1436156" y="5646000"/>
+            <a:ext cx="138346" cy="482600"/>
+          </a:xfrm>
+          <a:prstGeom prst="rect">
+            <a:avLst/>
+          </a:prstGeom>
+          <a:solidFill>
+            <a:schemeClr val="bg1"/>
+          </a:solidFill>
+          <a:ln w="12700">
+            <a:solidFill>
+              <a:schemeClr val="tx1"/>
+            </a:solidFill>
+          </a:ln>
+        </p:spPr>
+        <p:style>
+          <a:lnRef idx="2">
+            <a:schemeClr val="accent1">
+              <a:shade val="50000"/>
+            </a:schemeClr>
+          </a:lnRef>
+          <a:fillRef idx="1">
+            <a:schemeClr val="accent1"/>
+          </a:fillRef>
+          <a:effectRef idx="0">
+            <a:schemeClr val="accent1"/>
+          </a:effectRef>
+          <a:fontRef idx="minor">
+            <a:schemeClr val="lt1"/>
+          </a:fontRef>
+        </p:style>
+        <p:txBody>
+          <a:bodyPr rtlCol="0" anchor="ctr"/>
+          <a:lstStyle/>
+          <a:p>
+            <a:pPr algn="ctr"/>
+            <a:endParaRPr lang="en-US"/>
+          </a:p>
+        </p:txBody>
+      </p:sp>
+      <p:cxnSp>
+        <p:nvCxnSpPr>
+          <p:cNvPr id="429" name="Straight Connector 428"/>
+          <p:cNvCxnSpPr/>
+          <p:nvPr/>
+        </p:nvCxnSpPr>
+        <p:spPr>
+          <a:xfrm rot="5400000">
+            <a:off x="3098395" y="5957150"/>
+            <a:ext cx="552450" cy="0"/>
+          </a:xfrm>
+          <a:prstGeom prst="line">
+            <a:avLst/>
+          </a:prstGeom>
+          <a:ln w="19050">
+            <a:solidFill>
+              <a:schemeClr val="tx1"/>
+            </a:solidFill>
+          </a:ln>
+        </p:spPr>
+        <p:style>
+          <a:lnRef idx="1">
+            <a:schemeClr val="accent1"/>
+          </a:lnRef>
+          <a:fillRef idx="0">
+            <a:schemeClr val="accent1"/>
+          </a:fillRef>
+          <a:effectRef idx="0">
+            <a:schemeClr val="accent1"/>
+          </a:effectRef>
+          <a:fontRef idx="minor">
+            <a:schemeClr val="tx1"/>
+          </a:fontRef>
+        </p:style>
+      </p:cxnSp>
+      <p:sp>
+        <p:nvSpPr>
+          <p:cNvPr id="430" name="Rectangle 429"/>
+          <p:cNvSpPr/>
+          <p:nvPr/>
+        </p:nvSpPr>
+        <p:spPr>
+          <a:xfrm rot="5400000">
+            <a:off x="3303464" y="5663415"/>
+            <a:ext cx="128587" cy="330994"/>
+          </a:xfrm>
+          <a:prstGeom prst="rect">
+            <a:avLst/>
+          </a:prstGeom>
+          <a:solidFill>
+            <a:srgbClr val="E46B09"/>
+          </a:solidFill>
+          <a:ln w="12700">
+            <a:solidFill>
+              <a:schemeClr val="tx1"/>
+            </a:solidFill>
+          </a:ln>
+        </p:spPr>
+        <p:style>
+          <a:lnRef idx="2">
+            <a:schemeClr val="accent1">
+              <a:shade val="50000"/>
+            </a:schemeClr>
+          </a:lnRef>
+          <a:fillRef idx="1">
+            <a:schemeClr val="accent1"/>
+          </a:fillRef>
+          <a:effectRef idx="0">
+            <a:schemeClr val="accent1"/>
+          </a:effectRef>
+          <a:fontRef idx="minor">
+            <a:schemeClr val="lt1"/>
+          </a:fontRef>
+        </p:style>
+        <p:txBody>
+          <a:bodyPr rtlCol="0" anchor="ctr"/>
+          <a:lstStyle/>
+          <a:p>
+            <a:pPr algn="ctr"/>
+            <a:endParaRPr lang="en-US"/>
+          </a:p>
+        </p:txBody>
+      </p:sp>
+      <p:sp>
+        <p:nvSpPr>
+          <p:cNvPr id="431" name="Rectangle 430"/>
+          <p:cNvSpPr/>
+          <p:nvPr/>
+        </p:nvSpPr>
+        <p:spPr>
+          <a:xfrm rot="5400000">
+            <a:off x="3304678" y="5814501"/>
+            <a:ext cx="138346" cy="482600"/>
+          </a:xfrm>
+          <a:prstGeom prst="rect">
+            <a:avLst/>
+          </a:prstGeom>
+          <a:solidFill>
+            <a:schemeClr val="bg1"/>
+          </a:solidFill>
+          <a:ln w="12700">
+            <a:solidFill>
+              <a:schemeClr val="tx1"/>
+            </a:solidFill>
+          </a:ln>
+        </p:spPr>
+        <p:style>
+          <a:lnRef idx="2">
+            <a:schemeClr val="accent1">
+              <a:shade val="50000"/>
+            </a:schemeClr>
+          </a:lnRef>
+          <a:fillRef idx="1">
+            <a:schemeClr val="accent1"/>
+          </a:fillRef>
+          <a:effectRef idx="0">
+            <a:schemeClr val="accent1"/>
+          </a:effectRef>
+          <a:fontRef idx="minor">
+            <a:schemeClr val="lt1"/>
+          </a:fontRef>
+        </p:style>
+        <p:txBody>
+          <a:bodyPr rtlCol="0" anchor="ctr"/>
+          <a:lstStyle/>
+          <a:p>
+            <a:pPr algn="ctr"/>
+            <a:endParaRPr lang="en-US"/>
+          </a:p>
+        </p:txBody>
+      </p:sp>
+      <p:cxnSp>
+        <p:nvCxnSpPr>
+          <p:cNvPr id="484" name="Straight Connector 483"/>
+          <p:cNvCxnSpPr/>
+          <p:nvPr/>
+        </p:nvCxnSpPr>
+        <p:spPr>
+          <a:xfrm>
+            <a:off x="5421678" y="5606719"/>
+            <a:ext cx="0" cy="561163"/>
+          </a:xfrm>
+          <a:prstGeom prst="line">
+            <a:avLst/>
+          </a:prstGeom>
+          <a:ln w="25400">
+            <a:solidFill>
+              <a:schemeClr val="tx1"/>
+            </a:solidFill>
+          </a:ln>
+        </p:spPr>
+        <p:style>
+          <a:lnRef idx="1">
+            <a:schemeClr val="accent1"/>
+          </a:lnRef>
+          <a:fillRef idx="0">
+            <a:schemeClr val="accent1"/>
+          </a:fillRef>
+          <a:effectRef idx="0">
+            <a:schemeClr val="accent1"/>
+          </a:effectRef>
+          <a:fontRef idx="minor">
+            <a:schemeClr val="tx1"/>
+          </a:fontRef>
+        </p:style>
+      </p:cxnSp>
+      <p:cxnSp>
+        <p:nvCxnSpPr>
+          <p:cNvPr id="491" name="Straight Connector 490"/>
+          <p:cNvCxnSpPr/>
+          <p:nvPr/>
+        </p:nvCxnSpPr>
+        <p:spPr>
+          <a:xfrm>
+            <a:off x="5142278" y="5884126"/>
+            <a:ext cx="558800" cy="0"/>
+          </a:xfrm>
+          <a:prstGeom prst="line">
+            <a:avLst/>
+          </a:prstGeom>
+          <a:ln w="25400">
+            <a:solidFill>
+              <a:schemeClr val="tx1"/>
+            </a:solidFill>
+          </a:ln>
+        </p:spPr>
+        <p:style>
+          <a:lnRef idx="1">
+            <a:schemeClr val="accent1"/>
+          </a:lnRef>
+          <a:fillRef idx="0">
+            <a:schemeClr val="accent1"/>
+          </a:fillRef>
+          <a:effectRef idx="0">
+            <a:schemeClr val="accent1"/>
+          </a:effectRef>
+          <a:fontRef idx="minor">
+            <a:schemeClr val="tx1"/>
+          </a:fontRef>
+        </p:style>
+      </p:cxnSp>
+      <p:sp>
+        <p:nvSpPr>
+          <p:cNvPr id="496" name="Rectangle 495"/>
+          <p:cNvSpPr/>
+          <p:nvPr/>
+        </p:nvSpPr>
+        <p:spPr>
+          <a:xfrm>
+            <a:off x="5180669" y="5787390"/>
+            <a:ext cx="476248" cy="209011"/>
+          </a:xfrm>
+          <a:prstGeom prst="rect">
+            <a:avLst/>
+          </a:prstGeom>
+          <a:solidFill>
+            <a:schemeClr val="bg1"/>
+          </a:solidFill>
+          <a:ln w="12700">
+            <a:solidFill>
+              <a:schemeClr val="tx1"/>
+            </a:solidFill>
+          </a:ln>
+        </p:spPr>
+        <p:style>
+          <a:lnRef idx="2">
+            <a:schemeClr val="accent1">
+              <a:shade val="50000"/>
+            </a:schemeClr>
+          </a:lnRef>
+          <a:fillRef idx="1">
+            <a:schemeClr val="accent1"/>
+          </a:fillRef>
+          <a:effectRef idx="0">
+            <a:schemeClr val="accent1"/>
+          </a:effectRef>
+          <a:fontRef idx="minor">
+            <a:schemeClr val="lt1"/>
+          </a:fontRef>
+        </p:style>
+        <p:txBody>
+          <a:bodyPr rtlCol="0" anchor="ctr"/>
+          <a:lstStyle/>
+          <a:p>
+            <a:pPr algn="ctr"/>
+            <a:endParaRPr lang="en-US"/>
+          </a:p>
+        </p:txBody>
+      </p:sp>
+      <p:sp>
+        <p:nvSpPr>
+          <p:cNvPr id="507" name="Rectangle 506"/>
+          <p:cNvSpPr/>
+          <p:nvPr/>
+        </p:nvSpPr>
+        <p:spPr>
+          <a:xfrm>
+            <a:off x="5246604" y="5821206"/>
+            <a:ext cx="339617" cy="135363"/>
+          </a:xfrm>
+          <a:prstGeom prst="rect">
+            <a:avLst/>
+          </a:prstGeom>
+          <a:solidFill>
+            <a:srgbClr val="E46B09"/>
+          </a:solidFill>
+          <a:ln w="12700">
+            <a:solidFill>
+              <a:schemeClr val="tx1"/>
+            </a:solidFill>
+          </a:ln>
+        </p:spPr>
+        <p:style>
+          <a:lnRef idx="2">
+            <a:schemeClr val="accent1">
+              <a:shade val="50000"/>
+            </a:schemeClr>
+          </a:lnRef>
+          <a:fillRef idx="1">
+            <a:schemeClr val="accent1"/>
+          </a:fillRef>
+          <a:effectRef idx="0">
+            <a:schemeClr val="accent1"/>
+          </a:effectRef>
+          <a:fontRef idx="minor">
+            <a:schemeClr val="lt1"/>
+          </a:fontRef>
+        </p:style>
+        <p:txBody>
+          <a:bodyPr rtlCol="0" anchor="ctr"/>
+          <a:lstStyle/>
+          <a:p>
+            <a:pPr algn="ctr"/>
+            <a:endParaRPr lang="en-US"/>
+          </a:p>
+        </p:txBody>
+      </p:sp>
     </p:spTree>
     <p:extLst>
       <p:ext uri="{BB962C8B-B14F-4D97-AF65-F5344CB8AC3E}">
-        <p14:creationId xmlns:p14="http://schemas.microsoft.com/office/powerpoint/2010/main" val="1863451993"/>
+        <p14:creationId xmlns:p14="http://schemas.microsoft.com/office/powerpoint/2010/main" val="318608705"/>
       </p:ext>
     </p:extLst>
   </p:cSld>
   <p:clrMapOvr>
     <a:masterClrMapping/>
   </p:clrMapOvr>
-  <p:timing>
-    <p:tnLst>
-      <p:par>
-        <p:cTn id="1" dur="indefinite" restart="never" nodeType="tmRoot"/>
-      </p:par>
-    </p:tnLst>
-  </p:timing>
+</p:sld>
+</file>
+
+<file path=ppt/slides/slide3.xml><?xml version="1.0" encoding="utf-8"?>
+<p:sld xmlns:a="http://schemas.openxmlformats.org/drawingml/2006/main" xmlns:r="http://schemas.openxmlformats.org/officeDocument/2006/relationships" xmlns:p="http://schemas.openxmlformats.org/presentationml/2006/main">
+  <p:cSld>
+    <p:bg>
+      <p:bgPr>
+        <a:solidFill>
+          <a:schemeClr val="bg1">
+            <a:lumMod val="95000"/>
+          </a:schemeClr>
+        </a:solidFill>
+        <a:effectLst/>
+      </p:bgPr>
+    </p:bg>
+    <p:spTree>
+      <p:nvGrpSpPr>
+        <p:cNvPr id="1" name=""/>
+        <p:cNvGrpSpPr/>
+        <p:nvPr/>
+      </p:nvGrpSpPr>
+      <p:grpSpPr>
+        <a:xfrm>
+          <a:off x="0" y="0"/>
+          <a:ext cx="0" cy="0"/>
+          <a:chOff x="0" y="0"/>
+          <a:chExt cx="0" cy="0"/>
+        </a:xfrm>
+      </p:grpSpPr>
+      <p:sp>
+        <p:nvSpPr>
+          <p:cNvPr id="4" name="TextBox 3"/>
+          <p:cNvSpPr txBox="1"/>
+          <p:nvPr/>
+        </p:nvSpPr>
+        <p:spPr>
+          <a:xfrm>
+            <a:off x="3307584" y="706170"/>
+            <a:ext cx="2528834" cy="707886"/>
+          </a:xfrm>
+          <a:prstGeom prst="rect">
+            <a:avLst/>
+          </a:prstGeom>
+          <a:noFill/>
+        </p:spPr>
+        <p:txBody>
+          <a:bodyPr wrap="none" rtlCol="0">
+            <a:spAutoFit/>
+          </a:bodyPr>
+          <a:lstStyle/>
+          <a:p>
+            <a:pPr algn="ctr"/>
+            <a:r>
+              <a:rPr lang="en-US" sz="4000" dirty="0"/>
+              <a:t>Adjoin Icon</a:t>
+            </a:r>
+          </a:p>
+        </p:txBody>
+      </p:sp>
+    </p:spTree>
+    <p:extLst>
+      <p:ext uri="{BB962C8B-B14F-4D97-AF65-F5344CB8AC3E}">
+        <p14:creationId xmlns:p14="http://schemas.microsoft.com/office/powerpoint/2010/main" val="2414115836"/>
+      </p:ext>
+    </p:extLst>
+  </p:cSld>
+  <p:clrMapOvr>
+    <a:masterClrMapping/>
+  </p:clrMapOvr>
+</p:sld>
+</file>
+
+<file path=ppt/slides/slide4.xml><?xml version="1.0" encoding="utf-8"?>
+<p:sld xmlns:a="http://schemas.openxmlformats.org/drawingml/2006/main" xmlns:r="http://schemas.openxmlformats.org/officeDocument/2006/relationships" xmlns:p="http://schemas.openxmlformats.org/presentationml/2006/main">
+  <p:cSld>
+    <p:bg>
+      <p:bgPr>
+        <a:solidFill>
+          <a:schemeClr val="bg1">
+            <a:lumMod val="95000"/>
+          </a:schemeClr>
+        </a:solidFill>
+        <a:effectLst/>
+      </p:bgPr>
+    </p:bg>
+    <p:spTree>
+      <p:nvGrpSpPr>
+        <p:cNvPr id="1" name=""/>
+        <p:cNvGrpSpPr/>
+        <p:nvPr/>
+      </p:nvGrpSpPr>
+      <p:grpSpPr>
+        <a:xfrm>
+          <a:off x="0" y="0"/>
+          <a:ext cx="0" cy="0"/>
+          <a:chOff x="0" y="0"/>
+          <a:chExt cx="0" cy="0"/>
+        </a:xfrm>
+      </p:grpSpPr>
+      <p:sp>
+        <p:nvSpPr>
+          <p:cNvPr id="4" name="TextBox 3"/>
+          <p:cNvSpPr txBox="1"/>
+          <p:nvPr/>
+        </p:nvSpPr>
+        <p:spPr>
+          <a:xfrm>
+            <a:off x="2953355" y="706170"/>
+            <a:ext cx="3237297" cy="707886"/>
+          </a:xfrm>
+          <a:prstGeom prst="rect">
+            <a:avLst/>
+          </a:prstGeom>
+          <a:noFill/>
+        </p:spPr>
+        <p:txBody>
+          <a:bodyPr wrap="none" rtlCol="0">
+            <a:spAutoFit/>
+          </a:bodyPr>
+          <a:lstStyle/>
+          <a:p>
+            <a:pPr algn="ctr"/>
+            <a:r>
+              <a:rPr lang="en-US" sz="4000" dirty="0"/>
+              <a:t>Distribute Icon</a:t>
+            </a:r>
+          </a:p>
+        </p:txBody>
+      </p:sp>
+    </p:spTree>
+    <p:extLst>
+      <p:ext uri="{BB962C8B-B14F-4D97-AF65-F5344CB8AC3E}">
+        <p14:creationId xmlns:p14="http://schemas.microsoft.com/office/powerpoint/2010/main" val="2271058716"/>
+      </p:ext>
+    </p:extLst>
+  </p:cSld>
+  <p:clrMapOvr>
+    <a:masterClrMapping/>
+  </p:clrMapOvr>
+</p:sld>
+</file>
+
+<file path=ppt/slides/slide5.xml><?xml version="1.0" encoding="utf-8"?>
+<p:sld xmlns:a="http://schemas.openxmlformats.org/drawingml/2006/main" xmlns:r="http://schemas.openxmlformats.org/officeDocument/2006/relationships" xmlns:p="http://schemas.openxmlformats.org/presentationml/2006/main">
+  <p:cSld>
+    <p:bg>
+      <p:bgPr>
+        <a:solidFill>
+          <a:schemeClr val="bg1">
+            <a:lumMod val="95000"/>
+          </a:schemeClr>
+        </a:solidFill>
+        <a:effectLst/>
+      </p:bgPr>
+    </p:bg>
+    <p:spTree>
+      <p:nvGrpSpPr>
+        <p:cNvPr id="1" name=""/>
+        <p:cNvGrpSpPr/>
+        <p:nvPr/>
+      </p:nvGrpSpPr>
+      <p:grpSpPr>
+        <a:xfrm>
+          <a:off x="0" y="0"/>
+          <a:ext cx="0" cy="0"/>
+          <a:chOff x="0" y="0"/>
+          <a:chExt cx="0" cy="0"/>
+        </a:xfrm>
+      </p:grpSpPr>
+      <p:sp>
+        <p:nvSpPr>
+          <p:cNvPr id="4" name="TextBox 3"/>
+          <p:cNvSpPr txBox="1"/>
+          <p:nvPr/>
+        </p:nvSpPr>
+        <p:spPr>
+          <a:xfrm>
+            <a:off x="3144884" y="706170"/>
+            <a:ext cx="2854243" cy="707886"/>
+          </a:xfrm>
+          <a:prstGeom prst="rect">
+            <a:avLst/>
+          </a:prstGeom>
+          <a:noFill/>
+        </p:spPr>
+        <p:txBody>
+          <a:bodyPr wrap="none" rtlCol="0">
+            <a:spAutoFit/>
+          </a:bodyPr>
+          <a:lstStyle/>
+          <a:p>
+            <a:pPr algn="ctr"/>
+            <a:r>
+              <a:rPr lang="en-US" sz="4000" dirty="0"/>
+              <a:t>Reorder Icon</a:t>
+            </a:r>
+          </a:p>
+        </p:txBody>
+      </p:sp>
+    </p:spTree>
+    <p:extLst>
+      <p:ext uri="{BB962C8B-B14F-4D97-AF65-F5344CB8AC3E}">
+        <p14:creationId xmlns:p14="http://schemas.microsoft.com/office/powerpoint/2010/main" val="4145819762"/>
+      </p:ext>
+    </p:extLst>
+  </p:cSld>
+  <p:clrMapOvr>
+    <a:masterClrMapping/>
+  </p:clrMapOvr>
+</p:sld>
+</file>
+
+<file path=ppt/slides/slide6.xml><?xml version="1.0" encoding="utf-8"?>
+<p:sld xmlns:a="http://schemas.openxmlformats.org/drawingml/2006/main" xmlns:r="http://schemas.openxmlformats.org/officeDocument/2006/relationships" xmlns:p="http://schemas.openxmlformats.org/presentationml/2006/main">
+  <p:cSld>
+    <p:bg>
+      <p:bgPr>
+        <a:solidFill>
+          <a:schemeClr val="bg1">
+            <a:lumMod val="95000"/>
+          </a:schemeClr>
+        </a:solidFill>
+        <a:effectLst/>
+      </p:bgPr>
+    </p:bg>
+    <p:spTree>
+      <p:nvGrpSpPr>
+        <p:cNvPr id="1" name=""/>
+        <p:cNvGrpSpPr/>
+        <p:nvPr/>
+      </p:nvGrpSpPr>
+      <p:grpSpPr>
+        <a:xfrm>
+          <a:off x="0" y="0"/>
+          <a:ext cx="0" cy="0"/>
+          <a:chOff x="0" y="0"/>
+          <a:chExt cx="0" cy="0"/>
+        </a:xfrm>
+      </p:grpSpPr>
+      <p:sp>
+        <p:nvSpPr>
+          <p:cNvPr id="4" name="TextBox 3"/>
+          <p:cNvSpPr txBox="1"/>
+          <p:nvPr/>
+        </p:nvSpPr>
+        <p:spPr>
+          <a:xfrm>
+            <a:off x="2761702" y="706170"/>
+            <a:ext cx="3620608" cy="707886"/>
+          </a:xfrm>
+          <a:prstGeom prst="rect">
+            <a:avLst/>
+          </a:prstGeom>
+          <a:noFill/>
+        </p:spPr>
+        <p:txBody>
+          <a:bodyPr wrap="none" rtlCol="0">
+            <a:spAutoFit/>
+          </a:bodyPr>
+          <a:lstStyle/>
+          <a:p>
+            <a:pPr algn="ctr"/>
+            <a:r>
+              <a:rPr lang="en-US" sz="4000" dirty="0" err="1"/>
+              <a:t>Reorientate</a:t>
+            </a:r>
+            <a:r>
+              <a:rPr lang="en-US" sz="4000" dirty="0"/>
+              <a:t> Icon</a:t>
+            </a:r>
+          </a:p>
+        </p:txBody>
+      </p:sp>
+    </p:spTree>
+    <p:extLst>
+      <p:ext uri="{BB962C8B-B14F-4D97-AF65-F5344CB8AC3E}">
+        <p14:creationId xmlns:p14="http://schemas.microsoft.com/office/powerpoint/2010/main" val="393591708"/>
+      </p:ext>
+    </p:extLst>
+  </p:cSld>
+  <p:clrMapOvr>
+    <a:masterClrMapping/>
+  </p:clrMapOvr>
 </p:sld>
 </file>
 

</xml_diff>

<commit_message>
Added Powerpoint version of Distribute Icons
#35
</commit_message>
<xml_diff>
--- a/doc/Icons-PositionsLab.pptx
+++ b/doc/Icons-PositionsLab.pptx
@@ -3429,7 +3429,7 @@
         </p:nvGrpSpPr>
         <p:grpSpPr>
           <a:xfrm>
-            <a:off x="7638765" y="5649817"/>
+            <a:off x="8394669" y="7088473"/>
             <a:ext cx="838200" cy="838200"/>
             <a:chOff x="7638765" y="5649817"/>
             <a:chExt cx="838200" cy="838200"/>
@@ -3722,7 +3722,7 @@
         </p:nvGrpSpPr>
         <p:grpSpPr>
           <a:xfrm>
-            <a:off x="2577501" y="2848729"/>
+            <a:off x="4152900" y="2848729"/>
             <a:ext cx="838200" cy="856097"/>
             <a:chOff x="2640875" y="3228975"/>
             <a:chExt cx="838200" cy="856097"/>
@@ -4096,7 +4096,7 @@
         </p:nvSpPr>
         <p:spPr>
           <a:xfrm>
-            <a:off x="3359682" y="729400"/>
+            <a:off x="3359682" y="717758"/>
             <a:ext cx="2424638" cy="707886"/>
           </a:xfrm>
           <a:prstGeom prst="rect">
@@ -4126,7 +4126,7 @@
         </p:nvCxnSpPr>
         <p:spPr>
           <a:xfrm flipH="1">
-            <a:off x="1133449" y="3265418"/>
+            <a:off x="1133449" y="3230492"/>
             <a:ext cx="2382" cy="552450"/>
           </a:xfrm>
           <a:prstGeom prst="line">
@@ -4161,7 +4161,7 @@
         </p:nvSpPr>
         <p:spPr>
           <a:xfrm>
-            <a:off x="1192980" y="3293993"/>
+            <a:off x="1192980" y="3259067"/>
             <a:ext cx="340518" cy="145256"/>
           </a:xfrm>
           <a:prstGeom prst="rect">
@@ -4209,7 +4209,7 @@
         </p:nvSpPr>
         <p:spPr>
           <a:xfrm>
-            <a:off x="1192980" y="3498780"/>
+            <a:off x="1192980" y="3463854"/>
             <a:ext cx="486928" cy="145256"/>
           </a:xfrm>
           <a:prstGeom prst="rect">
@@ -4257,7 +4257,7 @@
         </p:nvCxnSpPr>
         <p:spPr>
           <a:xfrm flipH="1">
-            <a:off x="1212463" y="3741667"/>
+            <a:off x="1212463" y="3706741"/>
             <a:ext cx="373857" cy="0"/>
           </a:xfrm>
           <a:prstGeom prst="straightConnector1">
@@ -4293,7 +4293,7 @@
         </p:nvSpPr>
         <p:spPr>
           <a:xfrm>
-            <a:off x="896186" y="2166686"/>
+            <a:off x="896186" y="2143402"/>
             <a:ext cx="1020985" cy="369332"/>
           </a:xfrm>
           <a:prstGeom prst="rect">
@@ -4322,7 +4322,7 @@
         </p:nvSpPr>
         <p:spPr>
           <a:xfrm>
-            <a:off x="2813356" y="2166686"/>
+            <a:off x="2813356" y="2143402"/>
             <a:ext cx="1190839" cy="369332"/>
           </a:xfrm>
           <a:prstGeom prst="rect">
@@ -4353,7 +4353,7 @@
         </p:nvSpPr>
         <p:spPr>
           <a:xfrm>
-            <a:off x="4900381" y="2166686"/>
+            <a:off x="4900381" y="2143402"/>
             <a:ext cx="1042593" cy="369332"/>
           </a:xfrm>
           <a:prstGeom prst="rect">
@@ -4384,7 +4384,7 @@
         </p:nvSpPr>
         <p:spPr>
           <a:xfrm>
-            <a:off x="6839160" y="2166686"/>
+            <a:off x="6839160" y="2143402"/>
             <a:ext cx="1408655" cy="369332"/>
           </a:xfrm>
           <a:prstGeom prst="rect">
@@ -4413,7 +4413,7 @@
         </p:nvCxnSpPr>
         <p:spPr>
           <a:xfrm>
-            <a:off x="3679623" y="3265418"/>
+            <a:off x="3679623" y="3230492"/>
             <a:ext cx="2382" cy="552450"/>
           </a:xfrm>
           <a:prstGeom prst="line">
@@ -4448,7 +4448,7 @@
         </p:nvSpPr>
         <p:spPr>
           <a:xfrm flipH="1">
-            <a:off x="3281956" y="3293993"/>
+            <a:off x="3281956" y="3259067"/>
             <a:ext cx="340518" cy="145256"/>
           </a:xfrm>
           <a:prstGeom prst="rect">
@@ -4496,7 +4496,7 @@
         </p:nvSpPr>
         <p:spPr>
           <a:xfrm flipH="1">
-            <a:off x="3135546" y="3498780"/>
+            <a:off x="3135546" y="3463854"/>
             <a:ext cx="486928" cy="145256"/>
           </a:xfrm>
           <a:prstGeom prst="rect">
@@ -4544,7 +4544,7 @@
         </p:nvCxnSpPr>
         <p:spPr>
           <a:xfrm>
-            <a:off x="3229134" y="3741667"/>
+            <a:off x="3229134" y="3706741"/>
             <a:ext cx="373857" cy="0"/>
           </a:xfrm>
           <a:prstGeom prst="straightConnector1">
@@ -4580,7 +4580,7 @@
         </p:nvCxnSpPr>
         <p:spPr>
           <a:xfrm rot="16200000">
-            <a:off x="5423483" y="2987389"/>
+            <a:off x="5423483" y="2958454"/>
             <a:ext cx="2382" cy="552450"/>
           </a:xfrm>
           <a:prstGeom prst="line">
@@ -4615,7 +4615,7 @@
         </p:nvSpPr>
         <p:spPr>
           <a:xfrm rot="16200000" flipH="1">
-            <a:off x="5079393" y="3419585"/>
+            <a:off x="5079393" y="3390650"/>
             <a:ext cx="340518" cy="145256"/>
           </a:xfrm>
           <a:prstGeom prst="rect">
@@ -4663,7 +4663,7 @@
         </p:nvSpPr>
         <p:spPr>
           <a:xfrm rot="16200000" flipH="1">
-            <a:off x="5210976" y="3492790"/>
+            <a:off x="5210976" y="3463855"/>
             <a:ext cx="486928" cy="145256"/>
           </a:xfrm>
           <a:prstGeom prst="rect">
@@ -4711,7 +4711,7 @@
         </p:nvCxnSpPr>
         <p:spPr>
           <a:xfrm rot="16200000">
-            <a:off x="5437769" y="3528365"/>
+            <a:off x="5437769" y="3499430"/>
             <a:ext cx="373857" cy="0"/>
           </a:xfrm>
           <a:prstGeom prst="straightConnector1">
@@ -4747,7 +4747,7 @@
         </p:nvCxnSpPr>
         <p:spPr>
           <a:xfrm rot="5400000" flipV="1">
-            <a:off x="7545292" y="3534462"/>
+            <a:off x="7545292" y="3502531"/>
             <a:ext cx="2382" cy="552450"/>
           </a:xfrm>
           <a:prstGeom prst="line">
@@ -4782,7 +4782,7 @@
         </p:nvSpPr>
         <p:spPr>
           <a:xfrm rot="5400000" flipH="1" flipV="1">
-            <a:off x="7201202" y="3509460"/>
+            <a:off x="7201202" y="3477529"/>
             <a:ext cx="340518" cy="145256"/>
           </a:xfrm>
           <a:prstGeom prst="rect">
@@ -4830,7 +4830,7 @@
         </p:nvSpPr>
         <p:spPr>
           <a:xfrm rot="5400000" flipH="1" flipV="1">
-            <a:off x="7332784" y="3436255"/>
+            <a:off x="7332784" y="3404324"/>
             <a:ext cx="486928" cy="145256"/>
           </a:xfrm>
           <a:prstGeom prst="rect">
@@ -4878,7 +4878,7 @@
         </p:nvCxnSpPr>
         <p:spPr>
           <a:xfrm rot="5400000" flipV="1">
-            <a:off x="7559578" y="3545935"/>
+            <a:off x="7559578" y="3514004"/>
             <a:ext cx="373857" cy="0"/>
           </a:xfrm>
           <a:prstGeom prst="straightConnector1">
@@ -4914,7 +4914,7 @@
         </p:nvSpPr>
         <p:spPr>
           <a:xfrm>
-            <a:off x="502520" y="4547268"/>
+            <a:off x="502520" y="4500700"/>
             <a:ext cx="1808316" cy="369332"/>
           </a:xfrm>
           <a:prstGeom prst="rect">
@@ -4943,7 +4943,7 @@
         </p:nvSpPr>
         <p:spPr>
           <a:xfrm>
-            <a:off x="2623336" y="4547268"/>
+            <a:off x="2623336" y="4500700"/>
             <a:ext cx="1570879" cy="369332"/>
           </a:xfrm>
           <a:prstGeom prst="rect">
@@ -4974,7 +4974,7 @@
         </p:nvSpPr>
         <p:spPr>
           <a:xfrm>
-            <a:off x="5015060" y="4547268"/>
+            <a:off x="5015060" y="4500700"/>
             <a:ext cx="813236" cy="369332"/>
           </a:xfrm>
           <a:prstGeom prst="rect">
@@ -5003,7 +5003,7 @@
         </p:nvCxnSpPr>
         <p:spPr>
           <a:xfrm>
-            <a:off x="1130453" y="5886531"/>
+            <a:off x="1130453" y="5863247"/>
             <a:ext cx="552450" cy="0"/>
           </a:xfrm>
           <a:prstGeom prst="line">
@@ -5038,7 +5038,7 @@
         </p:nvSpPr>
         <p:spPr>
           <a:xfrm>
-            <a:off x="1214146" y="5727897"/>
+            <a:off x="1214146" y="5704613"/>
             <a:ext cx="128587" cy="330994"/>
           </a:xfrm>
           <a:prstGeom prst="rect">
@@ -5086,7 +5086,7 @@
         </p:nvSpPr>
         <p:spPr>
           <a:xfrm>
-            <a:off x="1436156" y="5646000"/>
+            <a:off x="1436156" y="5622716"/>
             <a:ext cx="138346" cy="482600"/>
           </a:xfrm>
           <a:prstGeom prst="rect">
@@ -5134,7 +5134,7 @@
         </p:nvCxnSpPr>
         <p:spPr>
           <a:xfrm rot="5400000">
-            <a:off x="3098395" y="5957150"/>
+            <a:off x="3098395" y="5864016"/>
             <a:ext cx="552450" cy="0"/>
           </a:xfrm>
           <a:prstGeom prst="line">
@@ -5169,7 +5169,7 @@
         </p:nvSpPr>
         <p:spPr>
           <a:xfrm rot="5400000">
-            <a:off x="3303464" y="5663415"/>
+            <a:off x="3303464" y="5570281"/>
             <a:ext cx="128587" cy="330994"/>
           </a:xfrm>
           <a:prstGeom prst="rect">
@@ -5217,7 +5217,7 @@
         </p:nvSpPr>
         <p:spPr>
           <a:xfrm rot="5400000">
-            <a:off x="3304678" y="5814501"/>
+            <a:off x="3304678" y="5721367"/>
             <a:ext cx="138346" cy="482600"/>
           </a:xfrm>
           <a:prstGeom prst="rect">
@@ -5265,7 +5265,7 @@
         </p:nvCxnSpPr>
         <p:spPr>
           <a:xfrm>
-            <a:off x="5421678" y="5606719"/>
+            <a:off x="5421678" y="5583435"/>
             <a:ext cx="0" cy="561163"/>
           </a:xfrm>
           <a:prstGeom prst="line">
@@ -5300,7 +5300,7 @@
         </p:nvCxnSpPr>
         <p:spPr>
           <a:xfrm>
-            <a:off x="5142278" y="5884126"/>
+            <a:off x="5142278" y="5860842"/>
             <a:ext cx="558800" cy="0"/>
           </a:xfrm>
           <a:prstGeom prst="line">
@@ -5335,7 +5335,7 @@
         </p:nvSpPr>
         <p:spPr>
           <a:xfrm>
-            <a:off x="5180669" y="5787390"/>
+            <a:off x="5180669" y="5764106"/>
             <a:ext cx="476248" cy="209011"/>
           </a:xfrm>
           <a:prstGeom prst="rect">
@@ -5383,7 +5383,7 @@
         </p:nvSpPr>
         <p:spPr>
           <a:xfrm>
-            <a:off x="5246604" y="5821206"/>
+            <a:off x="5246604" y="5797922"/>
             <a:ext cx="339617" cy="135363"/>
           </a:xfrm>
           <a:prstGeom prst="rect">
@@ -5471,8 +5471,8 @@
         </p:nvSpPr>
         <p:spPr>
           <a:xfrm>
-            <a:off x="3307584" y="706170"/>
-            <a:ext cx="2528834" cy="707886"/>
+            <a:off x="3207396" y="706170"/>
+            <a:ext cx="2729210" cy="707886"/>
           </a:xfrm>
           <a:prstGeom prst="rect">
             <a:avLst/>
@@ -5488,7 +5488,7 @@
             <a:pPr algn="ctr"/>
             <a:r>
               <a:rPr lang="en-US" sz="4000" dirty="0"/>
-              <a:t>Adjoin Icon</a:t>
+              <a:t>Adjoin Icons</a:t>
             </a:r>
           </a:p>
         </p:txBody>
@@ -5541,8 +5541,8 @@
         </p:nvSpPr>
         <p:spPr>
           <a:xfrm>
-            <a:off x="2953355" y="706170"/>
-            <a:ext cx="3237297" cy="707886"/>
+            <a:off x="2853164" y="1308274"/>
+            <a:ext cx="3437672" cy="707886"/>
           </a:xfrm>
           <a:prstGeom prst="rect">
             <a:avLst/>
@@ -5558,8 +5558,997 @@
             <a:pPr algn="ctr"/>
             <a:r>
               <a:rPr lang="en-US" sz="4000" dirty="0"/>
-              <a:t>Distribute Icon</a:t>
-            </a:r>
+              <a:t>Distribute Icons</a:t>
+            </a:r>
+          </a:p>
+        </p:txBody>
+      </p:sp>
+      <p:sp>
+        <p:nvSpPr>
+          <p:cNvPr id="2" name="TextBox 1"/>
+          <p:cNvSpPr txBox="1"/>
+          <p:nvPr/>
+        </p:nvSpPr>
+        <p:spPr>
+          <a:xfrm>
+            <a:off x="729512" y="3324434"/>
+            <a:ext cx="1306383" cy="369332"/>
+          </a:xfrm>
+          <a:prstGeom prst="rect">
+            <a:avLst/>
+          </a:prstGeom>
+          <a:noFill/>
+        </p:spPr>
+        <p:txBody>
+          <a:bodyPr wrap="none" rtlCol="0">
+            <a:spAutoFit/>
+          </a:bodyPr>
+          <a:lstStyle/>
+          <a:p>
+            <a:pPr algn="ctr"/>
+            <a:r>
+              <a:rPr lang="en-US" dirty="0"/>
+              <a:t>Horizontally</a:t>
+            </a:r>
+          </a:p>
+        </p:txBody>
+      </p:sp>
+      <p:sp>
+        <p:nvSpPr>
+          <p:cNvPr id="3" name="TextBox 2"/>
+          <p:cNvSpPr txBox="1"/>
+          <p:nvPr/>
+        </p:nvSpPr>
+        <p:spPr>
+          <a:xfrm>
+            <a:off x="2765406" y="3324434"/>
+            <a:ext cx="1046505" cy="369332"/>
+          </a:xfrm>
+          <a:prstGeom prst="rect">
+            <a:avLst/>
+          </a:prstGeom>
+          <a:noFill/>
+        </p:spPr>
+        <p:txBody>
+          <a:bodyPr wrap="none" rtlCol="0">
+            <a:spAutoFit/>
+          </a:bodyPr>
+          <a:lstStyle/>
+          <a:p>
+            <a:pPr algn="ctr"/>
+            <a:r>
+              <a:rPr lang="en-US" dirty="0"/>
+              <a:t>Vertically</a:t>
+            </a:r>
+          </a:p>
+        </p:txBody>
+      </p:sp>
+      <p:sp>
+        <p:nvSpPr>
+          <p:cNvPr id="5" name="TextBox 4"/>
+          <p:cNvSpPr txBox="1"/>
+          <p:nvPr/>
+        </p:nvSpPr>
+        <p:spPr>
+          <a:xfrm>
+            <a:off x="4541423" y="3324434"/>
+            <a:ext cx="2162195" cy="369332"/>
+          </a:xfrm>
+          <a:prstGeom prst="rect">
+            <a:avLst/>
+          </a:prstGeom>
+          <a:noFill/>
+        </p:spPr>
+        <p:txBody>
+          <a:bodyPr wrap="none" rtlCol="0">
+            <a:spAutoFit/>
+          </a:bodyPr>
+          <a:lstStyle/>
+          <a:p>
+            <a:pPr algn="ctr"/>
+            <a:r>
+              <a:rPr lang="en-US" dirty="0"/>
+              <a:t>Between two objects</a:t>
+            </a:r>
+          </a:p>
+        </p:txBody>
+      </p:sp>
+      <p:sp>
+        <p:nvSpPr>
+          <p:cNvPr id="6" name="TextBox 5"/>
+          <p:cNvSpPr txBox="1"/>
+          <p:nvPr/>
+        </p:nvSpPr>
+        <p:spPr>
+          <a:xfrm>
+            <a:off x="7433129" y="3324434"/>
+            <a:ext cx="981359" cy="369332"/>
+          </a:xfrm>
+          <a:prstGeom prst="rect">
+            <a:avLst/>
+          </a:prstGeom>
+          <a:noFill/>
+        </p:spPr>
+        <p:txBody>
+          <a:bodyPr wrap="none" rtlCol="0">
+            <a:spAutoFit/>
+          </a:bodyPr>
+          <a:lstStyle/>
+          <a:p>
+            <a:pPr algn="ctr"/>
+            <a:r>
+              <a:rPr lang="en-US" dirty="0"/>
+              <a:t>In a Grid</a:t>
+            </a:r>
+          </a:p>
+        </p:txBody>
+      </p:sp>
+      <p:cxnSp>
+        <p:nvCxnSpPr>
+          <p:cNvPr id="34" name="Straight Connector 33"/>
+          <p:cNvCxnSpPr/>
+          <p:nvPr/>
+        </p:nvCxnSpPr>
+        <p:spPr>
+          <a:xfrm>
+            <a:off x="3288406" y="5002040"/>
+            <a:ext cx="0" cy="547687"/>
+          </a:xfrm>
+          <a:prstGeom prst="line">
+            <a:avLst/>
+          </a:prstGeom>
+          <a:ln w="25400">
+            <a:solidFill>
+              <a:schemeClr val="tx1"/>
+            </a:solidFill>
+          </a:ln>
+        </p:spPr>
+        <p:style>
+          <a:lnRef idx="1">
+            <a:schemeClr val="accent1"/>
+          </a:lnRef>
+          <a:fillRef idx="0">
+            <a:schemeClr val="accent1"/>
+          </a:fillRef>
+          <a:effectRef idx="0">
+            <a:schemeClr val="accent1"/>
+          </a:effectRef>
+          <a:fontRef idx="minor">
+            <a:schemeClr val="tx1"/>
+          </a:fontRef>
+        </p:style>
+      </p:cxnSp>
+      <p:sp>
+        <p:nvSpPr>
+          <p:cNvPr id="36" name="Rectangle 35"/>
+          <p:cNvSpPr/>
+          <p:nvPr/>
+        </p:nvSpPr>
+        <p:spPr>
+          <a:xfrm>
+            <a:off x="3158124" y="5030616"/>
+            <a:ext cx="251039" cy="123824"/>
+          </a:xfrm>
+          <a:prstGeom prst="rect">
+            <a:avLst/>
+          </a:prstGeom>
+          <a:solidFill>
+            <a:schemeClr val="bg1"/>
+          </a:solidFill>
+          <a:ln w="12700">
+            <a:solidFill>
+              <a:schemeClr val="tx1"/>
+            </a:solidFill>
+          </a:ln>
+        </p:spPr>
+        <p:style>
+          <a:lnRef idx="2">
+            <a:schemeClr val="accent1">
+              <a:shade val="50000"/>
+            </a:schemeClr>
+          </a:lnRef>
+          <a:fillRef idx="1">
+            <a:schemeClr val="accent1"/>
+          </a:fillRef>
+          <a:effectRef idx="0">
+            <a:schemeClr val="accent1"/>
+          </a:effectRef>
+          <a:fontRef idx="minor">
+            <a:schemeClr val="lt1"/>
+          </a:fontRef>
+        </p:style>
+        <p:txBody>
+          <a:bodyPr rtlCol="0" anchor="ctr"/>
+          <a:lstStyle/>
+          <a:p>
+            <a:pPr algn="ctr"/>
+            <a:endParaRPr lang="en-US"/>
+          </a:p>
+        </p:txBody>
+      </p:sp>
+      <p:sp>
+        <p:nvSpPr>
+          <p:cNvPr id="37" name="Rectangle 36"/>
+          <p:cNvSpPr/>
+          <p:nvPr/>
+        </p:nvSpPr>
+        <p:spPr>
+          <a:xfrm>
+            <a:off x="3050968" y="5202064"/>
+            <a:ext cx="475380" cy="134818"/>
+          </a:xfrm>
+          <a:prstGeom prst="rect">
+            <a:avLst/>
+          </a:prstGeom>
+          <a:solidFill>
+            <a:schemeClr val="bg1"/>
+          </a:solidFill>
+          <a:ln w="12700">
+            <a:solidFill>
+              <a:schemeClr val="tx1"/>
+            </a:solidFill>
+          </a:ln>
+        </p:spPr>
+        <p:style>
+          <a:lnRef idx="2">
+            <a:schemeClr val="accent1">
+              <a:shade val="50000"/>
+            </a:schemeClr>
+          </a:lnRef>
+          <a:fillRef idx="1">
+            <a:schemeClr val="accent1"/>
+          </a:fillRef>
+          <a:effectRef idx="0">
+            <a:schemeClr val="accent1"/>
+          </a:effectRef>
+          <a:fontRef idx="minor">
+            <a:schemeClr val="lt1"/>
+          </a:fontRef>
+        </p:style>
+        <p:txBody>
+          <a:bodyPr rtlCol="0" anchor="ctr"/>
+          <a:lstStyle/>
+          <a:p>
+            <a:pPr algn="ctr"/>
+            <a:endParaRPr lang="en-US"/>
+          </a:p>
+        </p:txBody>
+      </p:sp>
+      <p:sp>
+        <p:nvSpPr>
+          <p:cNvPr id="38" name="Rectangle 37"/>
+          <p:cNvSpPr/>
+          <p:nvPr/>
+        </p:nvSpPr>
+        <p:spPr>
+          <a:xfrm>
+            <a:off x="3112391" y="5371104"/>
+            <a:ext cx="335376" cy="134845"/>
+          </a:xfrm>
+          <a:prstGeom prst="rect">
+            <a:avLst/>
+          </a:prstGeom>
+          <a:solidFill>
+            <a:schemeClr val="bg1"/>
+          </a:solidFill>
+          <a:ln w="12700">
+            <a:solidFill>
+              <a:schemeClr val="tx1"/>
+            </a:solidFill>
+          </a:ln>
+        </p:spPr>
+        <p:style>
+          <a:lnRef idx="2">
+            <a:schemeClr val="accent1">
+              <a:shade val="50000"/>
+            </a:schemeClr>
+          </a:lnRef>
+          <a:fillRef idx="1">
+            <a:schemeClr val="accent1"/>
+          </a:fillRef>
+          <a:effectRef idx="0">
+            <a:schemeClr val="accent1"/>
+          </a:effectRef>
+          <a:fontRef idx="minor">
+            <a:schemeClr val="lt1"/>
+          </a:fontRef>
+        </p:style>
+        <p:txBody>
+          <a:bodyPr rtlCol="0" anchor="ctr"/>
+          <a:lstStyle/>
+          <a:p>
+            <a:pPr algn="ctr"/>
+            <a:endParaRPr lang="en-US"/>
+          </a:p>
+        </p:txBody>
+      </p:sp>
+      <p:cxnSp>
+        <p:nvCxnSpPr>
+          <p:cNvPr id="57" name="Straight Connector 56"/>
+          <p:cNvCxnSpPr/>
+          <p:nvPr/>
+        </p:nvCxnSpPr>
+        <p:spPr>
+          <a:xfrm rot="5400000">
+            <a:off x="1418856" y="4929481"/>
+            <a:ext cx="0" cy="547687"/>
+          </a:xfrm>
+          <a:prstGeom prst="line">
+            <a:avLst/>
+          </a:prstGeom>
+          <a:ln w="25400">
+            <a:solidFill>
+              <a:schemeClr val="tx1"/>
+            </a:solidFill>
+          </a:ln>
+        </p:spPr>
+        <p:style>
+          <a:lnRef idx="1">
+            <a:schemeClr val="accent1"/>
+          </a:lnRef>
+          <a:fillRef idx="0">
+            <a:schemeClr val="accent1"/>
+          </a:fillRef>
+          <a:effectRef idx="0">
+            <a:schemeClr val="accent1"/>
+          </a:effectRef>
+          <a:fontRef idx="minor">
+            <a:schemeClr val="tx1"/>
+          </a:fontRef>
+        </p:style>
+      </p:cxnSp>
+      <p:sp>
+        <p:nvSpPr>
+          <p:cNvPr id="58" name="Rectangle 57"/>
+          <p:cNvSpPr/>
+          <p:nvPr/>
+        </p:nvSpPr>
+        <p:spPr>
+          <a:xfrm rot="5400000">
+            <a:off x="1476692" y="5136650"/>
+            <a:ext cx="251039" cy="123824"/>
+          </a:xfrm>
+          <a:prstGeom prst="rect">
+            <a:avLst/>
+          </a:prstGeom>
+          <a:solidFill>
+            <a:schemeClr val="bg1"/>
+          </a:solidFill>
+          <a:ln w="12700">
+            <a:solidFill>
+              <a:schemeClr val="tx1"/>
+            </a:solidFill>
+          </a:ln>
+        </p:spPr>
+        <p:style>
+          <a:lnRef idx="2">
+            <a:schemeClr val="accent1">
+              <a:shade val="50000"/>
+            </a:schemeClr>
+          </a:lnRef>
+          <a:fillRef idx="1">
+            <a:schemeClr val="accent1"/>
+          </a:fillRef>
+          <a:effectRef idx="0">
+            <a:schemeClr val="accent1"/>
+          </a:effectRef>
+          <a:fontRef idx="minor">
+            <a:schemeClr val="lt1"/>
+          </a:fontRef>
+        </p:style>
+        <p:txBody>
+          <a:bodyPr rtlCol="0" anchor="ctr"/>
+          <a:lstStyle/>
+          <a:p>
+            <a:pPr algn="ctr"/>
+            <a:endParaRPr lang="en-US"/>
+          </a:p>
+        </p:txBody>
+      </p:sp>
+      <p:sp>
+        <p:nvSpPr>
+          <p:cNvPr id="59" name="Rectangle 58"/>
+          <p:cNvSpPr/>
+          <p:nvPr/>
+        </p:nvSpPr>
+        <p:spPr>
+          <a:xfrm rot="5400000">
+            <a:off x="1187577" y="5136168"/>
+            <a:ext cx="475380" cy="134818"/>
+          </a:xfrm>
+          <a:prstGeom prst="rect">
+            <a:avLst/>
+          </a:prstGeom>
+          <a:solidFill>
+            <a:schemeClr val="bg1"/>
+          </a:solidFill>
+          <a:ln w="12700">
+            <a:solidFill>
+              <a:schemeClr val="tx1"/>
+            </a:solidFill>
+          </a:ln>
+        </p:spPr>
+        <p:style>
+          <a:lnRef idx="2">
+            <a:schemeClr val="accent1">
+              <a:shade val="50000"/>
+            </a:schemeClr>
+          </a:lnRef>
+          <a:fillRef idx="1">
+            <a:schemeClr val="accent1"/>
+          </a:fillRef>
+          <a:effectRef idx="0">
+            <a:schemeClr val="accent1"/>
+          </a:effectRef>
+          <a:fontRef idx="minor">
+            <a:schemeClr val="lt1"/>
+          </a:fontRef>
+        </p:style>
+        <p:txBody>
+          <a:bodyPr rtlCol="0" anchor="ctr"/>
+          <a:lstStyle/>
+          <a:p>
+            <a:pPr algn="ctr"/>
+            <a:endParaRPr lang="en-US"/>
+          </a:p>
+        </p:txBody>
+      </p:sp>
+      <p:sp>
+        <p:nvSpPr>
+          <p:cNvPr id="60" name="Rectangle 59"/>
+          <p:cNvSpPr/>
+          <p:nvPr/>
+        </p:nvSpPr>
+        <p:spPr>
+          <a:xfrm rot="5400000">
+            <a:off x="1088525" y="5127575"/>
+            <a:ext cx="335376" cy="134845"/>
+          </a:xfrm>
+          <a:prstGeom prst="rect">
+            <a:avLst/>
+          </a:prstGeom>
+          <a:solidFill>
+            <a:schemeClr val="bg1"/>
+          </a:solidFill>
+          <a:ln w="12700">
+            <a:solidFill>
+              <a:schemeClr val="tx1"/>
+            </a:solidFill>
+          </a:ln>
+        </p:spPr>
+        <p:style>
+          <a:lnRef idx="2">
+            <a:schemeClr val="accent1">
+              <a:shade val="50000"/>
+            </a:schemeClr>
+          </a:lnRef>
+          <a:fillRef idx="1">
+            <a:schemeClr val="accent1"/>
+          </a:fillRef>
+          <a:effectRef idx="0">
+            <a:schemeClr val="accent1"/>
+          </a:effectRef>
+          <a:fontRef idx="minor">
+            <a:schemeClr val="lt1"/>
+          </a:fontRef>
+        </p:style>
+        <p:txBody>
+          <a:bodyPr rtlCol="0" anchor="ctr"/>
+          <a:lstStyle/>
+          <a:p>
+            <a:pPr algn="ctr"/>
+            <a:endParaRPr lang="en-US"/>
+          </a:p>
+        </p:txBody>
+      </p:sp>
+      <p:cxnSp>
+        <p:nvCxnSpPr>
+          <p:cNvPr id="119" name="Straight Connector 118"/>
+          <p:cNvCxnSpPr/>
+          <p:nvPr/>
+        </p:nvCxnSpPr>
+        <p:spPr>
+          <a:xfrm>
+            <a:off x="5330312" y="4971845"/>
+            <a:ext cx="584418" cy="608076"/>
+          </a:xfrm>
+          <a:prstGeom prst="line">
+            <a:avLst/>
+          </a:prstGeom>
+          <a:ln w="25400">
+            <a:solidFill>
+              <a:schemeClr val="tx1"/>
+            </a:solidFill>
+          </a:ln>
+        </p:spPr>
+        <p:style>
+          <a:lnRef idx="1">
+            <a:schemeClr val="accent1"/>
+          </a:lnRef>
+          <a:fillRef idx="0">
+            <a:schemeClr val="accent1"/>
+          </a:fillRef>
+          <a:effectRef idx="0">
+            <a:schemeClr val="accent1"/>
+          </a:effectRef>
+          <a:fontRef idx="minor">
+            <a:schemeClr val="tx1"/>
+          </a:fontRef>
+        </p:style>
+      </p:cxnSp>
+      <p:sp>
+        <p:nvSpPr>
+          <p:cNvPr id="120" name="Rectangle 119"/>
+          <p:cNvSpPr/>
+          <p:nvPr/>
+        </p:nvSpPr>
+        <p:spPr>
+          <a:xfrm>
+            <a:off x="5353969" y="5020280"/>
+            <a:ext cx="251039" cy="123824"/>
+          </a:xfrm>
+          <a:prstGeom prst="rect">
+            <a:avLst/>
+          </a:prstGeom>
+          <a:solidFill>
+            <a:schemeClr val="bg1"/>
+          </a:solidFill>
+          <a:ln w="12700">
+            <a:solidFill>
+              <a:schemeClr val="tx1"/>
+            </a:solidFill>
+          </a:ln>
+        </p:spPr>
+        <p:style>
+          <a:lnRef idx="2">
+            <a:schemeClr val="accent1">
+              <a:shade val="50000"/>
+            </a:schemeClr>
+          </a:lnRef>
+          <a:fillRef idx="1">
+            <a:schemeClr val="accent1"/>
+          </a:fillRef>
+          <a:effectRef idx="0">
+            <a:schemeClr val="accent1"/>
+          </a:effectRef>
+          <a:fontRef idx="minor">
+            <a:schemeClr val="lt1"/>
+          </a:fontRef>
+        </p:style>
+        <p:txBody>
+          <a:bodyPr rtlCol="0" anchor="ctr"/>
+          <a:lstStyle/>
+          <a:p>
+            <a:pPr algn="ctr"/>
+            <a:endParaRPr lang="en-US"/>
+          </a:p>
+        </p:txBody>
+      </p:sp>
+      <p:sp>
+        <p:nvSpPr>
+          <p:cNvPr id="121" name="Rectangle 120"/>
+          <p:cNvSpPr/>
+          <p:nvPr/>
+        </p:nvSpPr>
+        <p:spPr>
+          <a:xfrm>
+            <a:off x="5391726" y="5202063"/>
+            <a:ext cx="475380" cy="134818"/>
+          </a:xfrm>
+          <a:prstGeom prst="rect">
+            <a:avLst/>
+          </a:prstGeom>
+          <a:solidFill>
+            <a:schemeClr val="bg1"/>
+          </a:solidFill>
+          <a:ln w="12700">
+            <a:solidFill>
+              <a:schemeClr val="tx1"/>
+            </a:solidFill>
+          </a:ln>
+        </p:spPr>
+        <p:style>
+          <a:lnRef idx="2">
+            <a:schemeClr val="accent1">
+              <a:shade val="50000"/>
+            </a:schemeClr>
+          </a:lnRef>
+          <a:fillRef idx="1">
+            <a:schemeClr val="accent1"/>
+          </a:fillRef>
+          <a:effectRef idx="0">
+            <a:schemeClr val="accent1"/>
+          </a:effectRef>
+          <a:fontRef idx="minor">
+            <a:schemeClr val="lt1"/>
+          </a:fontRef>
+        </p:style>
+        <p:txBody>
+          <a:bodyPr rtlCol="0" anchor="ctr"/>
+          <a:lstStyle/>
+          <a:p>
+            <a:pPr algn="ctr"/>
+            <a:endParaRPr lang="en-US"/>
+          </a:p>
+        </p:txBody>
+      </p:sp>
+      <p:sp>
+        <p:nvSpPr>
+          <p:cNvPr id="122" name="Rectangle 121"/>
+          <p:cNvSpPr/>
+          <p:nvPr/>
+        </p:nvSpPr>
+        <p:spPr>
+          <a:xfrm>
+            <a:off x="5579354" y="5390151"/>
+            <a:ext cx="335376" cy="134845"/>
+          </a:xfrm>
+          <a:prstGeom prst="rect">
+            <a:avLst/>
+          </a:prstGeom>
+          <a:solidFill>
+            <a:schemeClr val="bg1"/>
+          </a:solidFill>
+          <a:ln w="12700">
+            <a:solidFill>
+              <a:schemeClr val="tx1"/>
+            </a:solidFill>
+          </a:ln>
+        </p:spPr>
+        <p:style>
+          <a:lnRef idx="2">
+            <a:schemeClr val="accent1">
+              <a:shade val="50000"/>
+            </a:schemeClr>
+          </a:lnRef>
+          <a:fillRef idx="1">
+            <a:schemeClr val="accent1"/>
+          </a:fillRef>
+          <a:effectRef idx="0">
+            <a:schemeClr val="accent1"/>
+          </a:effectRef>
+          <a:fontRef idx="minor">
+            <a:schemeClr val="lt1"/>
+          </a:fontRef>
+        </p:style>
+        <p:txBody>
+          <a:bodyPr rtlCol="0" anchor="ctr"/>
+          <a:lstStyle/>
+          <a:p>
+            <a:pPr algn="ctr"/>
+            <a:endParaRPr lang="en-US"/>
+          </a:p>
+        </p:txBody>
+      </p:sp>
+      <p:cxnSp>
+        <p:nvCxnSpPr>
+          <p:cNvPr id="132" name="Straight Connector 131"/>
+          <p:cNvCxnSpPr/>
+          <p:nvPr/>
+        </p:nvCxnSpPr>
+        <p:spPr>
+          <a:xfrm>
+            <a:off x="7775231" y="4999658"/>
+            <a:ext cx="0" cy="552450"/>
+          </a:xfrm>
+          <a:prstGeom prst="line">
+            <a:avLst/>
+          </a:prstGeom>
+          <a:ln>
+            <a:solidFill>
+              <a:schemeClr val="tx1"/>
+            </a:solidFill>
+          </a:ln>
+        </p:spPr>
+        <p:style>
+          <a:lnRef idx="1">
+            <a:schemeClr val="accent1"/>
+          </a:lnRef>
+          <a:fillRef idx="0">
+            <a:schemeClr val="accent1"/>
+          </a:fillRef>
+          <a:effectRef idx="0">
+            <a:schemeClr val="accent1"/>
+          </a:effectRef>
+          <a:fontRef idx="minor">
+            <a:schemeClr val="tx1"/>
+          </a:fontRef>
+        </p:style>
+      </p:cxnSp>
+      <p:cxnSp>
+        <p:nvCxnSpPr>
+          <p:cNvPr id="134" name="Straight Connector 133"/>
+          <p:cNvCxnSpPr/>
+          <p:nvPr/>
+        </p:nvCxnSpPr>
+        <p:spPr>
+          <a:xfrm>
+            <a:off x="8070506" y="4999658"/>
+            <a:ext cx="0" cy="552450"/>
+          </a:xfrm>
+          <a:prstGeom prst="line">
+            <a:avLst/>
+          </a:prstGeom>
+          <a:ln>
+            <a:solidFill>
+              <a:schemeClr val="tx1"/>
+            </a:solidFill>
+          </a:ln>
+        </p:spPr>
+        <p:style>
+          <a:lnRef idx="1">
+            <a:schemeClr val="accent1"/>
+          </a:lnRef>
+          <a:fillRef idx="0">
+            <a:schemeClr val="accent1"/>
+          </a:fillRef>
+          <a:effectRef idx="0">
+            <a:schemeClr val="accent1"/>
+          </a:effectRef>
+          <a:fontRef idx="minor">
+            <a:schemeClr val="tx1"/>
+          </a:fontRef>
+        </p:style>
+      </p:cxnSp>
+      <p:cxnSp>
+        <p:nvCxnSpPr>
+          <p:cNvPr id="139" name="Straight Connector 138"/>
+          <p:cNvCxnSpPr/>
+          <p:nvPr/>
+        </p:nvCxnSpPr>
+        <p:spPr>
+          <a:xfrm flipH="1">
+            <a:off x="7619772" y="5404471"/>
+            <a:ext cx="608076" cy="0"/>
+          </a:xfrm>
+          <a:prstGeom prst="line">
+            <a:avLst/>
+          </a:prstGeom>
+          <a:ln>
+            <a:solidFill>
+              <a:schemeClr val="tx1"/>
+            </a:solidFill>
+          </a:ln>
+        </p:spPr>
+        <p:style>
+          <a:lnRef idx="1">
+            <a:schemeClr val="accent1"/>
+          </a:lnRef>
+          <a:fillRef idx="0">
+            <a:schemeClr val="accent1"/>
+          </a:fillRef>
+          <a:effectRef idx="0">
+            <a:schemeClr val="accent1"/>
+          </a:effectRef>
+          <a:fontRef idx="minor">
+            <a:schemeClr val="tx1"/>
+          </a:fontRef>
+        </p:style>
+      </p:cxnSp>
+      <p:cxnSp>
+        <p:nvCxnSpPr>
+          <p:cNvPr id="144" name="Straight Connector 143"/>
+          <p:cNvCxnSpPr/>
+          <p:nvPr/>
+        </p:nvCxnSpPr>
+        <p:spPr>
+          <a:xfrm flipH="1">
+            <a:off x="7619772" y="5159202"/>
+            <a:ext cx="608076" cy="0"/>
+          </a:xfrm>
+          <a:prstGeom prst="line">
+            <a:avLst/>
+          </a:prstGeom>
+          <a:ln>
+            <a:solidFill>
+              <a:schemeClr val="tx1"/>
+            </a:solidFill>
+          </a:ln>
+        </p:spPr>
+        <p:style>
+          <a:lnRef idx="1">
+            <a:schemeClr val="accent1"/>
+          </a:lnRef>
+          <a:fillRef idx="0">
+            <a:schemeClr val="accent1"/>
+          </a:fillRef>
+          <a:effectRef idx="0">
+            <a:schemeClr val="accent1"/>
+          </a:effectRef>
+          <a:fontRef idx="minor">
+            <a:schemeClr val="tx1"/>
+          </a:fontRef>
+        </p:style>
+      </p:cxnSp>
+      <p:sp>
+        <p:nvSpPr>
+          <p:cNvPr id="145" name="Rectangle 144"/>
+          <p:cNvSpPr/>
+          <p:nvPr/>
+        </p:nvSpPr>
+        <p:spPr>
+          <a:xfrm>
+            <a:off x="7671831" y="5076658"/>
+            <a:ext cx="214222" cy="145255"/>
+          </a:xfrm>
+          <a:prstGeom prst="rect">
+            <a:avLst/>
+          </a:prstGeom>
+          <a:solidFill>
+            <a:schemeClr val="bg1"/>
+          </a:solidFill>
+          <a:ln w="12700">
+            <a:solidFill>
+              <a:schemeClr val="tx1"/>
+            </a:solidFill>
+          </a:ln>
+        </p:spPr>
+        <p:style>
+          <a:lnRef idx="2">
+            <a:schemeClr val="accent1">
+              <a:shade val="50000"/>
+            </a:schemeClr>
+          </a:lnRef>
+          <a:fillRef idx="1">
+            <a:schemeClr val="accent1"/>
+          </a:fillRef>
+          <a:effectRef idx="0">
+            <a:schemeClr val="accent1"/>
+          </a:effectRef>
+          <a:fontRef idx="minor">
+            <a:schemeClr val="lt1"/>
+          </a:fontRef>
+        </p:style>
+        <p:txBody>
+          <a:bodyPr rtlCol="0" anchor="ctr"/>
+          <a:lstStyle/>
+          <a:p>
+            <a:pPr algn="ctr"/>
+            <a:endParaRPr lang="en-US"/>
+          </a:p>
+        </p:txBody>
+      </p:sp>
+      <p:sp>
+        <p:nvSpPr>
+          <p:cNvPr id="146" name="Rectangle 145"/>
+          <p:cNvSpPr/>
+          <p:nvPr/>
+        </p:nvSpPr>
+        <p:spPr>
+          <a:xfrm>
+            <a:off x="7959253" y="5076657"/>
+            <a:ext cx="214222" cy="145255"/>
+          </a:xfrm>
+          <a:prstGeom prst="rect">
+            <a:avLst/>
+          </a:prstGeom>
+          <a:solidFill>
+            <a:schemeClr val="bg1"/>
+          </a:solidFill>
+          <a:ln w="12700">
+            <a:solidFill>
+              <a:schemeClr val="tx1"/>
+            </a:solidFill>
+          </a:ln>
+        </p:spPr>
+        <p:style>
+          <a:lnRef idx="2">
+            <a:schemeClr val="accent1">
+              <a:shade val="50000"/>
+            </a:schemeClr>
+          </a:lnRef>
+          <a:fillRef idx="1">
+            <a:schemeClr val="accent1"/>
+          </a:fillRef>
+          <a:effectRef idx="0">
+            <a:schemeClr val="accent1"/>
+          </a:effectRef>
+          <a:fontRef idx="minor">
+            <a:schemeClr val="lt1"/>
+          </a:fontRef>
+        </p:style>
+        <p:txBody>
+          <a:bodyPr rtlCol="0" anchor="ctr"/>
+          <a:lstStyle/>
+          <a:p>
+            <a:pPr algn="ctr"/>
+            <a:endParaRPr lang="en-US"/>
+          </a:p>
+        </p:txBody>
+      </p:sp>
+      <p:sp>
+        <p:nvSpPr>
+          <p:cNvPr id="147" name="Rectangle 146"/>
+          <p:cNvSpPr/>
+          <p:nvPr/>
+        </p:nvSpPr>
+        <p:spPr>
+          <a:xfrm>
+            <a:off x="7671833" y="5324314"/>
+            <a:ext cx="214222" cy="145255"/>
+          </a:xfrm>
+          <a:prstGeom prst="rect">
+            <a:avLst/>
+          </a:prstGeom>
+          <a:solidFill>
+            <a:schemeClr val="bg1"/>
+          </a:solidFill>
+          <a:ln w="12700">
+            <a:solidFill>
+              <a:schemeClr val="tx1"/>
+            </a:solidFill>
+          </a:ln>
+        </p:spPr>
+        <p:style>
+          <a:lnRef idx="2">
+            <a:schemeClr val="accent1">
+              <a:shade val="50000"/>
+            </a:schemeClr>
+          </a:lnRef>
+          <a:fillRef idx="1">
+            <a:schemeClr val="accent1"/>
+          </a:fillRef>
+          <a:effectRef idx="0">
+            <a:schemeClr val="accent1"/>
+          </a:effectRef>
+          <a:fontRef idx="minor">
+            <a:schemeClr val="lt1"/>
+          </a:fontRef>
+        </p:style>
+        <p:txBody>
+          <a:bodyPr rtlCol="0" anchor="ctr"/>
+          <a:lstStyle/>
+          <a:p>
+            <a:pPr algn="ctr"/>
+            <a:endParaRPr lang="en-US"/>
+          </a:p>
+        </p:txBody>
+      </p:sp>
+      <p:sp>
+        <p:nvSpPr>
+          <p:cNvPr id="148" name="Rectangle 147"/>
+          <p:cNvSpPr/>
+          <p:nvPr/>
+        </p:nvSpPr>
+        <p:spPr>
+          <a:xfrm>
+            <a:off x="7959255" y="5324313"/>
+            <a:ext cx="214222" cy="145255"/>
+          </a:xfrm>
+          <a:prstGeom prst="rect">
+            <a:avLst/>
+          </a:prstGeom>
+          <a:solidFill>
+            <a:schemeClr val="bg1"/>
+          </a:solidFill>
+          <a:ln w="12700">
+            <a:solidFill>
+              <a:schemeClr val="tx1"/>
+            </a:solidFill>
+          </a:ln>
+        </p:spPr>
+        <p:style>
+          <a:lnRef idx="2">
+            <a:schemeClr val="accent1">
+              <a:shade val="50000"/>
+            </a:schemeClr>
+          </a:lnRef>
+          <a:fillRef idx="1">
+            <a:schemeClr val="accent1"/>
+          </a:fillRef>
+          <a:effectRef idx="0">
+            <a:schemeClr val="accent1"/>
+          </a:effectRef>
+          <a:fontRef idx="minor">
+            <a:schemeClr val="lt1"/>
+          </a:fontRef>
+        </p:style>
+        <p:txBody>
+          <a:bodyPr rtlCol="0" anchor="ctr"/>
+          <a:lstStyle/>
+          <a:p>
+            <a:pPr algn="ctr"/>
+            <a:endParaRPr lang="en-US"/>
           </a:p>
         </p:txBody>
       </p:sp>
@@ -5611,8 +6600,8 @@
         </p:nvSpPr>
         <p:spPr>
           <a:xfrm>
-            <a:off x="3144884" y="706170"/>
-            <a:ext cx="2854243" cy="707886"/>
+            <a:off x="3044696" y="706170"/>
+            <a:ext cx="3054619" cy="707886"/>
           </a:xfrm>
           <a:prstGeom prst="rect">
             <a:avLst/>
@@ -5628,7 +6617,7 @@
             <a:pPr algn="ctr"/>
             <a:r>
               <a:rPr lang="en-US" sz="4000" dirty="0"/>
-              <a:t>Reorder Icon</a:t>
+              <a:t>Reorder Icons</a:t>
             </a:r>
           </a:p>
         </p:txBody>
@@ -5681,8 +6670,8 @@
         </p:nvSpPr>
         <p:spPr>
           <a:xfrm>
-            <a:off x="2761702" y="706170"/>
-            <a:ext cx="3620608" cy="707886"/>
+            <a:off x="2661515" y="706170"/>
+            <a:ext cx="3820982" cy="707886"/>
           </a:xfrm>
           <a:prstGeom prst="rect">
             <a:avLst/>
@@ -5702,7 +6691,7 @@
             </a:r>
             <a:r>
               <a:rPr lang="en-US" sz="4000" dirty="0"/>
-              <a:t> Icon</a:t>
+              <a:t> Icons</a:t>
             </a:r>
           </a:p>
         </p:txBody>

</xml_diff>

<commit_message>
#1002 Update the UI and add the button funciton
Update the UI and add the button funciton, but there is still a bug that
it cannot show the new icon added.
</commit_message>
<xml_diff>
--- a/doc/Icons-PositionsLab.pptx
+++ b/doc/Icons-PositionsLab.pptx
@@ -213,7 +213,7 @@
           <a:p>
             <a:fld id="{6699ACB9-486C-4D62-A3A7-AF98E13EFDA3}" type="datetimeFigureOut">
               <a:rPr lang="en-US" smtClean="0"/>
-              <a:t>3/23/2016</a:t>
+              <a:t>5/18/2016</a:t>
             </a:fld>
             <a:endParaRPr lang="en-US"/>
           </a:p>
@@ -660,7 +660,7 @@
             <a:fld id="{1D8BD707-D9CF-40AE-B4C6-C98DA3205C09}" type="datetimeFigureOut">
               <a:rPr lang="en-US" smtClean="0"/>
               <a:pPr/>
-              <a:t>3/23/2016</a:t>
+              <a:t>5/18/2016</a:t>
             </a:fld>
             <a:endParaRPr lang="en-US"/>
           </a:p>
@@ -825,7 +825,7 @@
             <a:fld id="{1D8BD707-D9CF-40AE-B4C6-C98DA3205C09}" type="datetimeFigureOut">
               <a:rPr lang="en-US" smtClean="0"/>
               <a:pPr/>
-              <a:t>3/23/2016</a:t>
+              <a:t>5/18/2016</a:t>
             </a:fld>
             <a:endParaRPr lang="en-US"/>
           </a:p>
@@ -1000,7 +1000,7 @@
             <a:fld id="{1D8BD707-D9CF-40AE-B4C6-C98DA3205C09}" type="datetimeFigureOut">
               <a:rPr lang="en-US" smtClean="0"/>
               <a:pPr/>
-              <a:t>3/23/2016</a:t>
+              <a:t>5/18/2016</a:t>
             </a:fld>
             <a:endParaRPr lang="en-US"/>
           </a:p>
@@ -1165,7 +1165,7 @@
             <a:fld id="{1D8BD707-D9CF-40AE-B4C6-C98DA3205C09}" type="datetimeFigureOut">
               <a:rPr lang="en-US" smtClean="0"/>
               <a:pPr/>
-              <a:t>3/23/2016</a:t>
+              <a:t>5/18/2016</a:t>
             </a:fld>
             <a:endParaRPr lang="en-US"/>
           </a:p>
@@ -1407,7 +1407,7 @@
             <a:fld id="{1D8BD707-D9CF-40AE-B4C6-C98DA3205C09}" type="datetimeFigureOut">
               <a:rPr lang="en-US" smtClean="0"/>
               <a:pPr/>
-              <a:t>3/23/2016</a:t>
+              <a:t>5/18/2016</a:t>
             </a:fld>
             <a:endParaRPr lang="en-US"/>
           </a:p>
@@ -1689,7 +1689,7 @@
             <a:fld id="{1D8BD707-D9CF-40AE-B4C6-C98DA3205C09}" type="datetimeFigureOut">
               <a:rPr lang="en-US" smtClean="0"/>
               <a:pPr/>
-              <a:t>3/23/2016</a:t>
+              <a:t>5/18/2016</a:t>
             </a:fld>
             <a:endParaRPr lang="en-US"/>
           </a:p>
@@ -2105,7 +2105,7 @@
             <a:fld id="{1D8BD707-D9CF-40AE-B4C6-C98DA3205C09}" type="datetimeFigureOut">
               <a:rPr lang="en-US" smtClean="0"/>
               <a:pPr/>
-              <a:t>3/23/2016</a:t>
+              <a:t>5/18/2016</a:t>
             </a:fld>
             <a:endParaRPr lang="en-US"/>
           </a:p>
@@ -2219,7 +2219,7 @@
             <a:fld id="{1D8BD707-D9CF-40AE-B4C6-C98DA3205C09}" type="datetimeFigureOut">
               <a:rPr lang="en-US" smtClean="0"/>
               <a:pPr/>
-              <a:t>3/23/2016</a:t>
+              <a:t>5/18/2016</a:t>
             </a:fld>
             <a:endParaRPr lang="en-US"/>
           </a:p>
@@ -2311,7 +2311,7 @@
             <a:fld id="{1D8BD707-D9CF-40AE-B4C6-C98DA3205C09}" type="datetimeFigureOut">
               <a:rPr lang="en-US" smtClean="0"/>
               <a:pPr/>
-              <a:t>3/23/2016</a:t>
+              <a:t>5/18/2016</a:t>
             </a:fld>
             <a:endParaRPr lang="en-US"/>
           </a:p>
@@ -2583,7 +2583,7 @@
             <a:fld id="{1D8BD707-D9CF-40AE-B4C6-C98DA3205C09}" type="datetimeFigureOut">
               <a:rPr lang="en-US" smtClean="0"/>
               <a:pPr/>
-              <a:t>3/23/2016</a:t>
+              <a:t>5/18/2016</a:t>
             </a:fld>
             <a:endParaRPr lang="en-US"/>
           </a:p>
@@ -2832,7 +2832,7 @@
             <a:fld id="{1D8BD707-D9CF-40AE-B4C6-C98DA3205C09}" type="datetimeFigureOut">
               <a:rPr lang="en-US" smtClean="0"/>
               <a:pPr/>
-              <a:t>3/23/2016</a:t>
+              <a:t>5/18/2016</a:t>
             </a:fld>
             <a:endParaRPr lang="en-US"/>
           </a:p>
@@ -3040,7 +3040,7 @@
             <a:fld id="{1D8BD707-D9CF-40AE-B4C6-C98DA3205C09}" type="datetimeFigureOut">
               <a:rPr lang="en-US" smtClean="0"/>
               <a:pPr/>
-              <a:t>3/23/2016</a:t>
+              <a:t>5/18/2016</a:t>
             </a:fld>
             <a:endParaRPr lang="en-US"/>
           </a:p>
@@ -8072,8 +8072,8 @@
         </p:nvSpPr>
         <p:spPr>
           <a:xfrm>
-            <a:off x="778551" y="2271298"/>
-            <a:ext cx="982898" cy="369332"/>
+            <a:off x="2298296" y="4655750"/>
+            <a:ext cx="2145652" cy="369332"/>
           </a:xfrm>
           <a:prstGeom prst="rect">
             <a:avLst/>
@@ -8088,7 +8088,7 @@
           <a:p>
             <a:r>
               <a:rPr lang="en-US" dirty="0"/>
-              <a:t>Rotation</a:t>
+              <a:t>Duplicate and Rotate</a:t>
             </a:r>
           </a:p>
         </p:txBody>
@@ -9974,6 +9974,249 @@
           </p:sp>
         </p:grpSp>
       </p:grpSp>
+      <p:grpSp>
+        <p:nvGrpSpPr>
+          <p:cNvPr id="7" name="组合 6"/>
+          <p:cNvGrpSpPr/>
+          <p:nvPr/>
+        </p:nvGrpSpPr>
+        <p:grpSpPr>
+          <a:xfrm>
+            <a:off x="3093185" y="5421421"/>
+            <a:ext cx="555874" cy="511820"/>
+            <a:chOff x="1757737" y="3400357"/>
+            <a:chExt cx="555874" cy="511820"/>
+          </a:xfrm>
+        </p:grpSpPr>
+        <p:sp>
+          <p:nvSpPr>
+            <p:cNvPr id="54" name="Rectangle 46"/>
+            <p:cNvSpPr/>
+            <p:nvPr/>
+          </p:nvSpPr>
+          <p:spPr>
+            <a:xfrm>
+              <a:off x="1913803" y="3584160"/>
+              <a:ext cx="180975" cy="173832"/>
+            </a:xfrm>
+            <a:prstGeom prst="rect">
+              <a:avLst/>
+            </a:prstGeom>
+            <a:solidFill>
+              <a:srgbClr val="E46B09"/>
+            </a:solidFill>
+            <a:ln w="12700">
+              <a:solidFill>
+                <a:schemeClr val="tx1"/>
+              </a:solidFill>
+            </a:ln>
+          </p:spPr>
+          <p:style>
+            <a:lnRef idx="2">
+              <a:schemeClr val="accent1">
+                <a:shade val="50000"/>
+              </a:schemeClr>
+            </a:lnRef>
+            <a:fillRef idx="1">
+              <a:schemeClr val="accent1"/>
+            </a:fillRef>
+            <a:effectRef idx="0">
+              <a:schemeClr val="accent1"/>
+            </a:effectRef>
+            <a:fontRef idx="minor">
+              <a:schemeClr val="lt1"/>
+            </a:fontRef>
+          </p:style>
+          <p:txBody>
+            <a:bodyPr rtlCol="0" anchor="ctr"/>
+            <a:lstStyle/>
+            <a:p>
+              <a:pPr algn="ctr"/>
+              <a:endParaRPr lang="en-US"/>
+            </a:p>
+          </p:txBody>
+        </p:sp>
+        <p:sp>
+          <p:nvSpPr>
+            <p:cNvPr id="55" name="Oval 51"/>
+            <p:cNvSpPr/>
+            <p:nvPr/>
+          </p:nvSpPr>
+          <p:spPr>
+            <a:xfrm>
+              <a:off x="1757737" y="3424243"/>
+              <a:ext cx="486731" cy="487934"/>
+            </a:xfrm>
+            <a:prstGeom prst="ellipse">
+              <a:avLst/>
+            </a:prstGeom>
+            <a:noFill/>
+            <a:ln w="19050">
+              <a:solidFill>
+                <a:schemeClr val="tx1"/>
+              </a:solidFill>
+              <a:prstDash val="dash"/>
+            </a:ln>
+          </p:spPr>
+          <p:style>
+            <a:lnRef idx="2">
+              <a:schemeClr val="accent1">
+                <a:shade val="50000"/>
+              </a:schemeClr>
+            </a:lnRef>
+            <a:fillRef idx="1">
+              <a:schemeClr val="accent1"/>
+            </a:fillRef>
+            <a:effectRef idx="0">
+              <a:schemeClr val="accent1"/>
+            </a:effectRef>
+            <a:fontRef idx="minor">
+              <a:schemeClr val="lt1"/>
+            </a:fontRef>
+          </p:style>
+          <p:txBody>
+            <a:bodyPr rtlCol="0" anchor="ctr"/>
+            <a:lstStyle/>
+            <a:p>
+              <a:pPr algn="ctr"/>
+              <a:endParaRPr lang="en-US"/>
+            </a:p>
+          </p:txBody>
+        </p:sp>
+        <p:sp>
+          <p:nvSpPr>
+            <p:cNvPr id="6" name="燕尾形 5"/>
+            <p:cNvSpPr/>
+            <p:nvPr/>
+          </p:nvSpPr>
+          <p:spPr>
+            <a:xfrm rot="1573029">
+              <a:off x="2085870" y="3400357"/>
+              <a:ext cx="89603" cy="128194"/>
+            </a:xfrm>
+            <a:prstGeom prst="chevron">
+              <a:avLst/>
+            </a:prstGeom>
+            <a:solidFill>
+              <a:srgbClr val="0070C0"/>
+            </a:solidFill>
+            <a:ln w="12700">
+              <a:solidFill>
+                <a:schemeClr val="tx1"/>
+              </a:solidFill>
+            </a:ln>
+          </p:spPr>
+          <p:style>
+            <a:lnRef idx="2">
+              <a:schemeClr val="accent1">
+                <a:shade val="50000"/>
+              </a:schemeClr>
+            </a:lnRef>
+            <a:fillRef idx="1">
+              <a:schemeClr val="accent1"/>
+            </a:fillRef>
+            <a:effectRef idx="0">
+              <a:schemeClr val="accent1"/>
+            </a:effectRef>
+            <a:fontRef idx="minor">
+              <a:schemeClr val="lt1"/>
+            </a:fontRef>
+          </p:style>
+          <p:txBody>
+            <a:bodyPr rtlCol="0" anchor="ctr"/>
+            <a:lstStyle/>
+            <a:p>
+              <a:pPr algn="ctr"/>
+              <a:endParaRPr lang="zh-CN" altLang="en-US">
+                <a:solidFill>
+                  <a:schemeClr val="tx1"/>
+                </a:solidFill>
+              </a:endParaRPr>
+            </a:p>
+          </p:txBody>
+        </p:sp>
+        <p:sp>
+          <p:nvSpPr>
+            <p:cNvPr id="57" name="燕尾形 56"/>
+            <p:cNvSpPr/>
+            <p:nvPr/>
+          </p:nvSpPr>
+          <p:spPr>
+            <a:xfrm rot="5400000">
+              <a:off x="2189366" y="3592962"/>
+              <a:ext cx="102230" cy="146260"/>
+            </a:xfrm>
+            <a:prstGeom prst="chevron">
+              <a:avLst/>
+            </a:prstGeom>
+            <a:solidFill>
+              <a:srgbClr val="0070C0"/>
+            </a:solidFill>
+            <a:ln w="12700">
+              <a:solidFill>
+                <a:schemeClr val="tx1"/>
+              </a:solidFill>
+            </a:ln>
+          </p:spPr>
+          <p:style>
+            <a:lnRef idx="2">
+              <a:schemeClr val="accent1">
+                <a:shade val="50000"/>
+              </a:schemeClr>
+            </a:lnRef>
+            <a:fillRef idx="1">
+              <a:schemeClr val="accent1"/>
+            </a:fillRef>
+            <a:effectRef idx="0">
+              <a:schemeClr val="accent1"/>
+            </a:effectRef>
+            <a:fontRef idx="minor">
+              <a:schemeClr val="lt1"/>
+            </a:fontRef>
+          </p:style>
+          <p:txBody>
+            <a:bodyPr rtlCol="0" anchor="ctr"/>
+            <a:lstStyle/>
+            <a:p>
+              <a:pPr algn="ctr"/>
+              <a:endParaRPr lang="zh-CN" altLang="en-US">
+                <a:solidFill>
+                  <a:schemeClr val="tx1"/>
+                </a:solidFill>
+              </a:endParaRPr>
+            </a:p>
+          </p:txBody>
+        </p:sp>
+      </p:grpSp>
+      <p:sp>
+        <p:nvSpPr>
+          <p:cNvPr id="61" name="TextBox 1"/>
+          <p:cNvSpPr txBox="1"/>
+          <p:nvPr/>
+        </p:nvSpPr>
+        <p:spPr>
+          <a:xfrm>
+            <a:off x="930951" y="2423698"/>
+            <a:ext cx="982898" cy="369332"/>
+          </a:xfrm>
+          <a:prstGeom prst="rect">
+            <a:avLst/>
+          </a:prstGeom>
+          <a:noFill/>
+        </p:spPr>
+        <p:txBody>
+          <a:bodyPr wrap="none" rtlCol="0">
+            <a:spAutoFit/>
+          </a:bodyPr>
+          <a:lstStyle/>
+          <a:p>
+            <a:r>
+              <a:rPr lang="en-US" dirty="0"/>
+              <a:t>Rotation</a:t>
+            </a:r>
+          </a:p>
+        </p:txBody>
+      </p:sp>
     </p:spTree>
     <p:extLst>
       <p:ext uri="{BB962C8B-B14F-4D97-AF65-F5344CB8AC3E}">

</xml_diff>

<commit_message>
#1002 Rewrite the feather for github automerge
Rewrite the feather for github automerge
</commit_message>
<xml_diff>
--- a/doc/Icons-PositionsLab.pptx
+++ b/doc/Icons-PositionsLab.pptx
@@ -213,7 +213,7 @@
           <a:p>
             <a:fld id="{6699ACB9-486C-4D62-A3A7-AF98E13EFDA3}" type="datetimeFigureOut">
               <a:rPr lang="en-US" smtClean="0"/>
-              <a:t>3/23/2016</a:t>
+              <a:t>5/18/2016</a:t>
             </a:fld>
             <a:endParaRPr lang="en-US"/>
           </a:p>
@@ -660,7 +660,7 @@
             <a:fld id="{1D8BD707-D9CF-40AE-B4C6-C98DA3205C09}" type="datetimeFigureOut">
               <a:rPr lang="en-US" smtClean="0"/>
               <a:pPr/>
-              <a:t>3/23/2016</a:t>
+              <a:t>5/18/2016</a:t>
             </a:fld>
             <a:endParaRPr lang="en-US"/>
           </a:p>
@@ -825,7 +825,7 @@
             <a:fld id="{1D8BD707-D9CF-40AE-B4C6-C98DA3205C09}" type="datetimeFigureOut">
               <a:rPr lang="en-US" smtClean="0"/>
               <a:pPr/>
-              <a:t>3/23/2016</a:t>
+              <a:t>5/18/2016</a:t>
             </a:fld>
             <a:endParaRPr lang="en-US"/>
           </a:p>
@@ -1000,7 +1000,7 @@
             <a:fld id="{1D8BD707-D9CF-40AE-B4C6-C98DA3205C09}" type="datetimeFigureOut">
               <a:rPr lang="en-US" smtClean="0"/>
               <a:pPr/>
-              <a:t>3/23/2016</a:t>
+              <a:t>5/18/2016</a:t>
             </a:fld>
             <a:endParaRPr lang="en-US"/>
           </a:p>
@@ -1165,7 +1165,7 @@
             <a:fld id="{1D8BD707-D9CF-40AE-B4C6-C98DA3205C09}" type="datetimeFigureOut">
               <a:rPr lang="en-US" smtClean="0"/>
               <a:pPr/>
-              <a:t>3/23/2016</a:t>
+              <a:t>5/18/2016</a:t>
             </a:fld>
             <a:endParaRPr lang="en-US"/>
           </a:p>
@@ -1407,7 +1407,7 @@
             <a:fld id="{1D8BD707-D9CF-40AE-B4C6-C98DA3205C09}" type="datetimeFigureOut">
               <a:rPr lang="en-US" smtClean="0"/>
               <a:pPr/>
-              <a:t>3/23/2016</a:t>
+              <a:t>5/18/2016</a:t>
             </a:fld>
             <a:endParaRPr lang="en-US"/>
           </a:p>
@@ -1689,7 +1689,7 @@
             <a:fld id="{1D8BD707-D9CF-40AE-B4C6-C98DA3205C09}" type="datetimeFigureOut">
               <a:rPr lang="en-US" smtClean="0"/>
               <a:pPr/>
-              <a:t>3/23/2016</a:t>
+              <a:t>5/18/2016</a:t>
             </a:fld>
             <a:endParaRPr lang="en-US"/>
           </a:p>
@@ -2105,7 +2105,7 @@
             <a:fld id="{1D8BD707-D9CF-40AE-B4C6-C98DA3205C09}" type="datetimeFigureOut">
               <a:rPr lang="en-US" smtClean="0"/>
               <a:pPr/>
-              <a:t>3/23/2016</a:t>
+              <a:t>5/18/2016</a:t>
             </a:fld>
             <a:endParaRPr lang="en-US"/>
           </a:p>
@@ -2219,7 +2219,7 @@
             <a:fld id="{1D8BD707-D9CF-40AE-B4C6-C98DA3205C09}" type="datetimeFigureOut">
               <a:rPr lang="en-US" smtClean="0"/>
               <a:pPr/>
-              <a:t>3/23/2016</a:t>
+              <a:t>5/18/2016</a:t>
             </a:fld>
             <a:endParaRPr lang="en-US"/>
           </a:p>
@@ -2311,7 +2311,7 @@
             <a:fld id="{1D8BD707-D9CF-40AE-B4C6-C98DA3205C09}" type="datetimeFigureOut">
               <a:rPr lang="en-US" smtClean="0"/>
               <a:pPr/>
-              <a:t>3/23/2016</a:t>
+              <a:t>5/18/2016</a:t>
             </a:fld>
             <a:endParaRPr lang="en-US"/>
           </a:p>
@@ -2583,7 +2583,7 @@
             <a:fld id="{1D8BD707-D9CF-40AE-B4C6-C98DA3205C09}" type="datetimeFigureOut">
               <a:rPr lang="en-US" smtClean="0"/>
               <a:pPr/>
-              <a:t>3/23/2016</a:t>
+              <a:t>5/18/2016</a:t>
             </a:fld>
             <a:endParaRPr lang="en-US"/>
           </a:p>
@@ -2832,7 +2832,7 @@
             <a:fld id="{1D8BD707-D9CF-40AE-B4C6-C98DA3205C09}" type="datetimeFigureOut">
               <a:rPr lang="en-US" smtClean="0"/>
               <a:pPr/>
-              <a:t>3/23/2016</a:t>
+              <a:t>5/18/2016</a:t>
             </a:fld>
             <a:endParaRPr lang="en-US"/>
           </a:p>
@@ -3040,7 +3040,7 @@
             <a:fld id="{1D8BD707-D9CF-40AE-B4C6-C98DA3205C09}" type="datetimeFigureOut">
               <a:rPr lang="en-US" smtClean="0"/>
               <a:pPr/>
-              <a:t>3/23/2016</a:t>
+              <a:t>5/18/2016</a:t>
             </a:fld>
             <a:endParaRPr lang="en-US"/>
           </a:p>
@@ -8072,8 +8072,8 @@
         </p:nvSpPr>
         <p:spPr>
           <a:xfrm>
-            <a:off x="778551" y="2271298"/>
-            <a:ext cx="982898" cy="369332"/>
+            <a:off x="2298296" y="4655750"/>
+            <a:ext cx="2145652" cy="369332"/>
           </a:xfrm>
           <a:prstGeom prst="rect">
             <a:avLst/>
@@ -8088,7 +8088,7 @@
           <a:p>
             <a:r>
               <a:rPr lang="en-US" dirty="0"/>
-              <a:t>Rotation</a:t>
+              <a:t>Duplicate and Rotate</a:t>
             </a:r>
           </a:p>
         </p:txBody>
@@ -9974,6 +9974,249 @@
           </p:sp>
         </p:grpSp>
       </p:grpSp>
+      <p:grpSp>
+        <p:nvGrpSpPr>
+          <p:cNvPr id="7" name="组合 6"/>
+          <p:cNvGrpSpPr/>
+          <p:nvPr/>
+        </p:nvGrpSpPr>
+        <p:grpSpPr>
+          <a:xfrm>
+            <a:off x="3093185" y="5421421"/>
+            <a:ext cx="555874" cy="511820"/>
+            <a:chOff x="1757737" y="3400357"/>
+            <a:chExt cx="555874" cy="511820"/>
+          </a:xfrm>
+        </p:grpSpPr>
+        <p:sp>
+          <p:nvSpPr>
+            <p:cNvPr id="54" name="Rectangle 46"/>
+            <p:cNvSpPr/>
+            <p:nvPr/>
+          </p:nvSpPr>
+          <p:spPr>
+            <a:xfrm>
+              <a:off x="1913803" y="3584160"/>
+              <a:ext cx="180975" cy="173832"/>
+            </a:xfrm>
+            <a:prstGeom prst="rect">
+              <a:avLst/>
+            </a:prstGeom>
+            <a:solidFill>
+              <a:srgbClr val="E46B09"/>
+            </a:solidFill>
+            <a:ln w="12700">
+              <a:solidFill>
+                <a:schemeClr val="tx1"/>
+              </a:solidFill>
+            </a:ln>
+          </p:spPr>
+          <p:style>
+            <a:lnRef idx="2">
+              <a:schemeClr val="accent1">
+                <a:shade val="50000"/>
+              </a:schemeClr>
+            </a:lnRef>
+            <a:fillRef idx="1">
+              <a:schemeClr val="accent1"/>
+            </a:fillRef>
+            <a:effectRef idx="0">
+              <a:schemeClr val="accent1"/>
+            </a:effectRef>
+            <a:fontRef idx="minor">
+              <a:schemeClr val="lt1"/>
+            </a:fontRef>
+          </p:style>
+          <p:txBody>
+            <a:bodyPr rtlCol="0" anchor="ctr"/>
+            <a:lstStyle/>
+            <a:p>
+              <a:pPr algn="ctr"/>
+              <a:endParaRPr lang="en-US"/>
+            </a:p>
+          </p:txBody>
+        </p:sp>
+        <p:sp>
+          <p:nvSpPr>
+            <p:cNvPr id="55" name="Oval 51"/>
+            <p:cNvSpPr/>
+            <p:nvPr/>
+          </p:nvSpPr>
+          <p:spPr>
+            <a:xfrm>
+              <a:off x="1757737" y="3424243"/>
+              <a:ext cx="486731" cy="487934"/>
+            </a:xfrm>
+            <a:prstGeom prst="ellipse">
+              <a:avLst/>
+            </a:prstGeom>
+            <a:noFill/>
+            <a:ln w="19050">
+              <a:solidFill>
+                <a:schemeClr val="tx1"/>
+              </a:solidFill>
+              <a:prstDash val="dash"/>
+            </a:ln>
+          </p:spPr>
+          <p:style>
+            <a:lnRef idx="2">
+              <a:schemeClr val="accent1">
+                <a:shade val="50000"/>
+              </a:schemeClr>
+            </a:lnRef>
+            <a:fillRef idx="1">
+              <a:schemeClr val="accent1"/>
+            </a:fillRef>
+            <a:effectRef idx="0">
+              <a:schemeClr val="accent1"/>
+            </a:effectRef>
+            <a:fontRef idx="minor">
+              <a:schemeClr val="lt1"/>
+            </a:fontRef>
+          </p:style>
+          <p:txBody>
+            <a:bodyPr rtlCol="0" anchor="ctr"/>
+            <a:lstStyle/>
+            <a:p>
+              <a:pPr algn="ctr"/>
+              <a:endParaRPr lang="en-US"/>
+            </a:p>
+          </p:txBody>
+        </p:sp>
+        <p:sp>
+          <p:nvSpPr>
+            <p:cNvPr id="6" name="燕尾形 5"/>
+            <p:cNvSpPr/>
+            <p:nvPr/>
+          </p:nvSpPr>
+          <p:spPr>
+            <a:xfrm rot="1573029">
+              <a:off x="2085870" y="3400357"/>
+              <a:ext cx="89603" cy="128194"/>
+            </a:xfrm>
+            <a:prstGeom prst="chevron">
+              <a:avLst/>
+            </a:prstGeom>
+            <a:solidFill>
+              <a:srgbClr val="0070C0"/>
+            </a:solidFill>
+            <a:ln w="12700">
+              <a:solidFill>
+                <a:schemeClr val="tx1"/>
+              </a:solidFill>
+            </a:ln>
+          </p:spPr>
+          <p:style>
+            <a:lnRef idx="2">
+              <a:schemeClr val="accent1">
+                <a:shade val="50000"/>
+              </a:schemeClr>
+            </a:lnRef>
+            <a:fillRef idx="1">
+              <a:schemeClr val="accent1"/>
+            </a:fillRef>
+            <a:effectRef idx="0">
+              <a:schemeClr val="accent1"/>
+            </a:effectRef>
+            <a:fontRef idx="minor">
+              <a:schemeClr val="lt1"/>
+            </a:fontRef>
+          </p:style>
+          <p:txBody>
+            <a:bodyPr rtlCol="0" anchor="ctr"/>
+            <a:lstStyle/>
+            <a:p>
+              <a:pPr algn="ctr"/>
+              <a:endParaRPr lang="zh-CN" altLang="en-US">
+                <a:solidFill>
+                  <a:schemeClr val="tx1"/>
+                </a:solidFill>
+              </a:endParaRPr>
+            </a:p>
+          </p:txBody>
+        </p:sp>
+        <p:sp>
+          <p:nvSpPr>
+            <p:cNvPr id="57" name="燕尾形 56"/>
+            <p:cNvSpPr/>
+            <p:nvPr/>
+          </p:nvSpPr>
+          <p:spPr>
+            <a:xfrm rot="5400000">
+              <a:off x="2189366" y="3592962"/>
+              <a:ext cx="102230" cy="146260"/>
+            </a:xfrm>
+            <a:prstGeom prst="chevron">
+              <a:avLst/>
+            </a:prstGeom>
+            <a:solidFill>
+              <a:srgbClr val="0070C0"/>
+            </a:solidFill>
+            <a:ln w="12700">
+              <a:solidFill>
+                <a:schemeClr val="tx1"/>
+              </a:solidFill>
+            </a:ln>
+          </p:spPr>
+          <p:style>
+            <a:lnRef idx="2">
+              <a:schemeClr val="accent1">
+                <a:shade val="50000"/>
+              </a:schemeClr>
+            </a:lnRef>
+            <a:fillRef idx="1">
+              <a:schemeClr val="accent1"/>
+            </a:fillRef>
+            <a:effectRef idx="0">
+              <a:schemeClr val="accent1"/>
+            </a:effectRef>
+            <a:fontRef idx="minor">
+              <a:schemeClr val="lt1"/>
+            </a:fontRef>
+          </p:style>
+          <p:txBody>
+            <a:bodyPr rtlCol="0" anchor="ctr"/>
+            <a:lstStyle/>
+            <a:p>
+              <a:pPr algn="ctr"/>
+              <a:endParaRPr lang="zh-CN" altLang="en-US">
+                <a:solidFill>
+                  <a:schemeClr val="tx1"/>
+                </a:solidFill>
+              </a:endParaRPr>
+            </a:p>
+          </p:txBody>
+        </p:sp>
+      </p:grpSp>
+      <p:sp>
+        <p:nvSpPr>
+          <p:cNvPr id="61" name="TextBox 1"/>
+          <p:cNvSpPr txBox="1"/>
+          <p:nvPr/>
+        </p:nvSpPr>
+        <p:spPr>
+          <a:xfrm>
+            <a:off x="930951" y="2423698"/>
+            <a:ext cx="982898" cy="369332"/>
+          </a:xfrm>
+          <a:prstGeom prst="rect">
+            <a:avLst/>
+          </a:prstGeom>
+          <a:noFill/>
+        </p:spPr>
+        <p:txBody>
+          <a:bodyPr wrap="none" rtlCol="0">
+            <a:spAutoFit/>
+          </a:bodyPr>
+          <a:lstStyle/>
+          <a:p>
+            <a:r>
+              <a:rPr lang="en-US" dirty="0"/>
+              <a:t>Rotation</a:t>
+            </a:r>
+          </a:p>
+        </p:txBody>
+      </p:sp>
     </p:spTree>
     <p:extLst>
       <p:ext uri="{BB962C8B-B14F-4D97-AF65-F5344CB8AC3E}">

</xml_diff>

<commit_message>
#1002 Update Rotate Icon
Update Rotate Icon
</commit_message>
<xml_diff>
--- a/doc/Icons-PositionsLab.pptx
+++ b/doc/Icons-PositionsLab.pptx
@@ -213,7 +213,7 @@
           <a:p>
             <a:fld id="{6699ACB9-486C-4D62-A3A7-AF98E13EFDA3}" type="datetimeFigureOut">
               <a:rPr lang="en-US" smtClean="0"/>
-              <a:t>5/18/2016</a:t>
+              <a:t>5/19/2016</a:t>
             </a:fld>
             <a:endParaRPr lang="en-US"/>
           </a:p>
@@ -660,7 +660,7 @@
             <a:fld id="{1D8BD707-D9CF-40AE-B4C6-C98DA3205C09}" type="datetimeFigureOut">
               <a:rPr lang="en-US" smtClean="0"/>
               <a:pPr/>
-              <a:t>5/18/2016</a:t>
+              <a:t>5/19/2016</a:t>
             </a:fld>
             <a:endParaRPr lang="en-US"/>
           </a:p>
@@ -825,7 +825,7 @@
             <a:fld id="{1D8BD707-D9CF-40AE-B4C6-C98DA3205C09}" type="datetimeFigureOut">
               <a:rPr lang="en-US" smtClean="0"/>
               <a:pPr/>
-              <a:t>5/18/2016</a:t>
+              <a:t>5/19/2016</a:t>
             </a:fld>
             <a:endParaRPr lang="en-US"/>
           </a:p>
@@ -1000,7 +1000,7 @@
             <a:fld id="{1D8BD707-D9CF-40AE-B4C6-C98DA3205C09}" type="datetimeFigureOut">
               <a:rPr lang="en-US" smtClean="0"/>
               <a:pPr/>
-              <a:t>5/18/2016</a:t>
+              <a:t>5/19/2016</a:t>
             </a:fld>
             <a:endParaRPr lang="en-US"/>
           </a:p>
@@ -1165,7 +1165,7 @@
             <a:fld id="{1D8BD707-D9CF-40AE-B4C6-C98DA3205C09}" type="datetimeFigureOut">
               <a:rPr lang="en-US" smtClean="0"/>
               <a:pPr/>
-              <a:t>5/18/2016</a:t>
+              <a:t>5/19/2016</a:t>
             </a:fld>
             <a:endParaRPr lang="en-US"/>
           </a:p>
@@ -1407,7 +1407,7 @@
             <a:fld id="{1D8BD707-D9CF-40AE-B4C6-C98DA3205C09}" type="datetimeFigureOut">
               <a:rPr lang="en-US" smtClean="0"/>
               <a:pPr/>
-              <a:t>5/18/2016</a:t>
+              <a:t>5/19/2016</a:t>
             </a:fld>
             <a:endParaRPr lang="en-US"/>
           </a:p>
@@ -1689,7 +1689,7 @@
             <a:fld id="{1D8BD707-D9CF-40AE-B4C6-C98DA3205C09}" type="datetimeFigureOut">
               <a:rPr lang="en-US" smtClean="0"/>
               <a:pPr/>
-              <a:t>5/18/2016</a:t>
+              <a:t>5/19/2016</a:t>
             </a:fld>
             <a:endParaRPr lang="en-US"/>
           </a:p>
@@ -2105,7 +2105,7 @@
             <a:fld id="{1D8BD707-D9CF-40AE-B4C6-C98DA3205C09}" type="datetimeFigureOut">
               <a:rPr lang="en-US" smtClean="0"/>
               <a:pPr/>
-              <a:t>5/18/2016</a:t>
+              <a:t>5/19/2016</a:t>
             </a:fld>
             <a:endParaRPr lang="en-US"/>
           </a:p>
@@ -2219,7 +2219,7 @@
             <a:fld id="{1D8BD707-D9CF-40AE-B4C6-C98DA3205C09}" type="datetimeFigureOut">
               <a:rPr lang="en-US" smtClean="0"/>
               <a:pPr/>
-              <a:t>5/18/2016</a:t>
+              <a:t>5/19/2016</a:t>
             </a:fld>
             <a:endParaRPr lang="en-US"/>
           </a:p>
@@ -2311,7 +2311,7 @@
             <a:fld id="{1D8BD707-D9CF-40AE-B4C6-C98DA3205C09}" type="datetimeFigureOut">
               <a:rPr lang="en-US" smtClean="0"/>
               <a:pPr/>
-              <a:t>5/18/2016</a:t>
+              <a:t>5/19/2016</a:t>
             </a:fld>
             <a:endParaRPr lang="en-US"/>
           </a:p>
@@ -2583,7 +2583,7 @@
             <a:fld id="{1D8BD707-D9CF-40AE-B4C6-C98DA3205C09}" type="datetimeFigureOut">
               <a:rPr lang="en-US" smtClean="0"/>
               <a:pPr/>
-              <a:t>5/18/2016</a:t>
+              <a:t>5/19/2016</a:t>
             </a:fld>
             <a:endParaRPr lang="en-US"/>
           </a:p>
@@ -2832,7 +2832,7 @@
             <a:fld id="{1D8BD707-D9CF-40AE-B4C6-C98DA3205C09}" type="datetimeFigureOut">
               <a:rPr lang="en-US" smtClean="0"/>
               <a:pPr/>
-              <a:t>5/18/2016</a:t>
+              <a:t>5/19/2016</a:t>
             </a:fld>
             <a:endParaRPr lang="en-US"/>
           </a:p>
@@ -3040,7 +3040,7 @@
             <a:fld id="{1D8BD707-D9CF-40AE-B4C6-C98DA3205C09}" type="datetimeFigureOut">
               <a:rPr lang="en-US" smtClean="0"/>
               <a:pPr/>
-              <a:t>5/18/2016</a:t>
+              <a:t>5/19/2016</a:t>
             </a:fld>
             <a:endParaRPr lang="en-US"/>
           </a:p>
@@ -8211,164 +8211,6 @@
       </p:sp>
       <p:grpSp>
         <p:nvGrpSpPr>
-          <p:cNvPr id="60" name="Group 59"/>
-          <p:cNvGrpSpPr/>
-          <p:nvPr/>
-        </p:nvGrpSpPr>
-        <p:grpSpPr>
-          <a:xfrm>
-            <a:off x="1026635" y="3373130"/>
-            <a:ext cx="486731" cy="507988"/>
-            <a:chOff x="3016088" y="3308560"/>
-            <a:chExt cx="486731" cy="507988"/>
-          </a:xfrm>
-        </p:grpSpPr>
-        <p:sp>
-          <p:nvSpPr>
-            <p:cNvPr id="47" name="Rectangle 46"/>
-            <p:cNvSpPr/>
-            <p:nvPr/>
-          </p:nvSpPr>
-          <p:spPr>
-            <a:xfrm>
-              <a:off x="3159091" y="3488531"/>
-              <a:ext cx="180975" cy="173832"/>
-            </a:xfrm>
-            <a:prstGeom prst="rect">
-              <a:avLst/>
-            </a:prstGeom>
-            <a:solidFill>
-              <a:srgbClr val="E46B09"/>
-            </a:solidFill>
-            <a:ln w="12700">
-              <a:solidFill>
-                <a:schemeClr val="tx1"/>
-              </a:solidFill>
-            </a:ln>
-          </p:spPr>
-          <p:style>
-            <a:lnRef idx="2">
-              <a:schemeClr val="accent1">
-                <a:shade val="50000"/>
-              </a:schemeClr>
-            </a:lnRef>
-            <a:fillRef idx="1">
-              <a:schemeClr val="accent1"/>
-            </a:fillRef>
-            <a:effectRef idx="0">
-              <a:schemeClr val="accent1"/>
-            </a:effectRef>
-            <a:fontRef idx="minor">
-              <a:schemeClr val="lt1"/>
-            </a:fontRef>
-          </p:style>
-          <p:txBody>
-            <a:bodyPr rtlCol="0" anchor="ctr"/>
-            <a:lstStyle/>
-            <a:p>
-              <a:pPr algn="ctr"/>
-              <a:endParaRPr lang="en-US"/>
-            </a:p>
-          </p:txBody>
-        </p:sp>
-        <p:sp>
-          <p:nvSpPr>
-            <p:cNvPr id="52" name="Oval 51"/>
-            <p:cNvSpPr/>
-            <p:nvPr/>
-          </p:nvSpPr>
-          <p:spPr>
-            <a:xfrm>
-              <a:off x="3016088" y="3328614"/>
-              <a:ext cx="486731" cy="487934"/>
-            </a:xfrm>
-            <a:prstGeom prst="ellipse">
-              <a:avLst/>
-            </a:prstGeom>
-            <a:noFill/>
-            <a:ln w="19050">
-              <a:solidFill>
-                <a:schemeClr val="tx1"/>
-              </a:solidFill>
-              <a:prstDash val="dash"/>
-            </a:ln>
-          </p:spPr>
-          <p:style>
-            <a:lnRef idx="2">
-              <a:schemeClr val="accent1">
-                <a:shade val="50000"/>
-              </a:schemeClr>
-            </a:lnRef>
-            <a:fillRef idx="1">
-              <a:schemeClr val="accent1"/>
-            </a:fillRef>
-            <a:effectRef idx="0">
-              <a:schemeClr val="accent1"/>
-            </a:effectRef>
-            <a:fontRef idx="minor">
-              <a:schemeClr val="lt1"/>
-            </a:fontRef>
-          </p:style>
-          <p:txBody>
-            <a:bodyPr rtlCol="0" anchor="ctr"/>
-            <a:lstStyle/>
-            <a:p>
-              <a:pPr algn="ctr"/>
-              <a:endParaRPr lang="en-US"/>
-            </a:p>
-          </p:txBody>
-        </p:sp>
-        <p:sp>
-          <p:nvSpPr>
-            <p:cNvPr id="49" name="Rectangle 48"/>
-            <p:cNvSpPr/>
-            <p:nvPr/>
-          </p:nvSpPr>
-          <p:spPr>
-            <a:xfrm rot="19174279">
-              <a:off x="3413300" y="3308560"/>
-              <a:ext cx="71771" cy="248207"/>
-            </a:xfrm>
-            <a:prstGeom prst="rect">
-              <a:avLst/>
-            </a:prstGeom>
-            <a:solidFill>
-              <a:srgbClr val="0070C0"/>
-            </a:solidFill>
-            <a:ln w="12700">
-              <a:solidFill>
-                <a:schemeClr val="tx1"/>
-              </a:solidFill>
-            </a:ln>
-          </p:spPr>
-          <p:style>
-            <a:lnRef idx="2">
-              <a:schemeClr val="accent1">
-                <a:shade val="50000"/>
-              </a:schemeClr>
-            </a:lnRef>
-            <a:fillRef idx="1">
-              <a:schemeClr val="accent1"/>
-            </a:fillRef>
-            <a:effectRef idx="0">
-              <a:schemeClr val="accent1"/>
-            </a:effectRef>
-            <a:fontRef idx="minor">
-              <a:schemeClr val="lt1"/>
-            </a:fontRef>
-          </p:style>
-          <p:txBody>
-            <a:bodyPr rtlCol="0" anchor="ctr"/>
-            <a:lstStyle/>
-            <a:p>
-              <a:pPr algn="ctr"/>
-              <a:endParaRPr lang="en-US"/>
-            </a:p>
-          </p:txBody>
-        </p:sp>
-      </p:grpSp>
-      <p:grpSp>
-        <p:nvGrpSpPr>
           <p:cNvPr id="89" name="Group 88"/>
           <p:cNvGrpSpPr/>
           <p:nvPr/>
@@ -9976,7 +9818,7 @@
       </p:grpSp>
       <p:grpSp>
         <p:nvGrpSpPr>
-          <p:cNvPr id="7" name="组合 6"/>
+          <p:cNvPr id="8" name="组合 7"/>
           <p:cNvGrpSpPr/>
           <p:nvPr/>
         </p:nvGrpSpPr>
@@ -9984,7 +9826,7 @@
           <a:xfrm>
             <a:off x="3093185" y="5421421"/>
             <a:ext cx="555874" cy="511820"/>
-            <a:chOff x="1757737" y="3400357"/>
+            <a:chOff x="3093185" y="5421421"/>
             <a:chExt cx="555874" cy="511820"/>
           </a:xfrm>
         </p:grpSpPr>
@@ -9996,7 +9838,7 @@
           </p:nvSpPr>
           <p:spPr>
             <a:xfrm>
-              <a:off x="1913803" y="3584160"/>
+              <a:off x="3249251" y="5605224"/>
               <a:ext cx="180975" cy="173832"/>
             </a:xfrm>
             <a:prstGeom prst="rect">
@@ -10044,7 +9886,7 @@
           </p:nvSpPr>
           <p:spPr>
             <a:xfrm>
-              <a:off x="1757737" y="3424243"/>
+              <a:off x="3093185" y="5445307"/>
               <a:ext cx="486731" cy="487934"/>
             </a:xfrm>
             <a:prstGeom prst="ellipse">
@@ -10091,7 +9933,7 @@
           </p:nvSpPr>
           <p:spPr>
             <a:xfrm rot="1573029">
-              <a:off x="2085870" y="3400357"/>
+              <a:off x="3421318" y="5421421"/>
               <a:ext cx="89603" cy="128194"/>
             </a:xfrm>
             <a:prstGeom prst="chevron">
@@ -10143,7 +9985,7 @@
           </p:nvSpPr>
           <p:spPr>
             <a:xfrm rot="5400000">
-              <a:off x="2189366" y="3592962"/>
+              <a:off x="3524814" y="5614026"/>
               <a:ext cx="102230" cy="146260"/>
             </a:xfrm>
             <a:prstGeom prst="chevron">
@@ -10217,6 +10059,224 @@
           </a:p>
         </p:txBody>
       </p:sp>
+      <p:grpSp>
+        <p:nvGrpSpPr>
+          <p:cNvPr id="59" name="组合 58"/>
+          <p:cNvGrpSpPr/>
+          <p:nvPr/>
+        </p:nvGrpSpPr>
+        <p:grpSpPr>
+          <a:xfrm>
+            <a:off x="1087729" y="3379020"/>
+            <a:ext cx="555874" cy="511820"/>
+            <a:chOff x="3093185" y="5421421"/>
+            <a:chExt cx="555874" cy="511820"/>
+          </a:xfrm>
+        </p:grpSpPr>
+        <p:sp>
+          <p:nvSpPr>
+            <p:cNvPr id="63" name="Rectangle 46"/>
+            <p:cNvSpPr/>
+            <p:nvPr/>
+          </p:nvSpPr>
+          <p:spPr>
+            <a:xfrm>
+              <a:off x="3249251" y="5605224"/>
+              <a:ext cx="180975" cy="173832"/>
+            </a:xfrm>
+            <a:prstGeom prst="rect">
+              <a:avLst/>
+            </a:prstGeom>
+            <a:solidFill>
+              <a:srgbClr val="E46B09"/>
+            </a:solidFill>
+            <a:ln w="12700">
+              <a:solidFill>
+                <a:schemeClr val="tx1"/>
+              </a:solidFill>
+            </a:ln>
+          </p:spPr>
+          <p:style>
+            <a:lnRef idx="2">
+              <a:schemeClr val="accent1">
+                <a:shade val="50000"/>
+              </a:schemeClr>
+            </a:lnRef>
+            <a:fillRef idx="1">
+              <a:schemeClr val="accent1"/>
+            </a:fillRef>
+            <a:effectRef idx="0">
+              <a:schemeClr val="accent1"/>
+            </a:effectRef>
+            <a:fontRef idx="minor">
+              <a:schemeClr val="lt1"/>
+            </a:fontRef>
+          </p:style>
+          <p:txBody>
+            <a:bodyPr rtlCol="0" anchor="ctr"/>
+            <a:lstStyle/>
+            <a:p>
+              <a:pPr algn="ctr"/>
+              <a:endParaRPr lang="en-US"/>
+            </a:p>
+          </p:txBody>
+        </p:sp>
+        <p:sp>
+          <p:nvSpPr>
+            <p:cNvPr id="66" name="Oval 51"/>
+            <p:cNvSpPr/>
+            <p:nvPr/>
+          </p:nvSpPr>
+          <p:spPr>
+            <a:xfrm>
+              <a:off x="3093185" y="5445307"/>
+              <a:ext cx="486731" cy="487934"/>
+            </a:xfrm>
+            <a:prstGeom prst="ellipse">
+              <a:avLst/>
+            </a:prstGeom>
+            <a:noFill/>
+            <a:ln w="19050">
+              <a:solidFill>
+                <a:schemeClr val="tx1"/>
+              </a:solidFill>
+              <a:prstDash val="dash"/>
+            </a:ln>
+          </p:spPr>
+          <p:style>
+            <a:lnRef idx="2">
+              <a:schemeClr val="accent1">
+                <a:shade val="50000"/>
+              </a:schemeClr>
+            </a:lnRef>
+            <a:fillRef idx="1">
+              <a:schemeClr val="accent1"/>
+            </a:fillRef>
+            <a:effectRef idx="0">
+              <a:schemeClr val="accent1"/>
+            </a:effectRef>
+            <a:fontRef idx="minor">
+              <a:schemeClr val="lt1"/>
+            </a:fontRef>
+          </p:style>
+          <p:txBody>
+            <a:bodyPr rtlCol="0" anchor="ctr"/>
+            <a:lstStyle/>
+            <a:p>
+              <a:pPr algn="ctr"/>
+              <a:endParaRPr lang="en-US"/>
+            </a:p>
+          </p:txBody>
+        </p:sp>
+        <p:sp>
+          <p:nvSpPr>
+            <p:cNvPr id="67" name="燕尾形 66"/>
+            <p:cNvSpPr/>
+            <p:nvPr/>
+          </p:nvSpPr>
+          <p:spPr>
+            <a:xfrm rot="1573029">
+              <a:off x="3421318" y="5421421"/>
+              <a:ext cx="89603" cy="128194"/>
+            </a:xfrm>
+            <a:prstGeom prst="chevron">
+              <a:avLst/>
+            </a:prstGeom>
+            <a:solidFill>
+              <a:srgbClr val="0070C0">
+                <a:alpha val="40000"/>
+              </a:srgbClr>
+            </a:solidFill>
+            <a:ln w="12700">
+              <a:solidFill>
+                <a:schemeClr val="tx1">
+                  <a:alpha val="40000"/>
+                </a:schemeClr>
+              </a:solidFill>
+            </a:ln>
+          </p:spPr>
+          <p:style>
+            <a:lnRef idx="2">
+              <a:schemeClr val="accent1">
+                <a:shade val="50000"/>
+              </a:schemeClr>
+            </a:lnRef>
+            <a:fillRef idx="1">
+              <a:schemeClr val="accent1"/>
+            </a:fillRef>
+            <a:effectRef idx="0">
+              <a:schemeClr val="accent1"/>
+            </a:effectRef>
+            <a:fontRef idx="minor">
+              <a:schemeClr val="lt1"/>
+            </a:fontRef>
+          </p:style>
+          <p:txBody>
+            <a:bodyPr rtlCol="0" anchor="ctr"/>
+            <a:lstStyle/>
+            <a:p>
+              <a:pPr algn="ctr"/>
+              <a:endParaRPr lang="zh-CN" altLang="en-US">
+                <a:solidFill>
+                  <a:schemeClr val="tx1"/>
+                </a:solidFill>
+              </a:endParaRPr>
+            </a:p>
+          </p:txBody>
+        </p:sp>
+        <p:sp>
+          <p:nvSpPr>
+            <p:cNvPr id="68" name="燕尾形 67"/>
+            <p:cNvSpPr/>
+            <p:nvPr/>
+          </p:nvSpPr>
+          <p:spPr>
+            <a:xfrm rot="5400000">
+              <a:off x="3524814" y="5614026"/>
+              <a:ext cx="102230" cy="146260"/>
+            </a:xfrm>
+            <a:prstGeom prst="chevron">
+              <a:avLst/>
+            </a:prstGeom>
+            <a:solidFill>
+              <a:srgbClr val="0070C0"/>
+            </a:solidFill>
+            <a:ln w="12700">
+              <a:solidFill>
+                <a:schemeClr val="tx1"/>
+              </a:solidFill>
+            </a:ln>
+          </p:spPr>
+          <p:style>
+            <a:lnRef idx="2">
+              <a:schemeClr val="accent1">
+                <a:shade val="50000"/>
+              </a:schemeClr>
+            </a:lnRef>
+            <a:fillRef idx="1">
+              <a:schemeClr val="accent1"/>
+            </a:fillRef>
+            <a:effectRef idx="0">
+              <a:schemeClr val="accent1"/>
+            </a:effectRef>
+            <a:fontRef idx="minor">
+              <a:schemeClr val="lt1"/>
+            </a:fontRef>
+          </p:style>
+          <p:txBody>
+            <a:bodyPr rtlCol="0" anchor="ctr"/>
+            <a:lstStyle/>
+            <a:p>
+              <a:pPr algn="ctr"/>
+              <a:endParaRPr lang="zh-CN" altLang="en-US">
+                <a:solidFill>
+                  <a:schemeClr val="tx1"/>
+                </a:solidFill>
+              </a:endParaRPr>
+            </a:p>
+          </p:txBody>
+        </p:sp>
+      </p:grpSp>
     </p:spTree>
     <p:extLst>
       <p:ext uri="{BB962C8B-B14F-4D97-AF65-F5344CB8AC3E}">

</xml_diff>

<commit_message>
#1002 Update two Rotate Icons
Update two Rotate Icons
</commit_message>
<xml_diff>
--- a/doc/Icons-PositionsLab.pptx
+++ b/doc/Icons-PositionsLab.pptx
@@ -9816,18 +9816,47 @@
           </p:sp>
         </p:grpSp>
       </p:grpSp>
+      <p:sp>
+        <p:nvSpPr>
+          <p:cNvPr id="61" name="TextBox 1"/>
+          <p:cNvSpPr txBox="1"/>
+          <p:nvPr/>
+        </p:nvSpPr>
+        <p:spPr>
+          <a:xfrm>
+            <a:off x="930951" y="2423698"/>
+            <a:ext cx="982898" cy="369332"/>
+          </a:xfrm>
+          <a:prstGeom prst="rect">
+            <a:avLst/>
+          </a:prstGeom>
+          <a:noFill/>
+        </p:spPr>
+        <p:txBody>
+          <a:bodyPr wrap="none" rtlCol="0">
+            <a:spAutoFit/>
+          </a:bodyPr>
+          <a:lstStyle/>
+          <a:p>
+            <a:r>
+              <a:rPr lang="en-US" dirty="0"/>
+              <a:t>Rotation</a:t>
+            </a:r>
+          </a:p>
+        </p:txBody>
+      </p:sp>
       <p:grpSp>
         <p:nvGrpSpPr>
-          <p:cNvPr id="8" name="组合 7"/>
+          <p:cNvPr id="10" name="组合 9"/>
           <p:cNvGrpSpPr/>
           <p:nvPr/>
         </p:nvGrpSpPr>
         <p:grpSpPr>
           <a:xfrm>
-            <a:off x="3093185" y="5421421"/>
-            <a:ext cx="555874" cy="511820"/>
-            <a:chOff x="3093185" y="5421421"/>
-            <a:chExt cx="555874" cy="511820"/>
+            <a:off x="3086493" y="5272839"/>
+            <a:ext cx="569257" cy="565821"/>
+            <a:chOff x="4443948" y="5281268"/>
+            <a:chExt cx="597872" cy="594263"/>
           </a:xfrm>
         </p:grpSpPr>
         <p:sp>
@@ -9838,8 +9867,8 @@
           </p:nvSpPr>
           <p:spPr>
             <a:xfrm>
-              <a:off x="3249251" y="5605224"/>
-              <a:ext cx="180975" cy="173832"/>
+              <a:off x="4615366" y="5549841"/>
+              <a:ext cx="165735" cy="159194"/>
             </a:xfrm>
             <a:prstGeom prst="rect">
               <a:avLst/>
@@ -9886,8 +9915,8 @@
           </p:nvSpPr>
           <p:spPr>
             <a:xfrm>
-              <a:off x="3093185" y="5445307"/>
-              <a:ext cx="486731" cy="487934"/>
+              <a:off x="4443948" y="5375353"/>
+              <a:ext cx="498944" cy="500178"/>
             </a:xfrm>
             <a:prstGeom prst="ellipse">
               <a:avLst/>
@@ -9927,14 +9956,14 @@
         </p:sp>
         <p:sp>
           <p:nvSpPr>
-            <p:cNvPr id="6" name="燕尾形 5"/>
+            <p:cNvPr id="59" name="燕尾形 58"/>
             <p:cNvSpPr/>
             <p:nvPr/>
           </p:nvSpPr>
           <p:spPr>
-            <a:xfrm rot="1573029">
-              <a:off x="3421318" y="5421421"/>
-              <a:ext cx="89603" cy="128194"/>
+            <a:xfrm rot="953220">
+              <a:off x="4678070" y="5281268"/>
+              <a:ext cx="131377" cy="187960"/>
             </a:xfrm>
             <a:prstGeom prst="chevron">
               <a:avLst/>
@@ -9979,14 +10008,14 @@
         </p:sp>
         <p:sp>
           <p:nvSpPr>
-            <p:cNvPr id="57" name="燕尾形 56"/>
+            <p:cNvPr id="60" name="燕尾形 59"/>
             <p:cNvSpPr/>
             <p:nvPr/>
           </p:nvSpPr>
           <p:spPr>
             <a:xfrm rot="5400000">
-              <a:off x="3524814" y="5614026"/>
-              <a:ext cx="102230" cy="146260"/>
+              <a:off x="4882151" y="5511387"/>
+              <a:ext cx="131377" cy="187960"/>
             </a:xfrm>
             <a:prstGeom prst="chevron">
               <a:avLst/>
@@ -10030,59 +10059,30 @@
           </p:txBody>
         </p:sp>
       </p:grpSp>
-      <p:sp>
-        <p:nvSpPr>
-          <p:cNvPr id="61" name="TextBox 1"/>
-          <p:cNvSpPr txBox="1"/>
-          <p:nvPr/>
-        </p:nvSpPr>
-        <p:spPr>
-          <a:xfrm>
-            <a:off x="930951" y="2423698"/>
-            <a:ext cx="982898" cy="369332"/>
-          </a:xfrm>
-          <a:prstGeom prst="rect">
-            <a:avLst/>
-          </a:prstGeom>
-          <a:noFill/>
-        </p:spPr>
-        <p:txBody>
-          <a:bodyPr wrap="none" rtlCol="0">
-            <a:spAutoFit/>
-          </a:bodyPr>
-          <a:lstStyle/>
-          <a:p>
-            <a:r>
-              <a:rPr lang="en-US" dirty="0"/>
-              <a:t>Rotation</a:t>
-            </a:r>
-          </a:p>
-        </p:txBody>
-      </p:sp>
       <p:grpSp>
         <p:nvGrpSpPr>
-          <p:cNvPr id="7" name="组合 6"/>
+          <p:cNvPr id="11" name="组合 10"/>
           <p:cNvGrpSpPr/>
           <p:nvPr/>
         </p:nvGrpSpPr>
         <p:grpSpPr>
           <a:xfrm>
-            <a:off x="1087729" y="3379020"/>
-            <a:ext cx="555874" cy="511820"/>
-            <a:chOff x="1087729" y="3379020"/>
-            <a:chExt cx="555874" cy="511820"/>
+            <a:off x="1043051" y="3327274"/>
+            <a:ext cx="569257" cy="565821"/>
+            <a:chOff x="1043051" y="3327274"/>
+            <a:chExt cx="569257" cy="565821"/>
           </a:xfrm>
         </p:grpSpPr>
         <p:sp>
           <p:nvSpPr>
-            <p:cNvPr id="63" name="Rectangle 46"/>
+            <p:cNvPr id="71" name="Rectangle 46"/>
             <p:cNvSpPr/>
             <p:nvPr/>
           </p:nvSpPr>
           <p:spPr>
             <a:xfrm>
-              <a:off x="1243795" y="3562823"/>
-              <a:ext cx="180975" cy="173832"/>
+              <a:off x="1206265" y="3582993"/>
+              <a:ext cx="157803" cy="151575"/>
             </a:xfrm>
             <a:prstGeom prst="rect">
               <a:avLst/>
@@ -10123,14 +10123,14 @@
         </p:sp>
         <p:sp>
           <p:nvSpPr>
-            <p:cNvPr id="66" name="Oval 51"/>
+            <p:cNvPr id="73" name="Oval 51"/>
             <p:cNvSpPr/>
             <p:nvPr/>
           </p:nvSpPr>
           <p:spPr>
             <a:xfrm>
-              <a:off x="1087729" y="3402906"/>
-              <a:ext cx="486731" cy="487934"/>
+              <a:off x="1043051" y="3416856"/>
+              <a:ext cx="475064" cy="476239"/>
             </a:xfrm>
             <a:prstGeom prst="ellipse">
               <a:avLst/>
@@ -10170,14 +10170,14 @@
         </p:sp>
         <p:sp>
           <p:nvSpPr>
-            <p:cNvPr id="67" name="燕尾形 66"/>
+            <p:cNvPr id="74" name="燕尾形 73"/>
             <p:cNvSpPr/>
             <p:nvPr/>
           </p:nvSpPr>
           <p:spPr>
-            <a:xfrm rot="1573029">
-              <a:off x="1415862" y="3379020"/>
-              <a:ext cx="89603" cy="128194"/>
+            <a:xfrm rot="953220">
+              <a:off x="1265968" y="3327274"/>
+              <a:ext cx="125089" cy="178964"/>
             </a:xfrm>
             <a:prstGeom prst="chevron">
               <a:avLst/>
@@ -10191,7 +10191,6 @@
               <a:solidFill>
                 <a:schemeClr val="tx1"/>
               </a:solidFill>
-              <a:prstDash val="solid"/>
             </a:ln>
           </p:spPr>
           <p:style>
@@ -10225,14 +10224,14 @@
         </p:sp>
         <p:sp>
           <p:nvSpPr>
-            <p:cNvPr id="68" name="燕尾形 67"/>
+            <p:cNvPr id="75" name="燕尾形 74"/>
             <p:cNvSpPr/>
             <p:nvPr/>
           </p:nvSpPr>
           <p:spPr>
             <a:xfrm rot="5400000">
-              <a:off x="1519358" y="3571625"/>
-              <a:ext cx="102230" cy="146260"/>
+              <a:off x="1460281" y="3546379"/>
+              <a:ext cx="125089" cy="178964"/>
             </a:xfrm>
             <a:prstGeom prst="chevron">
               <a:avLst/>

</xml_diff>

<commit_message>
#1000 Add lock direction feature
</commit_message>
<xml_diff>
--- a/doc/Icons-PositionsLab.pptx
+++ b/doc/Icons-PositionsLab.pptx
@@ -213,7 +213,7 @@
           <a:p>
             <a:fld id="{6699ACB9-486C-4D62-A3A7-AF98E13EFDA3}" type="datetimeFigureOut">
               <a:rPr lang="en-US" smtClean="0"/>
-              <a:t>3/23/2016</a:t>
+              <a:t>5/24/2016</a:t>
             </a:fld>
             <a:endParaRPr lang="en-US"/>
           </a:p>
@@ -478,6 +478,90 @@
     </a:lvl9pPr>
   </p:notesStyle>
 </p:notesMaster>
+</file>
+
+<file path=ppt/notesSlides/notesSlide1.xml><?xml version="1.0" encoding="utf-8"?>
+<p:notes xmlns:a="http://schemas.openxmlformats.org/drawingml/2006/main" xmlns:r="http://schemas.openxmlformats.org/officeDocument/2006/relationships" xmlns:p="http://schemas.openxmlformats.org/presentationml/2006/main">
+  <p:cSld>
+    <p:spTree>
+      <p:nvGrpSpPr>
+        <p:cNvPr id="1" name=""/>
+        <p:cNvGrpSpPr/>
+        <p:nvPr/>
+      </p:nvGrpSpPr>
+      <p:grpSpPr>
+        <a:xfrm>
+          <a:off x="0" y="0"/>
+          <a:ext cx="0" cy="0"/>
+          <a:chOff x="0" y="0"/>
+          <a:chExt cx="0" cy="0"/>
+        </a:xfrm>
+      </p:grpSpPr>
+      <p:sp>
+        <p:nvSpPr>
+          <p:cNvPr id="2" name="幻灯片图像占位符 1"/>
+          <p:cNvSpPr>
+            <a:spLocks noGrp="1" noRot="1" noChangeAspect="1"/>
+          </p:cNvSpPr>
+          <p:nvPr>
+            <p:ph type="sldImg"/>
+          </p:nvPr>
+        </p:nvSpPr>
+        <p:spPr/>
+      </p:sp>
+      <p:sp>
+        <p:nvSpPr>
+          <p:cNvPr id="3" name="备注占位符 2"/>
+          <p:cNvSpPr>
+            <a:spLocks noGrp="1"/>
+          </p:cNvSpPr>
+          <p:nvPr>
+            <p:ph type="body" idx="1"/>
+          </p:nvPr>
+        </p:nvSpPr>
+        <p:spPr/>
+        <p:txBody>
+          <a:bodyPr/>
+          <a:lstStyle/>
+          <a:p>
+            <a:endParaRPr lang="zh-CN" altLang="en-US" dirty="0"/>
+          </a:p>
+        </p:txBody>
+      </p:sp>
+      <p:sp>
+        <p:nvSpPr>
+          <p:cNvPr id="4" name="灯片编号占位符 3"/>
+          <p:cNvSpPr>
+            <a:spLocks noGrp="1"/>
+          </p:cNvSpPr>
+          <p:nvPr>
+            <p:ph type="sldNum" sz="quarter" idx="10"/>
+          </p:nvPr>
+        </p:nvSpPr>
+        <p:spPr/>
+        <p:txBody>
+          <a:bodyPr/>
+          <a:lstStyle/>
+          <a:p>
+            <a:fld id="{8EC77E60-82A0-4F8A-A861-433B3189FA8C}" type="slidenum">
+              <a:rPr lang="en-US" smtClean="0"/>
+              <a:t>6</a:t>
+            </a:fld>
+            <a:endParaRPr lang="en-US"/>
+          </a:p>
+        </p:txBody>
+      </p:sp>
+    </p:spTree>
+    <p:extLst>
+      <p:ext uri="{BB962C8B-B14F-4D97-AF65-F5344CB8AC3E}">
+        <p14:creationId xmlns:p14="http://schemas.microsoft.com/office/powerpoint/2010/main" val="3737246662"/>
+      </p:ext>
+    </p:extLst>
+  </p:cSld>
+  <p:clrMapOvr>
+    <a:masterClrMapping/>
+  </p:clrMapOvr>
+</p:notes>
 </file>
 
 <file path=ppt/slideLayouts/slideLayout1.xml><?xml version="1.0" encoding="utf-8"?>
@@ -660,7 +744,7 @@
             <a:fld id="{1D8BD707-D9CF-40AE-B4C6-C98DA3205C09}" type="datetimeFigureOut">
               <a:rPr lang="en-US" smtClean="0"/>
               <a:pPr/>
-              <a:t>3/23/2016</a:t>
+              <a:t>5/24/2016</a:t>
             </a:fld>
             <a:endParaRPr lang="en-US"/>
           </a:p>
@@ -825,7 +909,7 @@
             <a:fld id="{1D8BD707-D9CF-40AE-B4C6-C98DA3205C09}" type="datetimeFigureOut">
               <a:rPr lang="en-US" smtClean="0"/>
               <a:pPr/>
-              <a:t>3/23/2016</a:t>
+              <a:t>5/24/2016</a:t>
             </a:fld>
             <a:endParaRPr lang="en-US"/>
           </a:p>
@@ -1000,7 +1084,7 @@
             <a:fld id="{1D8BD707-D9CF-40AE-B4C6-C98DA3205C09}" type="datetimeFigureOut">
               <a:rPr lang="en-US" smtClean="0"/>
               <a:pPr/>
-              <a:t>3/23/2016</a:t>
+              <a:t>5/24/2016</a:t>
             </a:fld>
             <a:endParaRPr lang="en-US"/>
           </a:p>
@@ -1165,7 +1249,7 @@
             <a:fld id="{1D8BD707-D9CF-40AE-B4C6-C98DA3205C09}" type="datetimeFigureOut">
               <a:rPr lang="en-US" smtClean="0"/>
               <a:pPr/>
-              <a:t>3/23/2016</a:t>
+              <a:t>5/24/2016</a:t>
             </a:fld>
             <a:endParaRPr lang="en-US"/>
           </a:p>
@@ -1407,7 +1491,7 @@
             <a:fld id="{1D8BD707-D9CF-40AE-B4C6-C98DA3205C09}" type="datetimeFigureOut">
               <a:rPr lang="en-US" smtClean="0"/>
               <a:pPr/>
-              <a:t>3/23/2016</a:t>
+              <a:t>5/24/2016</a:t>
             </a:fld>
             <a:endParaRPr lang="en-US"/>
           </a:p>
@@ -1689,7 +1773,7 @@
             <a:fld id="{1D8BD707-D9CF-40AE-B4C6-C98DA3205C09}" type="datetimeFigureOut">
               <a:rPr lang="en-US" smtClean="0"/>
               <a:pPr/>
-              <a:t>3/23/2016</a:t>
+              <a:t>5/24/2016</a:t>
             </a:fld>
             <a:endParaRPr lang="en-US"/>
           </a:p>
@@ -2105,7 +2189,7 @@
             <a:fld id="{1D8BD707-D9CF-40AE-B4C6-C98DA3205C09}" type="datetimeFigureOut">
               <a:rPr lang="en-US" smtClean="0"/>
               <a:pPr/>
-              <a:t>3/23/2016</a:t>
+              <a:t>5/24/2016</a:t>
             </a:fld>
             <a:endParaRPr lang="en-US"/>
           </a:p>
@@ -2219,7 +2303,7 @@
             <a:fld id="{1D8BD707-D9CF-40AE-B4C6-C98DA3205C09}" type="datetimeFigureOut">
               <a:rPr lang="en-US" smtClean="0"/>
               <a:pPr/>
-              <a:t>3/23/2016</a:t>
+              <a:t>5/24/2016</a:t>
             </a:fld>
             <a:endParaRPr lang="en-US"/>
           </a:p>
@@ -2311,7 +2395,7 @@
             <a:fld id="{1D8BD707-D9CF-40AE-B4C6-C98DA3205C09}" type="datetimeFigureOut">
               <a:rPr lang="en-US" smtClean="0"/>
               <a:pPr/>
-              <a:t>3/23/2016</a:t>
+              <a:t>5/24/2016</a:t>
             </a:fld>
             <a:endParaRPr lang="en-US"/>
           </a:p>
@@ -2583,7 +2667,7 @@
             <a:fld id="{1D8BD707-D9CF-40AE-B4C6-C98DA3205C09}" type="datetimeFigureOut">
               <a:rPr lang="en-US" smtClean="0"/>
               <a:pPr/>
-              <a:t>3/23/2016</a:t>
+              <a:t>5/24/2016</a:t>
             </a:fld>
             <a:endParaRPr lang="en-US"/>
           </a:p>
@@ -2832,7 +2916,7 @@
             <a:fld id="{1D8BD707-D9CF-40AE-B4C6-C98DA3205C09}" type="datetimeFigureOut">
               <a:rPr lang="en-US" smtClean="0"/>
               <a:pPr/>
-              <a:t>3/23/2016</a:t>
+              <a:t>5/24/2016</a:t>
             </a:fld>
             <a:endParaRPr lang="en-US"/>
           </a:p>
@@ -3040,7 +3124,7 @@
             <a:fld id="{1D8BD707-D9CF-40AE-B4C6-C98DA3205C09}" type="datetimeFigureOut">
               <a:rPr lang="en-US" smtClean="0"/>
               <a:pPr/>
-              <a:t>3/23/2016</a:t>
+              <a:t>5/24/2016</a:t>
             </a:fld>
             <a:endParaRPr lang="en-US"/>
           </a:p>
@@ -9974,6 +10058,244 @@
           </p:sp>
         </p:grpSp>
       </p:grpSp>
+      <p:sp>
+        <p:nvSpPr>
+          <p:cNvPr id="73" name="TextBox 32"/>
+          <p:cNvSpPr txBox="1"/>
+          <p:nvPr/>
+        </p:nvSpPr>
+        <p:spPr>
+          <a:xfrm>
+            <a:off x="2660340" y="4636184"/>
+            <a:ext cx="1518557" cy="369332"/>
+          </a:xfrm>
+          <a:prstGeom prst="rect">
+            <a:avLst/>
+          </a:prstGeom>
+          <a:noFill/>
+        </p:spPr>
+        <p:txBody>
+          <a:bodyPr wrap="none" rtlCol="0">
+            <a:spAutoFit/>
+          </a:bodyPr>
+          <a:lstStyle/>
+          <a:p>
+            <a:r>
+              <a:rPr lang="en-US" dirty="0"/>
+              <a:t>Lock </a:t>
+            </a:r>
+            <a:r>
+              <a:rPr lang="en-US" dirty="0" smtClean="0"/>
+              <a:t>Direction</a:t>
+            </a:r>
+            <a:endParaRPr lang="en-US" dirty="0"/>
+          </a:p>
+        </p:txBody>
+      </p:sp>
+      <p:grpSp>
+        <p:nvGrpSpPr>
+          <p:cNvPr id="12" name="组合 11"/>
+          <p:cNvGrpSpPr/>
+          <p:nvPr/>
+        </p:nvGrpSpPr>
+        <p:grpSpPr>
+          <a:xfrm>
+            <a:off x="3166337" y="5371494"/>
+            <a:ext cx="484715" cy="457696"/>
+            <a:chOff x="3299365" y="5313074"/>
+            <a:chExt cx="484715" cy="457696"/>
+          </a:xfrm>
+        </p:grpSpPr>
+        <p:cxnSp>
+          <p:nvCxnSpPr>
+            <p:cNvPr id="8" name="直接连接符 7"/>
+            <p:cNvCxnSpPr/>
+            <p:nvPr/>
+          </p:nvCxnSpPr>
+          <p:spPr>
+            <a:xfrm flipV="1">
+              <a:off x="3300295" y="5313074"/>
+              <a:ext cx="483785" cy="454705"/>
+            </a:xfrm>
+            <a:prstGeom prst="line">
+              <a:avLst/>
+            </a:prstGeom>
+            <a:ln w="19050">
+              <a:solidFill>
+                <a:schemeClr val="tx1"/>
+              </a:solidFill>
+              <a:prstDash val="sysDash"/>
+            </a:ln>
+          </p:spPr>
+          <p:style>
+            <a:lnRef idx="1">
+              <a:schemeClr val="accent1"/>
+            </a:lnRef>
+            <a:fillRef idx="0">
+              <a:schemeClr val="accent1"/>
+            </a:fillRef>
+            <a:effectRef idx="0">
+              <a:schemeClr val="accent1"/>
+            </a:effectRef>
+            <a:fontRef idx="minor">
+              <a:schemeClr val="tx1"/>
+            </a:fontRef>
+          </p:style>
+        </p:cxnSp>
+        <p:sp>
+          <p:nvSpPr>
+            <p:cNvPr id="63" name="燕尾形 62"/>
+            <p:cNvSpPr/>
+            <p:nvPr/>
+          </p:nvSpPr>
+          <p:spPr>
+            <a:xfrm rot="19087370">
+              <a:off x="3620986" y="5315481"/>
+              <a:ext cx="108667" cy="204647"/>
+            </a:xfrm>
+            <a:prstGeom prst="chevron">
+              <a:avLst/>
+            </a:prstGeom>
+            <a:ln w="19050">
+              <a:solidFill>
+                <a:schemeClr val="tx1"/>
+              </a:solidFill>
+            </a:ln>
+          </p:spPr>
+          <p:style>
+            <a:lnRef idx="2">
+              <a:schemeClr val="accent1">
+                <a:shade val="50000"/>
+              </a:schemeClr>
+            </a:lnRef>
+            <a:fillRef idx="1">
+              <a:schemeClr val="accent1"/>
+            </a:fillRef>
+            <a:effectRef idx="0">
+              <a:schemeClr val="accent1"/>
+            </a:effectRef>
+            <a:fontRef idx="minor">
+              <a:schemeClr val="lt1"/>
+            </a:fontRef>
+          </p:style>
+          <p:txBody>
+            <a:bodyPr rtlCol="0" anchor="ctr"/>
+            <a:lstStyle/>
+            <a:p>
+              <a:pPr algn="ctr"/>
+              <a:endParaRPr lang="zh-CN" altLang="en-US">
+                <a:solidFill>
+                  <a:schemeClr val="tx1"/>
+                </a:solidFill>
+              </a:endParaRPr>
+            </a:p>
+          </p:txBody>
+        </p:sp>
+        <p:sp>
+          <p:nvSpPr>
+            <p:cNvPr id="67" name="燕尾形 66"/>
+            <p:cNvSpPr/>
+            <p:nvPr/>
+          </p:nvSpPr>
+          <p:spPr>
+            <a:xfrm rot="19087370">
+              <a:off x="3526351" y="5416277"/>
+              <a:ext cx="108667" cy="204647"/>
+            </a:xfrm>
+            <a:prstGeom prst="chevron">
+              <a:avLst/>
+            </a:prstGeom>
+            <a:solidFill>
+              <a:schemeClr val="accent1">
+                <a:alpha val="0"/>
+              </a:schemeClr>
+            </a:solidFill>
+            <a:ln w="19050">
+              <a:solidFill>
+                <a:schemeClr val="tx1"/>
+              </a:solidFill>
+            </a:ln>
+          </p:spPr>
+          <p:style>
+            <a:lnRef idx="2">
+              <a:schemeClr val="accent1">
+                <a:shade val="50000"/>
+              </a:schemeClr>
+            </a:lnRef>
+            <a:fillRef idx="1">
+              <a:schemeClr val="accent1"/>
+            </a:fillRef>
+            <a:effectRef idx="0">
+              <a:schemeClr val="accent1"/>
+            </a:effectRef>
+            <a:fontRef idx="minor">
+              <a:schemeClr val="lt1"/>
+            </a:fontRef>
+          </p:style>
+          <p:txBody>
+            <a:bodyPr rtlCol="0" anchor="ctr"/>
+            <a:lstStyle/>
+            <a:p>
+              <a:pPr algn="ctr"/>
+              <a:endParaRPr lang="zh-CN" altLang="en-US">
+                <a:solidFill>
+                  <a:schemeClr val="tx1"/>
+                </a:solidFill>
+              </a:endParaRPr>
+            </a:p>
+          </p:txBody>
+        </p:sp>
+        <p:sp>
+          <p:nvSpPr>
+            <p:cNvPr id="23" name="椭圆 22"/>
+            <p:cNvSpPr/>
+            <p:nvPr/>
+          </p:nvSpPr>
+          <p:spPr>
+            <a:xfrm>
+              <a:off x="3299365" y="5530262"/>
+              <a:ext cx="240508" cy="240508"/>
+            </a:xfrm>
+            <a:prstGeom prst="ellipse">
+              <a:avLst/>
+            </a:prstGeom>
+            <a:solidFill>
+              <a:schemeClr val="accent6">
+                <a:lumMod val="75000"/>
+              </a:schemeClr>
+            </a:solidFill>
+            <a:ln w="19050">
+              <a:solidFill>
+                <a:schemeClr val="tx1"/>
+              </a:solidFill>
+            </a:ln>
+          </p:spPr>
+          <p:style>
+            <a:lnRef idx="2">
+              <a:schemeClr val="accent1">
+                <a:shade val="50000"/>
+              </a:schemeClr>
+            </a:lnRef>
+            <a:fillRef idx="1">
+              <a:schemeClr val="accent1"/>
+            </a:fillRef>
+            <a:effectRef idx="0">
+              <a:schemeClr val="accent1"/>
+            </a:effectRef>
+            <a:fontRef idx="minor">
+              <a:schemeClr val="lt1"/>
+            </a:fontRef>
+          </p:style>
+          <p:txBody>
+            <a:bodyPr rtlCol="0" anchor="ctr"/>
+            <a:lstStyle/>
+            <a:p>
+              <a:pPr algn="ctr"/>
+              <a:endParaRPr lang="zh-CN" altLang="en-US"/>
+            </a:p>
+          </p:txBody>
+        </p:sp>
+      </p:grpSp>
     </p:spTree>
     <p:extLst>
       <p:ext uri="{BB962C8B-B14F-4D97-AF65-F5344CB8AC3E}">

</xml_diff>

<commit_message>
#999 Update the UI and code skeleton
Still working on the repacking algorithm
</commit_message>
<xml_diff>
--- a/doc/Icons-PositionsLab.pptx
+++ b/doc/Icons-PositionsLab.pptx
@@ -213,7 +213,7 @@
           <a:p>
             <a:fld id="{6699ACB9-486C-4D62-A3A7-AF98E13EFDA3}" type="datetimeFigureOut">
               <a:rPr lang="en-US" smtClean="0"/>
-              <a:t>3/23/2016</a:t>
+              <a:t>5/25/2016</a:t>
             </a:fld>
             <a:endParaRPr lang="en-US"/>
           </a:p>
@@ -660,7 +660,7 @@
             <a:fld id="{1D8BD707-D9CF-40AE-B4C6-C98DA3205C09}" type="datetimeFigureOut">
               <a:rPr lang="en-US" smtClean="0"/>
               <a:pPr/>
-              <a:t>3/23/2016</a:t>
+              <a:t>5/25/2016</a:t>
             </a:fld>
             <a:endParaRPr lang="en-US"/>
           </a:p>
@@ -825,7 +825,7 @@
             <a:fld id="{1D8BD707-D9CF-40AE-B4C6-C98DA3205C09}" type="datetimeFigureOut">
               <a:rPr lang="en-US" smtClean="0"/>
               <a:pPr/>
-              <a:t>3/23/2016</a:t>
+              <a:t>5/25/2016</a:t>
             </a:fld>
             <a:endParaRPr lang="en-US"/>
           </a:p>
@@ -1000,7 +1000,7 @@
             <a:fld id="{1D8BD707-D9CF-40AE-B4C6-C98DA3205C09}" type="datetimeFigureOut">
               <a:rPr lang="en-US" smtClean="0"/>
               <a:pPr/>
-              <a:t>3/23/2016</a:t>
+              <a:t>5/25/2016</a:t>
             </a:fld>
             <a:endParaRPr lang="en-US"/>
           </a:p>
@@ -1165,7 +1165,7 @@
             <a:fld id="{1D8BD707-D9CF-40AE-B4C6-C98DA3205C09}" type="datetimeFigureOut">
               <a:rPr lang="en-US" smtClean="0"/>
               <a:pPr/>
-              <a:t>3/23/2016</a:t>
+              <a:t>5/25/2016</a:t>
             </a:fld>
             <a:endParaRPr lang="en-US"/>
           </a:p>
@@ -1407,7 +1407,7 @@
             <a:fld id="{1D8BD707-D9CF-40AE-B4C6-C98DA3205C09}" type="datetimeFigureOut">
               <a:rPr lang="en-US" smtClean="0"/>
               <a:pPr/>
-              <a:t>3/23/2016</a:t>
+              <a:t>5/25/2016</a:t>
             </a:fld>
             <a:endParaRPr lang="en-US"/>
           </a:p>
@@ -1689,7 +1689,7 @@
             <a:fld id="{1D8BD707-D9CF-40AE-B4C6-C98DA3205C09}" type="datetimeFigureOut">
               <a:rPr lang="en-US" smtClean="0"/>
               <a:pPr/>
-              <a:t>3/23/2016</a:t>
+              <a:t>5/25/2016</a:t>
             </a:fld>
             <a:endParaRPr lang="en-US"/>
           </a:p>
@@ -2105,7 +2105,7 @@
             <a:fld id="{1D8BD707-D9CF-40AE-B4C6-C98DA3205C09}" type="datetimeFigureOut">
               <a:rPr lang="en-US" smtClean="0"/>
               <a:pPr/>
-              <a:t>3/23/2016</a:t>
+              <a:t>5/25/2016</a:t>
             </a:fld>
             <a:endParaRPr lang="en-US"/>
           </a:p>
@@ -2219,7 +2219,7 @@
             <a:fld id="{1D8BD707-D9CF-40AE-B4C6-C98DA3205C09}" type="datetimeFigureOut">
               <a:rPr lang="en-US" smtClean="0"/>
               <a:pPr/>
-              <a:t>3/23/2016</a:t>
+              <a:t>5/25/2016</a:t>
             </a:fld>
             <a:endParaRPr lang="en-US"/>
           </a:p>
@@ -2311,7 +2311,7 @@
             <a:fld id="{1D8BD707-D9CF-40AE-B4C6-C98DA3205C09}" type="datetimeFigureOut">
               <a:rPr lang="en-US" smtClean="0"/>
               <a:pPr/>
-              <a:t>3/23/2016</a:t>
+              <a:t>5/25/2016</a:t>
             </a:fld>
             <a:endParaRPr lang="en-US"/>
           </a:p>
@@ -2583,7 +2583,7 @@
             <a:fld id="{1D8BD707-D9CF-40AE-B4C6-C98DA3205C09}" type="datetimeFigureOut">
               <a:rPr lang="en-US" smtClean="0"/>
               <a:pPr/>
-              <a:t>3/23/2016</a:t>
+              <a:t>5/25/2016</a:t>
             </a:fld>
             <a:endParaRPr lang="en-US"/>
           </a:p>
@@ -2832,7 +2832,7 @@
             <a:fld id="{1D8BD707-D9CF-40AE-B4C6-C98DA3205C09}" type="datetimeFigureOut">
               <a:rPr lang="en-US" smtClean="0"/>
               <a:pPr/>
-              <a:t>3/23/2016</a:t>
+              <a:t>5/25/2016</a:t>
             </a:fld>
             <a:endParaRPr lang="en-US"/>
           </a:p>
@@ -3040,7 +3040,7 @@
             <a:fld id="{1D8BD707-D9CF-40AE-B4C6-C98DA3205C09}" type="datetimeFigureOut">
               <a:rPr lang="en-US" smtClean="0"/>
               <a:pPr/>
-              <a:t>3/23/2016</a:t>
+              <a:t>5/25/2016</a:t>
             </a:fld>
             <a:endParaRPr lang="en-US"/>
           </a:p>
@@ -7609,329 +7609,6 @@
           </a:p>
         </p:txBody>
       </p:sp>
-      <p:grpSp>
-        <p:nvGrpSpPr>
-          <p:cNvPr id="34" name="Group 33"/>
-          <p:cNvGrpSpPr/>
-          <p:nvPr/>
-        </p:nvGrpSpPr>
-        <p:grpSpPr>
-          <a:xfrm>
-            <a:off x="2644584" y="4987751"/>
-            <a:ext cx="464344" cy="566737"/>
-            <a:chOff x="4352925" y="3148013"/>
-            <a:chExt cx="464344" cy="566737"/>
-          </a:xfrm>
-        </p:grpSpPr>
-        <p:sp>
-          <p:nvSpPr>
-            <p:cNvPr id="14" name="Rectangle 13"/>
-            <p:cNvSpPr/>
-            <p:nvPr/>
-          </p:nvSpPr>
-          <p:spPr>
-            <a:xfrm>
-              <a:off x="4352925" y="3231356"/>
-              <a:ext cx="138113" cy="335757"/>
-            </a:xfrm>
-            <a:prstGeom prst="rect">
-              <a:avLst/>
-            </a:prstGeom>
-            <a:solidFill>
-              <a:srgbClr val="E46B09"/>
-            </a:solidFill>
-            <a:ln w="12700">
-              <a:solidFill>
-                <a:schemeClr val="tx1"/>
-              </a:solidFill>
-            </a:ln>
-          </p:spPr>
-          <p:style>
-            <a:lnRef idx="2">
-              <a:schemeClr val="accent1">
-                <a:shade val="50000"/>
-              </a:schemeClr>
-            </a:lnRef>
-            <a:fillRef idx="1">
-              <a:schemeClr val="accent1"/>
-            </a:fillRef>
-            <a:effectRef idx="0">
-              <a:schemeClr val="accent1"/>
-            </a:effectRef>
-            <a:fontRef idx="minor">
-              <a:schemeClr val="lt1"/>
-            </a:fontRef>
-          </p:style>
-          <p:txBody>
-            <a:bodyPr rtlCol="0" anchor="ctr"/>
-            <a:lstStyle/>
-            <a:p>
-              <a:pPr algn="ctr"/>
-              <a:endParaRPr lang="en-US"/>
-            </a:p>
-          </p:txBody>
-        </p:sp>
-        <p:sp>
-          <p:nvSpPr>
-            <p:cNvPr id="15" name="Rectangle 14"/>
-            <p:cNvSpPr/>
-            <p:nvPr/>
-          </p:nvSpPr>
-          <p:spPr>
-            <a:xfrm>
-              <a:off x="4679156" y="3295650"/>
-              <a:ext cx="138113" cy="335757"/>
-            </a:xfrm>
-            <a:prstGeom prst="rect">
-              <a:avLst/>
-            </a:prstGeom>
-            <a:solidFill>
-              <a:srgbClr val="0070C0"/>
-            </a:solidFill>
-            <a:ln w="12700">
-              <a:solidFill>
-                <a:schemeClr val="tx1"/>
-              </a:solidFill>
-            </a:ln>
-          </p:spPr>
-          <p:style>
-            <a:lnRef idx="2">
-              <a:schemeClr val="accent1">
-                <a:shade val="50000"/>
-              </a:schemeClr>
-            </a:lnRef>
-            <a:fillRef idx="1">
-              <a:schemeClr val="accent1"/>
-            </a:fillRef>
-            <a:effectRef idx="0">
-              <a:schemeClr val="accent1"/>
-            </a:effectRef>
-            <a:fontRef idx="minor">
-              <a:schemeClr val="lt1"/>
-            </a:fontRef>
-          </p:style>
-          <p:txBody>
-            <a:bodyPr rtlCol="0" anchor="ctr"/>
-            <a:lstStyle/>
-            <a:p>
-              <a:pPr algn="ctr"/>
-              <a:endParaRPr lang="en-US"/>
-            </a:p>
-          </p:txBody>
-        </p:sp>
-        <p:cxnSp>
-          <p:nvCxnSpPr>
-            <p:cNvPr id="17" name="Straight Connector 16"/>
-            <p:cNvCxnSpPr/>
-            <p:nvPr/>
-          </p:nvCxnSpPr>
-          <p:spPr>
-            <a:xfrm flipV="1">
-              <a:off x="4419600" y="3148013"/>
-              <a:ext cx="0" cy="59531"/>
-            </a:xfrm>
-            <a:prstGeom prst="line">
-              <a:avLst/>
-            </a:prstGeom>
-            <a:ln w="19050">
-              <a:solidFill>
-                <a:schemeClr val="tx1"/>
-              </a:solidFill>
-            </a:ln>
-          </p:spPr>
-          <p:style>
-            <a:lnRef idx="1">
-              <a:schemeClr val="accent1"/>
-            </a:lnRef>
-            <a:fillRef idx="0">
-              <a:schemeClr val="accent1"/>
-            </a:fillRef>
-            <a:effectRef idx="0">
-              <a:schemeClr val="accent1"/>
-            </a:effectRef>
-            <a:fontRef idx="minor">
-              <a:schemeClr val="tx1"/>
-            </a:fontRef>
-          </p:style>
-        </p:cxnSp>
-        <p:cxnSp>
-          <p:nvCxnSpPr>
-            <p:cNvPr id="18" name="Straight Connector 17"/>
-            <p:cNvCxnSpPr/>
-            <p:nvPr/>
-          </p:nvCxnSpPr>
-          <p:spPr>
-            <a:xfrm flipV="1">
-              <a:off x="4743450" y="3655219"/>
-              <a:ext cx="0" cy="59531"/>
-            </a:xfrm>
-            <a:prstGeom prst="line">
-              <a:avLst/>
-            </a:prstGeom>
-            <a:ln w="19050">
-              <a:solidFill>
-                <a:schemeClr val="tx1"/>
-              </a:solidFill>
-            </a:ln>
-          </p:spPr>
-          <p:style>
-            <a:lnRef idx="1">
-              <a:schemeClr val="accent1"/>
-            </a:lnRef>
-            <a:fillRef idx="0">
-              <a:schemeClr val="accent1"/>
-            </a:fillRef>
-            <a:effectRef idx="0">
-              <a:schemeClr val="accent1"/>
-            </a:effectRef>
-            <a:fontRef idx="minor">
-              <a:schemeClr val="tx1"/>
-            </a:fontRef>
-          </p:style>
-        </p:cxnSp>
-        <p:cxnSp>
-          <p:nvCxnSpPr>
-            <p:cNvPr id="20" name="Straight Connector 19"/>
-            <p:cNvCxnSpPr/>
-            <p:nvPr/>
-          </p:nvCxnSpPr>
-          <p:spPr>
-            <a:xfrm>
-              <a:off x="4410076" y="3150394"/>
-              <a:ext cx="338136" cy="0"/>
-            </a:xfrm>
-            <a:prstGeom prst="line">
-              <a:avLst/>
-            </a:prstGeom>
-            <a:ln w="19050">
-              <a:solidFill>
-                <a:schemeClr val="tx1"/>
-              </a:solidFill>
-            </a:ln>
-          </p:spPr>
-          <p:style>
-            <a:lnRef idx="1">
-              <a:schemeClr val="accent1"/>
-            </a:lnRef>
-            <a:fillRef idx="0">
-              <a:schemeClr val="accent1"/>
-            </a:fillRef>
-            <a:effectRef idx="0">
-              <a:schemeClr val="accent1"/>
-            </a:effectRef>
-            <a:fontRef idx="minor">
-              <a:schemeClr val="tx1"/>
-            </a:fontRef>
-          </p:style>
-        </p:cxnSp>
-        <p:cxnSp>
-          <p:nvCxnSpPr>
-            <p:cNvPr id="22" name="Straight Connector 21"/>
-            <p:cNvCxnSpPr/>
-            <p:nvPr/>
-          </p:nvCxnSpPr>
-          <p:spPr>
-            <a:xfrm>
-              <a:off x="4412457" y="3714750"/>
-              <a:ext cx="340517" cy="0"/>
-            </a:xfrm>
-            <a:prstGeom prst="line">
-              <a:avLst/>
-            </a:prstGeom>
-            <a:ln w="19050">
-              <a:solidFill>
-                <a:schemeClr val="tx1"/>
-              </a:solidFill>
-            </a:ln>
-          </p:spPr>
-          <p:style>
-            <a:lnRef idx="1">
-              <a:schemeClr val="accent1"/>
-            </a:lnRef>
-            <a:fillRef idx="0">
-              <a:schemeClr val="accent1"/>
-            </a:fillRef>
-            <a:effectRef idx="0">
-              <a:schemeClr val="accent1"/>
-            </a:effectRef>
-            <a:fontRef idx="minor">
-              <a:schemeClr val="tx1"/>
-            </a:fontRef>
-          </p:style>
-        </p:cxnSp>
-        <p:cxnSp>
-          <p:nvCxnSpPr>
-            <p:cNvPr id="24" name="Straight Arrow Connector 23"/>
-            <p:cNvCxnSpPr/>
-            <p:nvPr/>
-          </p:nvCxnSpPr>
-          <p:spPr>
-            <a:xfrm>
-              <a:off x="4738688" y="3148013"/>
-              <a:ext cx="0" cy="130968"/>
-            </a:xfrm>
-            <a:prstGeom prst="straightConnector1">
-              <a:avLst/>
-            </a:prstGeom>
-            <a:ln w="19050">
-              <a:solidFill>
-                <a:schemeClr val="tx1"/>
-              </a:solidFill>
-              <a:tailEnd type="triangle"/>
-            </a:ln>
-          </p:spPr>
-          <p:style>
-            <a:lnRef idx="1">
-              <a:schemeClr val="accent1"/>
-            </a:lnRef>
-            <a:fillRef idx="0">
-              <a:schemeClr val="accent1"/>
-            </a:fillRef>
-            <a:effectRef idx="0">
-              <a:schemeClr val="accent1"/>
-            </a:effectRef>
-            <a:fontRef idx="minor">
-              <a:schemeClr val="tx1"/>
-            </a:fontRef>
-          </p:style>
-        </p:cxnSp>
-        <p:cxnSp>
-          <p:nvCxnSpPr>
-            <p:cNvPr id="26" name="Straight Arrow Connector 25"/>
-            <p:cNvCxnSpPr/>
-            <p:nvPr/>
-          </p:nvCxnSpPr>
-          <p:spPr>
-            <a:xfrm flipV="1">
-              <a:off x="4421981" y="3598069"/>
-              <a:ext cx="0" cy="116681"/>
-            </a:xfrm>
-            <a:prstGeom prst="straightConnector1">
-              <a:avLst/>
-            </a:prstGeom>
-            <a:ln w="19050">
-              <a:solidFill>
-                <a:schemeClr val="tx1"/>
-              </a:solidFill>
-              <a:tailEnd type="triangle"/>
-            </a:ln>
-          </p:spPr>
-          <p:style>
-            <a:lnRef idx="1">
-              <a:schemeClr val="accent1"/>
-            </a:lnRef>
-            <a:fillRef idx="0">
-              <a:schemeClr val="accent1"/>
-            </a:fillRef>
-            <a:effectRef idx="0">
-              <a:schemeClr val="accent1"/>
-            </a:effectRef>
-            <a:fontRef idx="minor">
-              <a:schemeClr val="tx1"/>
-            </a:fontRef>
-          </p:style>
-        </p:cxnSp>
-      </p:grpSp>
       <p:sp>
         <p:nvSpPr>
           <p:cNvPr id="35" name="TextBox 34"/>
@@ -7990,6 +7667,668 @@
           </a:p>
         </p:txBody>
       </p:sp>
+      <p:grpSp>
+        <p:nvGrpSpPr>
+          <p:cNvPr id="16" name="Group 33"/>
+          <p:cNvGrpSpPr/>
+          <p:nvPr/>
+        </p:nvGrpSpPr>
+        <p:grpSpPr>
+          <a:xfrm>
+            <a:off x="2796984" y="5140151"/>
+            <a:ext cx="464344" cy="566737"/>
+            <a:chOff x="4352925" y="3148013"/>
+            <a:chExt cx="464344" cy="566737"/>
+          </a:xfrm>
+        </p:grpSpPr>
+        <p:sp>
+          <p:nvSpPr>
+            <p:cNvPr id="19" name="Rectangle 13"/>
+            <p:cNvSpPr/>
+            <p:nvPr/>
+          </p:nvSpPr>
+          <p:spPr>
+            <a:xfrm>
+              <a:off x="4352925" y="3231356"/>
+              <a:ext cx="138113" cy="335757"/>
+            </a:xfrm>
+            <a:prstGeom prst="rect">
+              <a:avLst/>
+            </a:prstGeom>
+            <a:solidFill>
+              <a:srgbClr val="E46B09"/>
+            </a:solidFill>
+            <a:ln w="12700">
+              <a:solidFill>
+                <a:schemeClr val="tx1"/>
+              </a:solidFill>
+            </a:ln>
+          </p:spPr>
+          <p:style>
+            <a:lnRef idx="2">
+              <a:schemeClr val="accent1">
+                <a:shade val="50000"/>
+              </a:schemeClr>
+            </a:lnRef>
+            <a:fillRef idx="1">
+              <a:schemeClr val="accent1"/>
+            </a:fillRef>
+            <a:effectRef idx="0">
+              <a:schemeClr val="accent1"/>
+            </a:effectRef>
+            <a:fontRef idx="minor">
+              <a:schemeClr val="lt1"/>
+            </a:fontRef>
+          </p:style>
+          <p:txBody>
+            <a:bodyPr rtlCol="0" anchor="ctr"/>
+            <a:lstStyle/>
+            <a:p>
+              <a:pPr algn="ctr"/>
+              <a:endParaRPr lang="en-US"/>
+            </a:p>
+          </p:txBody>
+        </p:sp>
+        <p:sp>
+          <p:nvSpPr>
+            <p:cNvPr id="21" name="Rectangle 14"/>
+            <p:cNvSpPr/>
+            <p:nvPr/>
+          </p:nvSpPr>
+          <p:spPr>
+            <a:xfrm>
+              <a:off x="4679156" y="3295650"/>
+              <a:ext cx="138113" cy="335757"/>
+            </a:xfrm>
+            <a:prstGeom prst="rect">
+              <a:avLst/>
+            </a:prstGeom>
+            <a:solidFill>
+              <a:srgbClr val="0070C0"/>
+            </a:solidFill>
+            <a:ln w="12700">
+              <a:solidFill>
+                <a:schemeClr val="tx1"/>
+              </a:solidFill>
+            </a:ln>
+          </p:spPr>
+          <p:style>
+            <a:lnRef idx="2">
+              <a:schemeClr val="accent1">
+                <a:shade val="50000"/>
+              </a:schemeClr>
+            </a:lnRef>
+            <a:fillRef idx="1">
+              <a:schemeClr val="accent1"/>
+            </a:fillRef>
+            <a:effectRef idx="0">
+              <a:schemeClr val="accent1"/>
+            </a:effectRef>
+            <a:fontRef idx="minor">
+              <a:schemeClr val="lt1"/>
+            </a:fontRef>
+          </p:style>
+          <p:txBody>
+            <a:bodyPr rtlCol="0" anchor="ctr"/>
+            <a:lstStyle/>
+            <a:p>
+              <a:pPr algn="ctr"/>
+              <a:endParaRPr lang="en-US"/>
+            </a:p>
+          </p:txBody>
+        </p:sp>
+        <p:cxnSp>
+          <p:nvCxnSpPr>
+            <p:cNvPr id="23" name="Straight Connector 16"/>
+            <p:cNvCxnSpPr/>
+            <p:nvPr/>
+          </p:nvCxnSpPr>
+          <p:spPr>
+            <a:xfrm flipV="1">
+              <a:off x="4419600" y="3148013"/>
+              <a:ext cx="0" cy="59531"/>
+            </a:xfrm>
+            <a:prstGeom prst="line">
+              <a:avLst/>
+            </a:prstGeom>
+            <a:ln w="19050">
+              <a:solidFill>
+                <a:schemeClr val="tx1"/>
+              </a:solidFill>
+            </a:ln>
+          </p:spPr>
+          <p:style>
+            <a:lnRef idx="1">
+              <a:schemeClr val="accent1"/>
+            </a:lnRef>
+            <a:fillRef idx="0">
+              <a:schemeClr val="accent1"/>
+            </a:fillRef>
+            <a:effectRef idx="0">
+              <a:schemeClr val="accent1"/>
+            </a:effectRef>
+            <a:fontRef idx="minor">
+              <a:schemeClr val="tx1"/>
+            </a:fontRef>
+          </p:style>
+        </p:cxnSp>
+        <p:cxnSp>
+          <p:nvCxnSpPr>
+            <p:cNvPr id="25" name="Straight Connector 17"/>
+            <p:cNvCxnSpPr/>
+            <p:nvPr/>
+          </p:nvCxnSpPr>
+          <p:spPr>
+            <a:xfrm flipV="1">
+              <a:off x="4743450" y="3655219"/>
+              <a:ext cx="0" cy="59531"/>
+            </a:xfrm>
+            <a:prstGeom prst="line">
+              <a:avLst/>
+            </a:prstGeom>
+            <a:ln w="19050">
+              <a:solidFill>
+                <a:schemeClr val="tx1"/>
+              </a:solidFill>
+            </a:ln>
+          </p:spPr>
+          <p:style>
+            <a:lnRef idx="1">
+              <a:schemeClr val="accent1"/>
+            </a:lnRef>
+            <a:fillRef idx="0">
+              <a:schemeClr val="accent1"/>
+            </a:fillRef>
+            <a:effectRef idx="0">
+              <a:schemeClr val="accent1"/>
+            </a:effectRef>
+            <a:fontRef idx="minor">
+              <a:schemeClr val="tx1"/>
+            </a:fontRef>
+          </p:style>
+        </p:cxnSp>
+        <p:cxnSp>
+          <p:nvCxnSpPr>
+            <p:cNvPr id="27" name="Straight Connector 19"/>
+            <p:cNvCxnSpPr/>
+            <p:nvPr/>
+          </p:nvCxnSpPr>
+          <p:spPr>
+            <a:xfrm>
+              <a:off x="4410076" y="3150394"/>
+              <a:ext cx="338136" cy="0"/>
+            </a:xfrm>
+            <a:prstGeom prst="line">
+              <a:avLst/>
+            </a:prstGeom>
+            <a:ln w="19050">
+              <a:solidFill>
+                <a:schemeClr val="tx1"/>
+              </a:solidFill>
+            </a:ln>
+          </p:spPr>
+          <p:style>
+            <a:lnRef idx="1">
+              <a:schemeClr val="accent1"/>
+            </a:lnRef>
+            <a:fillRef idx="0">
+              <a:schemeClr val="accent1"/>
+            </a:fillRef>
+            <a:effectRef idx="0">
+              <a:schemeClr val="accent1"/>
+            </a:effectRef>
+            <a:fontRef idx="minor">
+              <a:schemeClr val="tx1"/>
+            </a:fontRef>
+          </p:style>
+        </p:cxnSp>
+        <p:cxnSp>
+          <p:nvCxnSpPr>
+            <p:cNvPr id="28" name="Straight Connector 21"/>
+            <p:cNvCxnSpPr/>
+            <p:nvPr/>
+          </p:nvCxnSpPr>
+          <p:spPr>
+            <a:xfrm>
+              <a:off x="4412457" y="3714750"/>
+              <a:ext cx="340517" cy="0"/>
+            </a:xfrm>
+            <a:prstGeom prst="line">
+              <a:avLst/>
+            </a:prstGeom>
+            <a:ln w="19050">
+              <a:solidFill>
+                <a:schemeClr val="tx1"/>
+              </a:solidFill>
+            </a:ln>
+          </p:spPr>
+          <p:style>
+            <a:lnRef idx="1">
+              <a:schemeClr val="accent1"/>
+            </a:lnRef>
+            <a:fillRef idx="0">
+              <a:schemeClr val="accent1"/>
+            </a:fillRef>
+            <a:effectRef idx="0">
+              <a:schemeClr val="accent1"/>
+            </a:effectRef>
+            <a:fontRef idx="minor">
+              <a:schemeClr val="tx1"/>
+            </a:fontRef>
+          </p:style>
+        </p:cxnSp>
+        <p:cxnSp>
+          <p:nvCxnSpPr>
+            <p:cNvPr id="29" name="Straight Arrow Connector 23"/>
+            <p:cNvCxnSpPr/>
+            <p:nvPr/>
+          </p:nvCxnSpPr>
+          <p:spPr>
+            <a:xfrm>
+              <a:off x="4738688" y="3148013"/>
+              <a:ext cx="0" cy="130968"/>
+            </a:xfrm>
+            <a:prstGeom prst="straightConnector1">
+              <a:avLst/>
+            </a:prstGeom>
+            <a:ln w="19050">
+              <a:solidFill>
+                <a:schemeClr val="tx1"/>
+              </a:solidFill>
+              <a:tailEnd type="triangle"/>
+            </a:ln>
+          </p:spPr>
+          <p:style>
+            <a:lnRef idx="1">
+              <a:schemeClr val="accent1"/>
+            </a:lnRef>
+            <a:fillRef idx="0">
+              <a:schemeClr val="accent1"/>
+            </a:fillRef>
+            <a:effectRef idx="0">
+              <a:schemeClr val="accent1"/>
+            </a:effectRef>
+            <a:fontRef idx="minor">
+              <a:schemeClr val="tx1"/>
+            </a:fontRef>
+          </p:style>
+        </p:cxnSp>
+        <p:cxnSp>
+          <p:nvCxnSpPr>
+            <p:cNvPr id="30" name="Straight Arrow Connector 25"/>
+            <p:cNvCxnSpPr/>
+            <p:nvPr/>
+          </p:nvCxnSpPr>
+          <p:spPr>
+            <a:xfrm flipV="1">
+              <a:off x="4421981" y="3598069"/>
+              <a:ext cx="0" cy="116681"/>
+            </a:xfrm>
+            <a:prstGeom prst="straightConnector1">
+              <a:avLst/>
+            </a:prstGeom>
+            <a:ln w="19050">
+              <a:solidFill>
+                <a:schemeClr val="tx1"/>
+              </a:solidFill>
+              <a:tailEnd type="triangle"/>
+            </a:ln>
+          </p:spPr>
+          <p:style>
+            <a:lnRef idx="1">
+              <a:schemeClr val="accent1"/>
+            </a:lnRef>
+            <a:fillRef idx="0">
+              <a:schemeClr val="accent1"/>
+            </a:fillRef>
+            <a:effectRef idx="0">
+              <a:schemeClr val="accent1"/>
+            </a:effectRef>
+            <a:fontRef idx="minor">
+              <a:schemeClr val="tx1"/>
+            </a:fontRef>
+          </p:style>
+        </p:cxnSp>
+      </p:grpSp>
+      <p:grpSp>
+        <p:nvGrpSpPr>
+          <p:cNvPr id="2" name="组合 1"/>
+          <p:cNvGrpSpPr/>
+          <p:nvPr/>
+        </p:nvGrpSpPr>
+        <p:grpSpPr>
+          <a:xfrm>
+            <a:off x="5925914" y="5056399"/>
+            <a:ext cx="510686" cy="533808"/>
+            <a:chOff x="3501835" y="5151509"/>
+            <a:chExt cx="510686" cy="533808"/>
+          </a:xfrm>
+        </p:grpSpPr>
+        <p:sp>
+          <p:nvSpPr>
+            <p:cNvPr id="14" name="Rectangle 13"/>
+            <p:cNvSpPr/>
+            <p:nvPr/>
+          </p:nvSpPr>
+          <p:spPr>
+            <a:xfrm>
+              <a:off x="3501835" y="5152108"/>
+              <a:ext cx="131010" cy="182841"/>
+            </a:xfrm>
+            <a:prstGeom prst="rect">
+              <a:avLst/>
+            </a:prstGeom>
+            <a:solidFill>
+              <a:srgbClr val="E46B09"/>
+            </a:solidFill>
+            <a:ln w="12700">
+              <a:solidFill>
+                <a:schemeClr val="tx1"/>
+              </a:solidFill>
+            </a:ln>
+          </p:spPr>
+          <p:style>
+            <a:lnRef idx="2">
+              <a:schemeClr val="accent1">
+                <a:shade val="50000"/>
+              </a:schemeClr>
+            </a:lnRef>
+            <a:fillRef idx="1">
+              <a:schemeClr val="accent1"/>
+            </a:fillRef>
+            <a:effectRef idx="0">
+              <a:schemeClr val="accent1"/>
+            </a:effectRef>
+            <a:fontRef idx="minor">
+              <a:schemeClr val="lt1"/>
+            </a:fontRef>
+          </p:style>
+          <p:txBody>
+            <a:bodyPr rtlCol="0" anchor="ctr"/>
+            <a:lstStyle/>
+            <a:p>
+              <a:pPr algn="ctr"/>
+              <a:endParaRPr lang="en-US"/>
+            </a:p>
+          </p:txBody>
+        </p:sp>
+        <p:sp>
+          <p:nvSpPr>
+            <p:cNvPr id="15" name="Rectangle 14"/>
+            <p:cNvSpPr/>
+            <p:nvPr/>
+          </p:nvSpPr>
+          <p:spPr>
+            <a:xfrm>
+              <a:off x="3683965" y="5151509"/>
+              <a:ext cx="131439" cy="183440"/>
+            </a:xfrm>
+            <a:prstGeom prst="rect">
+              <a:avLst/>
+            </a:prstGeom>
+            <a:solidFill>
+              <a:srgbClr val="0070C0"/>
+            </a:solidFill>
+            <a:ln w="12700">
+              <a:solidFill>
+                <a:schemeClr val="tx1"/>
+              </a:solidFill>
+            </a:ln>
+          </p:spPr>
+          <p:style>
+            <a:lnRef idx="2">
+              <a:schemeClr val="accent1">
+                <a:shade val="50000"/>
+              </a:schemeClr>
+            </a:lnRef>
+            <a:fillRef idx="1">
+              <a:schemeClr val="accent1"/>
+            </a:fillRef>
+            <a:effectRef idx="0">
+              <a:schemeClr val="accent1"/>
+            </a:effectRef>
+            <a:fontRef idx="minor">
+              <a:schemeClr val="lt1"/>
+            </a:fontRef>
+          </p:style>
+          <p:txBody>
+            <a:bodyPr rtlCol="0" anchor="ctr"/>
+            <a:lstStyle/>
+            <a:p>
+              <a:pPr algn="ctr"/>
+              <a:endParaRPr lang="en-US"/>
+            </a:p>
+          </p:txBody>
+        </p:sp>
+        <p:cxnSp>
+          <p:nvCxnSpPr>
+            <p:cNvPr id="24" name="Straight Arrow Connector 23"/>
+            <p:cNvCxnSpPr/>
+            <p:nvPr/>
+          </p:nvCxnSpPr>
+          <p:spPr>
+            <a:xfrm>
+              <a:off x="3747470" y="5355899"/>
+              <a:ext cx="0" cy="130968"/>
+            </a:xfrm>
+            <a:prstGeom prst="straightConnector1">
+              <a:avLst/>
+            </a:prstGeom>
+            <a:ln w="19050">
+              <a:solidFill>
+                <a:schemeClr val="tx1"/>
+              </a:solidFill>
+              <a:tailEnd type="triangle"/>
+            </a:ln>
+          </p:spPr>
+          <p:style>
+            <a:lnRef idx="1">
+              <a:schemeClr val="accent1"/>
+            </a:lnRef>
+            <a:fillRef idx="0">
+              <a:schemeClr val="accent1"/>
+            </a:fillRef>
+            <a:effectRef idx="0">
+              <a:schemeClr val="accent1"/>
+            </a:effectRef>
+            <a:fontRef idx="minor">
+              <a:schemeClr val="tx1"/>
+            </a:fontRef>
+          </p:style>
+        </p:cxnSp>
+        <p:sp>
+          <p:nvSpPr>
+            <p:cNvPr id="31" name="Rectangle 13"/>
+            <p:cNvSpPr/>
+            <p:nvPr/>
+          </p:nvSpPr>
+          <p:spPr>
+            <a:xfrm>
+              <a:off x="3873580" y="5151510"/>
+              <a:ext cx="138941" cy="193910"/>
+            </a:xfrm>
+            <a:prstGeom prst="rect">
+              <a:avLst/>
+            </a:prstGeom>
+            <a:solidFill>
+              <a:schemeClr val="bg1"/>
+            </a:solidFill>
+            <a:ln w="12700">
+              <a:solidFill>
+                <a:schemeClr val="tx1"/>
+              </a:solidFill>
+            </a:ln>
+          </p:spPr>
+          <p:style>
+            <a:lnRef idx="2">
+              <a:schemeClr val="accent1">
+                <a:shade val="50000"/>
+              </a:schemeClr>
+            </a:lnRef>
+            <a:fillRef idx="1">
+              <a:schemeClr val="accent1"/>
+            </a:fillRef>
+            <a:effectRef idx="0">
+              <a:schemeClr val="accent1"/>
+            </a:effectRef>
+            <a:fontRef idx="minor">
+              <a:schemeClr val="lt1"/>
+            </a:fontRef>
+          </p:style>
+          <p:txBody>
+            <a:bodyPr rtlCol="0" anchor="ctr"/>
+            <a:lstStyle/>
+            <a:p>
+              <a:pPr algn="ctr"/>
+              <a:endParaRPr lang="en-US"/>
+            </a:p>
+          </p:txBody>
+        </p:sp>
+        <p:sp>
+          <p:nvSpPr>
+            <p:cNvPr id="32" name="Rectangle 13"/>
+            <p:cNvSpPr/>
+            <p:nvPr/>
+          </p:nvSpPr>
+          <p:spPr>
+            <a:xfrm>
+              <a:off x="3681965" y="5500771"/>
+              <a:ext cx="131010" cy="182586"/>
+            </a:xfrm>
+            <a:prstGeom prst="rect">
+              <a:avLst/>
+            </a:prstGeom>
+            <a:solidFill>
+              <a:srgbClr val="E46B09"/>
+            </a:solidFill>
+            <a:ln w="12700">
+              <a:solidFill>
+                <a:schemeClr val="tx1"/>
+              </a:solidFill>
+            </a:ln>
+          </p:spPr>
+          <p:style>
+            <a:lnRef idx="2">
+              <a:schemeClr val="accent1">
+                <a:shade val="50000"/>
+              </a:schemeClr>
+            </a:lnRef>
+            <a:fillRef idx="1">
+              <a:schemeClr val="accent1"/>
+            </a:fillRef>
+            <a:effectRef idx="0">
+              <a:schemeClr val="accent1"/>
+            </a:effectRef>
+            <a:fontRef idx="minor">
+              <a:schemeClr val="lt1"/>
+            </a:fontRef>
+          </p:style>
+          <p:txBody>
+            <a:bodyPr rtlCol="0" anchor="ctr"/>
+            <a:lstStyle/>
+            <a:p>
+              <a:pPr algn="ctr"/>
+              <a:endParaRPr lang="en-US"/>
+            </a:p>
+          </p:txBody>
+        </p:sp>
+        <p:sp>
+          <p:nvSpPr>
+            <p:cNvPr id="33" name="Rectangle 14"/>
+            <p:cNvSpPr/>
+            <p:nvPr/>
+          </p:nvSpPr>
+          <p:spPr>
+            <a:xfrm>
+              <a:off x="3877545" y="5500771"/>
+              <a:ext cx="131010" cy="184546"/>
+            </a:xfrm>
+            <a:prstGeom prst="rect">
+              <a:avLst/>
+            </a:prstGeom>
+            <a:solidFill>
+              <a:srgbClr val="0070C0"/>
+            </a:solidFill>
+            <a:ln w="12700">
+              <a:solidFill>
+                <a:schemeClr val="tx1"/>
+              </a:solidFill>
+            </a:ln>
+          </p:spPr>
+          <p:style>
+            <a:lnRef idx="2">
+              <a:schemeClr val="accent1">
+                <a:shade val="50000"/>
+              </a:schemeClr>
+            </a:lnRef>
+            <a:fillRef idx="1">
+              <a:schemeClr val="accent1"/>
+            </a:fillRef>
+            <a:effectRef idx="0">
+              <a:schemeClr val="accent1"/>
+            </a:effectRef>
+            <a:fontRef idx="minor">
+              <a:schemeClr val="lt1"/>
+            </a:fontRef>
+          </p:style>
+          <p:txBody>
+            <a:bodyPr rtlCol="0" anchor="ctr"/>
+            <a:lstStyle/>
+            <a:p>
+              <a:pPr algn="ctr"/>
+              <a:endParaRPr lang="en-US"/>
+            </a:p>
+          </p:txBody>
+        </p:sp>
+        <p:sp>
+          <p:nvSpPr>
+            <p:cNvPr id="37" name="Rectangle 13"/>
+            <p:cNvSpPr/>
+            <p:nvPr/>
+          </p:nvSpPr>
+          <p:spPr>
+            <a:xfrm>
+              <a:off x="3501835" y="5502731"/>
+              <a:ext cx="131010" cy="182586"/>
+            </a:xfrm>
+            <a:prstGeom prst="rect">
+              <a:avLst/>
+            </a:prstGeom>
+            <a:solidFill>
+              <a:schemeClr val="bg1"/>
+            </a:solidFill>
+            <a:ln w="12700">
+              <a:solidFill>
+                <a:schemeClr val="tx1"/>
+              </a:solidFill>
+            </a:ln>
+          </p:spPr>
+          <p:style>
+            <a:lnRef idx="2">
+              <a:schemeClr val="accent1">
+                <a:shade val="50000"/>
+              </a:schemeClr>
+            </a:lnRef>
+            <a:fillRef idx="1">
+              <a:schemeClr val="accent1"/>
+            </a:fillRef>
+            <a:effectRef idx="0">
+              <a:schemeClr val="accent1"/>
+            </a:effectRef>
+            <a:fontRef idx="minor">
+              <a:schemeClr val="lt1"/>
+            </a:fontRef>
+          </p:style>
+          <p:txBody>
+            <a:bodyPr rtlCol="0" anchor="ctr"/>
+            <a:lstStyle/>
+            <a:p>
+              <a:pPr algn="ctr"/>
+              <a:endParaRPr lang="en-US"/>
+            </a:p>
+          </p:txBody>
+        </p:sp>
+      </p:grpSp>
     </p:spTree>
     <p:extLst>
       <p:ext uri="{BB962C8B-B14F-4D97-AF65-F5344CB8AC3E}">

</xml_diff>

<commit_message>
#1007 add flip support
</commit_message>
<xml_diff>
--- a/doc/Icons-PositionsLab.pptx
+++ b/doc/Icons-PositionsLab.pptx
@@ -213,7 +213,7 @@
           <a:p>
             <a:fld id="{6699ACB9-486C-4D62-A3A7-AF98E13EFDA3}" type="datetimeFigureOut">
               <a:rPr lang="en-US" smtClean="0"/>
-              <a:t>3/23/2016</a:t>
+              <a:t>5/27/2016</a:t>
             </a:fld>
             <a:endParaRPr lang="en-US"/>
           </a:p>
@@ -660,7 +660,7 @@
             <a:fld id="{1D8BD707-D9CF-40AE-B4C6-C98DA3205C09}" type="datetimeFigureOut">
               <a:rPr lang="en-US" smtClean="0"/>
               <a:pPr/>
-              <a:t>3/23/2016</a:t>
+              <a:t>5/27/2016</a:t>
             </a:fld>
             <a:endParaRPr lang="en-US"/>
           </a:p>
@@ -825,7 +825,7 @@
             <a:fld id="{1D8BD707-D9CF-40AE-B4C6-C98DA3205C09}" type="datetimeFigureOut">
               <a:rPr lang="en-US" smtClean="0"/>
               <a:pPr/>
-              <a:t>3/23/2016</a:t>
+              <a:t>5/27/2016</a:t>
             </a:fld>
             <a:endParaRPr lang="en-US"/>
           </a:p>
@@ -1000,7 +1000,7 @@
             <a:fld id="{1D8BD707-D9CF-40AE-B4C6-C98DA3205C09}" type="datetimeFigureOut">
               <a:rPr lang="en-US" smtClean="0"/>
               <a:pPr/>
-              <a:t>3/23/2016</a:t>
+              <a:t>5/27/2016</a:t>
             </a:fld>
             <a:endParaRPr lang="en-US"/>
           </a:p>
@@ -1165,7 +1165,7 @@
             <a:fld id="{1D8BD707-D9CF-40AE-B4C6-C98DA3205C09}" type="datetimeFigureOut">
               <a:rPr lang="en-US" smtClean="0"/>
               <a:pPr/>
-              <a:t>3/23/2016</a:t>
+              <a:t>5/27/2016</a:t>
             </a:fld>
             <a:endParaRPr lang="en-US"/>
           </a:p>
@@ -1407,7 +1407,7 @@
             <a:fld id="{1D8BD707-D9CF-40AE-B4C6-C98DA3205C09}" type="datetimeFigureOut">
               <a:rPr lang="en-US" smtClean="0"/>
               <a:pPr/>
-              <a:t>3/23/2016</a:t>
+              <a:t>5/27/2016</a:t>
             </a:fld>
             <a:endParaRPr lang="en-US"/>
           </a:p>
@@ -1689,7 +1689,7 @@
             <a:fld id="{1D8BD707-D9CF-40AE-B4C6-C98DA3205C09}" type="datetimeFigureOut">
               <a:rPr lang="en-US" smtClean="0"/>
               <a:pPr/>
-              <a:t>3/23/2016</a:t>
+              <a:t>5/27/2016</a:t>
             </a:fld>
             <a:endParaRPr lang="en-US"/>
           </a:p>
@@ -2105,7 +2105,7 @@
             <a:fld id="{1D8BD707-D9CF-40AE-B4C6-C98DA3205C09}" type="datetimeFigureOut">
               <a:rPr lang="en-US" smtClean="0"/>
               <a:pPr/>
-              <a:t>3/23/2016</a:t>
+              <a:t>5/27/2016</a:t>
             </a:fld>
             <a:endParaRPr lang="en-US"/>
           </a:p>
@@ -2219,7 +2219,7 @@
             <a:fld id="{1D8BD707-D9CF-40AE-B4C6-C98DA3205C09}" type="datetimeFigureOut">
               <a:rPr lang="en-US" smtClean="0"/>
               <a:pPr/>
-              <a:t>3/23/2016</a:t>
+              <a:t>5/27/2016</a:t>
             </a:fld>
             <a:endParaRPr lang="en-US"/>
           </a:p>
@@ -2311,7 +2311,7 @@
             <a:fld id="{1D8BD707-D9CF-40AE-B4C6-C98DA3205C09}" type="datetimeFigureOut">
               <a:rPr lang="en-US" smtClean="0"/>
               <a:pPr/>
-              <a:t>3/23/2016</a:t>
+              <a:t>5/27/2016</a:t>
             </a:fld>
             <a:endParaRPr lang="en-US"/>
           </a:p>
@@ -2583,7 +2583,7 @@
             <a:fld id="{1D8BD707-D9CF-40AE-B4C6-C98DA3205C09}" type="datetimeFigureOut">
               <a:rPr lang="en-US" smtClean="0"/>
               <a:pPr/>
-              <a:t>3/23/2016</a:t>
+              <a:t>5/27/2016</a:t>
             </a:fld>
             <a:endParaRPr lang="en-US"/>
           </a:p>
@@ -2832,7 +2832,7 @@
             <a:fld id="{1D8BD707-D9CF-40AE-B4C6-C98DA3205C09}" type="datetimeFigureOut">
               <a:rPr lang="en-US" smtClean="0"/>
               <a:pPr/>
-              <a:t>3/23/2016</a:t>
+              <a:t>5/27/2016</a:t>
             </a:fld>
             <a:endParaRPr lang="en-US"/>
           </a:p>
@@ -3040,7 +3040,7 @@
             <a:fld id="{1D8BD707-D9CF-40AE-B4C6-C98DA3205C09}" type="datetimeFigureOut">
               <a:rPr lang="en-US" smtClean="0"/>
               <a:pPr/>
-              <a:t>3/23/2016</a:t>
+              <a:t>5/27/2016</a:t>
             </a:fld>
             <a:endParaRPr lang="en-US"/>
           </a:p>
@@ -8188,8 +8188,8 @@
         </p:nvSpPr>
         <p:spPr>
           <a:xfrm>
-            <a:off x="752871" y="4613617"/>
-            <a:ext cx="1034257" cy="369332"/>
+            <a:off x="3057821" y="4766017"/>
+            <a:ext cx="518091" cy="369332"/>
           </a:xfrm>
           <a:prstGeom prst="rect">
             <a:avLst/>
@@ -8203,9 +8203,10 @@
           <a:lstStyle/>
           <a:p>
             <a:r>
-              <a:rPr lang="en-US" dirty="0"/>
-              <a:t>Lock Axis</a:t>
+              <a:rPr lang="en-US" dirty="0" smtClean="0"/>
+              <a:t>Flip</a:t>
             </a:r>
+            <a:endParaRPr lang="en-US" dirty="0"/>
           </a:p>
         </p:txBody>
       </p:sp>
@@ -8375,7 +8376,7 @@
         </p:nvGrpSpPr>
         <p:grpSpPr>
           <a:xfrm>
-            <a:off x="810950" y="5458519"/>
+            <a:off x="991103" y="5428720"/>
             <a:ext cx="559539" cy="311642"/>
             <a:chOff x="4291068" y="3238762"/>
             <a:chExt cx="559539" cy="311642"/>
@@ -8689,7 +8690,7 @@
       </p:grpSp>
       <p:grpSp>
         <p:nvGrpSpPr>
-          <p:cNvPr id="117" name="Group 116"/>
+          <p:cNvPr id="8" name="组合 7"/>
           <p:cNvGrpSpPr/>
           <p:nvPr/>
         </p:nvGrpSpPr>
@@ -8697,7 +8698,7 @@
           <a:xfrm>
             <a:off x="3166337" y="3422336"/>
             <a:ext cx="409575" cy="409575"/>
-            <a:chOff x="3166337" y="3543806"/>
+            <a:chOff x="3166337" y="3422336"/>
             <a:chExt cx="409575" cy="409575"/>
           </a:xfrm>
         </p:grpSpPr>
@@ -8709,7 +8710,7 @@
           </p:nvSpPr>
           <p:spPr>
             <a:xfrm rot="4575288">
-              <a:off x="3166336" y="3680727"/>
+              <a:off x="3166336" y="3559257"/>
               <a:ext cx="409575" cy="135733"/>
             </a:xfrm>
             <a:prstGeom prst="rect">
@@ -8760,7 +8761,7 @@
           </p:nvSpPr>
           <p:spPr>
             <a:xfrm>
-              <a:off x="3166337" y="3683941"/>
+              <a:off x="3166337" y="3562471"/>
               <a:ext cx="409575" cy="135733"/>
             </a:xfrm>
             <a:prstGeom prst="rect">
@@ -8808,7 +8809,7 @@
           </p:nvCxnSpPr>
           <p:spPr>
             <a:xfrm flipV="1">
-              <a:off x="3506856" y="3838724"/>
+              <a:off x="3506856" y="3717254"/>
               <a:ext cx="69056" cy="64293"/>
             </a:xfrm>
             <a:prstGeom prst="straightConnector1">
@@ -8844,7 +8845,7 @@
           </p:nvCxnSpPr>
           <p:spPr>
             <a:xfrm flipH="1">
-              <a:off x="3183006" y="3594951"/>
+              <a:off x="3183006" y="3473481"/>
               <a:ext cx="68147" cy="69941"/>
             </a:xfrm>
             <a:prstGeom prst="straightConnector1">
@@ -9973,6 +9974,345 @@
             </p:txBody>
           </p:sp>
         </p:grpSp>
+      </p:grpSp>
+      <p:sp>
+        <p:nvSpPr>
+          <p:cNvPr id="53" name="TextBox 32"/>
+          <p:cNvSpPr txBox="1"/>
+          <p:nvPr/>
+        </p:nvSpPr>
+        <p:spPr>
+          <a:xfrm>
+            <a:off x="905271" y="4766017"/>
+            <a:ext cx="1034257" cy="369332"/>
+          </a:xfrm>
+          <a:prstGeom prst="rect">
+            <a:avLst/>
+          </a:prstGeom>
+          <a:noFill/>
+        </p:spPr>
+        <p:txBody>
+          <a:bodyPr wrap="none" rtlCol="0">
+            <a:spAutoFit/>
+          </a:bodyPr>
+          <a:lstStyle/>
+          <a:p>
+            <a:r>
+              <a:rPr lang="en-US" dirty="0"/>
+              <a:t>Lock Axis</a:t>
+            </a:r>
+          </a:p>
+        </p:txBody>
+      </p:sp>
+      <p:grpSp>
+        <p:nvGrpSpPr>
+          <p:cNvPr id="22" name="组合 21"/>
+          <p:cNvGrpSpPr/>
+          <p:nvPr/>
+        </p:nvGrpSpPr>
+        <p:grpSpPr>
+          <a:xfrm>
+            <a:off x="3033697" y="5409977"/>
+            <a:ext cx="507687" cy="426598"/>
+            <a:chOff x="3171876" y="5473943"/>
+            <a:chExt cx="313829" cy="235477"/>
+          </a:xfrm>
+        </p:grpSpPr>
+        <p:sp>
+          <p:nvSpPr>
+            <p:cNvPr id="7" name="直角三角形 6"/>
+            <p:cNvSpPr/>
+            <p:nvPr/>
+          </p:nvSpPr>
+          <p:spPr>
+            <a:xfrm>
+              <a:off x="3349972" y="5473944"/>
+              <a:ext cx="135733" cy="208179"/>
+            </a:xfrm>
+            <a:prstGeom prst="rtTriangle">
+              <a:avLst/>
+            </a:prstGeom>
+            <a:solidFill>
+              <a:schemeClr val="accent1">
+                <a:lumMod val="60000"/>
+                <a:lumOff val="40000"/>
+              </a:schemeClr>
+            </a:solidFill>
+            <a:ln w="19050">
+              <a:solidFill>
+                <a:schemeClr val="tx1"/>
+              </a:solidFill>
+              <a:prstDash val="sysDash"/>
+            </a:ln>
+          </p:spPr>
+          <p:style>
+            <a:lnRef idx="2">
+              <a:schemeClr val="accent1">
+                <a:shade val="50000"/>
+              </a:schemeClr>
+            </a:lnRef>
+            <a:fillRef idx="1">
+              <a:schemeClr val="accent1"/>
+            </a:fillRef>
+            <a:effectRef idx="0">
+              <a:schemeClr val="accent1"/>
+            </a:effectRef>
+            <a:fontRef idx="minor">
+              <a:schemeClr val="lt1"/>
+            </a:fontRef>
+          </p:style>
+          <p:txBody>
+            <a:bodyPr rtlCol="0" anchor="ctr"/>
+            <a:lstStyle/>
+            <a:p>
+              <a:pPr algn="ctr"/>
+              <a:endParaRPr lang="zh-CN" altLang="en-US"/>
+            </a:p>
+          </p:txBody>
+        </p:sp>
+        <p:sp>
+          <p:nvSpPr>
+            <p:cNvPr id="58" name="直角三角形 57"/>
+            <p:cNvSpPr/>
+            <p:nvPr/>
+          </p:nvSpPr>
+          <p:spPr>
+            <a:xfrm flipH="1">
+              <a:off x="3171876" y="5473943"/>
+              <a:ext cx="135733" cy="208179"/>
+            </a:xfrm>
+            <a:prstGeom prst="rtTriangle">
+              <a:avLst/>
+            </a:prstGeom>
+            <a:solidFill>
+              <a:schemeClr val="accent6">
+                <a:lumMod val="75000"/>
+              </a:schemeClr>
+            </a:solidFill>
+            <a:ln w="12700">
+              <a:solidFill>
+                <a:schemeClr val="tx1"/>
+              </a:solidFill>
+            </a:ln>
+          </p:spPr>
+          <p:style>
+            <a:lnRef idx="2">
+              <a:schemeClr val="accent1">
+                <a:shade val="50000"/>
+              </a:schemeClr>
+            </a:lnRef>
+            <a:fillRef idx="1">
+              <a:schemeClr val="accent1"/>
+            </a:fillRef>
+            <a:effectRef idx="0">
+              <a:schemeClr val="accent1"/>
+            </a:effectRef>
+            <a:fontRef idx="minor">
+              <a:schemeClr val="lt1"/>
+            </a:fontRef>
+          </p:style>
+          <p:txBody>
+            <a:bodyPr rtlCol="0" anchor="ctr"/>
+            <a:lstStyle/>
+            <a:p>
+              <a:pPr algn="ctr"/>
+              <a:endParaRPr lang="zh-CN" altLang="en-US"/>
+            </a:p>
+          </p:txBody>
+        </p:sp>
+        <p:cxnSp>
+          <p:nvCxnSpPr>
+            <p:cNvPr id="14" name="曲线连接符 13"/>
+            <p:cNvCxnSpPr/>
+            <p:nvPr/>
+          </p:nvCxnSpPr>
+          <p:spPr>
+            <a:xfrm rot="5400000" flipH="1">
+              <a:off x="3321966" y="5620371"/>
+              <a:ext cx="1" cy="178097"/>
+            </a:xfrm>
+            <a:prstGeom prst="curvedConnector3">
+              <a:avLst>
+                <a:gd name="adj1" fmla="val -2147483647"/>
+              </a:avLst>
+            </a:prstGeom>
+            <a:ln w="19050">
+              <a:solidFill>
+                <a:schemeClr val="tx1"/>
+              </a:solidFill>
+              <a:tailEnd type="triangle"/>
+            </a:ln>
+          </p:spPr>
+          <p:style>
+            <a:lnRef idx="1">
+              <a:schemeClr val="accent1"/>
+            </a:lnRef>
+            <a:fillRef idx="0">
+              <a:schemeClr val="accent1"/>
+            </a:fillRef>
+            <a:effectRef idx="0">
+              <a:schemeClr val="accent1"/>
+            </a:effectRef>
+            <a:fontRef idx="minor">
+              <a:schemeClr val="tx1"/>
+            </a:fontRef>
+          </p:style>
+        </p:cxnSp>
+      </p:grpSp>
+      <p:grpSp>
+        <p:nvGrpSpPr>
+          <p:cNvPr id="76" name="组合 75"/>
+          <p:cNvGrpSpPr/>
+          <p:nvPr/>
+        </p:nvGrpSpPr>
+        <p:grpSpPr>
+          <a:xfrm rot="5400000">
+            <a:off x="3836804" y="5416411"/>
+            <a:ext cx="473043" cy="478733"/>
+            <a:chOff x="3171876" y="5473943"/>
+            <a:chExt cx="313829" cy="235477"/>
+          </a:xfrm>
+        </p:grpSpPr>
+        <p:sp>
+          <p:nvSpPr>
+            <p:cNvPr id="78" name="直角三角形 77"/>
+            <p:cNvSpPr/>
+            <p:nvPr/>
+          </p:nvSpPr>
+          <p:spPr>
+            <a:xfrm>
+              <a:off x="3349972" y="5473944"/>
+              <a:ext cx="135733" cy="208179"/>
+            </a:xfrm>
+            <a:prstGeom prst="rtTriangle">
+              <a:avLst/>
+            </a:prstGeom>
+            <a:solidFill>
+              <a:schemeClr val="accent1">
+                <a:lumMod val="60000"/>
+                <a:lumOff val="40000"/>
+              </a:schemeClr>
+            </a:solidFill>
+            <a:ln w="19050">
+              <a:solidFill>
+                <a:schemeClr val="tx1"/>
+              </a:solidFill>
+              <a:prstDash val="sysDash"/>
+            </a:ln>
+          </p:spPr>
+          <p:style>
+            <a:lnRef idx="2">
+              <a:schemeClr val="accent1">
+                <a:shade val="50000"/>
+              </a:schemeClr>
+            </a:lnRef>
+            <a:fillRef idx="1">
+              <a:schemeClr val="accent1"/>
+            </a:fillRef>
+            <a:effectRef idx="0">
+              <a:schemeClr val="accent1"/>
+            </a:effectRef>
+            <a:fontRef idx="minor">
+              <a:schemeClr val="lt1"/>
+            </a:fontRef>
+          </p:style>
+          <p:txBody>
+            <a:bodyPr rtlCol="0" anchor="ctr"/>
+            <a:lstStyle/>
+            <a:p>
+              <a:pPr algn="ctr"/>
+              <a:endParaRPr lang="zh-CN" altLang="en-US"/>
+            </a:p>
+          </p:txBody>
+        </p:sp>
+        <p:sp>
+          <p:nvSpPr>
+            <p:cNvPr id="79" name="直角三角形 78"/>
+            <p:cNvSpPr/>
+            <p:nvPr/>
+          </p:nvSpPr>
+          <p:spPr>
+            <a:xfrm flipH="1">
+              <a:off x="3171876" y="5473943"/>
+              <a:ext cx="135733" cy="208179"/>
+            </a:xfrm>
+            <a:prstGeom prst="rtTriangle">
+              <a:avLst/>
+            </a:prstGeom>
+            <a:solidFill>
+              <a:schemeClr val="accent6">
+                <a:lumMod val="75000"/>
+              </a:schemeClr>
+            </a:solidFill>
+            <a:ln w="12700">
+              <a:solidFill>
+                <a:schemeClr val="tx1"/>
+              </a:solidFill>
+            </a:ln>
+          </p:spPr>
+          <p:style>
+            <a:lnRef idx="2">
+              <a:schemeClr val="accent1">
+                <a:shade val="50000"/>
+              </a:schemeClr>
+            </a:lnRef>
+            <a:fillRef idx="1">
+              <a:schemeClr val="accent1"/>
+            </a:fillRef>
+            <a:effectRef idx="0">
+              <a:schemeClr val="accent1"/>
+            </a:effectRef>
+            <a:fontRef idx="minor">
+              <a:schemeClr val="lt1"/>
+            </a:fontRef>
+          </p:style>
+          <p:txBody>
+            <a:bodyPr rtlCol="0" anchor="ctr"/>
+            <a:lstStyle/>
+            <a:p>
+              <a:pPr algn="ctr"/>
+              <a:endParaRPr lang="zh-CN" altLang="en-US"/>
+            </a:p>
+          </p:txBody>
+        </p:sp>
+        <p:cxnSp>
+          <p:nvCxnSpPr>
+            <p:cNvPr id="81" name="曲线连接符 80"/>
+            <p:cNvCxnSpPr/>
+            <p:nvPr/>
+          </p:nvCxnSpPr>
+          <p:spPr>
+            <a:xfrm rot="5400000" flipH="1">
+              <a:off x="3321966" y="5620371"/>
+              <a:ext cx="1" cy="178097"/>
+            </a:xfrm>
+            <a:prstGeom prst="curvedConnector3">
+              <a:avLst>
+                <a:gd name="adj1" fmla="val -2147483647"/>
+              </a:avLst>
+            </a:prstGeom>
+            <a:ln w="19050">
+              <a:solidFill>
+                <a:schemeClr val="tx1"/>
+              </a:solidFill>
+              <a:tailEnd type="triangle"/>
+            </a:ln>
+          </p:spPr>
+          <p:style>
+            <a:lnRef idx="1">
+              <a:schemeClr val="accent1"/>
+            </a:lnRef>
+            <a:fillRef idx="0">
+              <a:schemeClr val="accent1"/>
+            </a:fillRef>
+            <a:effectRef idx="0">
+              <a:schemeClr val="accent1"/>
+            </a:effectRef>
+            <a:fontRef idx="minor">
+              <a:schemeClr val="tx1"/>
+            </a:fontRef>
+          </p:style>
+        </p:cxnSp>
       </p:grpSp>
     </p:spTree>
     <p:extLst>

</xml_diff>

<commit_message>
Make radial shape orientation settings dependent on individual group settings
</commit_message>
<xml_diff>
--- a/doc/Icons-PositionsLab.pptx
+++ b/doc/Icons-PositionsLab.pptx
@@ -219,7 +219,7 @@
           <a:p>
             <a:fld id="{6699ACB9-486C-4D62-A3A7-AF98E13EFDA3}" type="datetimeFigureOut">
               <a:rPr lang="en-US" smtClean="0"/>
-              <a:t>2016/07/12</a:t>
+              <a:t>2016/07/13</a:t>
             </a:fld>
             <a:endParaRPr lang="en-US"/>
           </a:p>
@@ -666,7 +666,7 @@
             <a:fld id="{1D8BD707-D9CF-40AE-B4C6-C98DA3205C09}" type="datetimeFigureOut">
               <a:rPr lang="en-US" smtClean="0"/>
               <a:pPr/>
-              <a:t>2016/07/12</a:t>
+              <a:t>2016/07/13</a:t>
             </a:fld>
             <a:endParaRPr lang="en-US"/>
           </a:p>
@@ -831,7 +831,7 @@
             <a:fld id="{1D8BD707-D9CF-40AE-B4C6-C98DA3205C09}" type="datetimeFigureOut">
               <a:rPr lang="en-US" smtClean="0"/>
               <a:pPr/>
-              <a:t>2016/07/12</a:t>
+              <a:t>2016/07/13</a:t>
             </a:fld>
             <a:endParaRPr lang="en-US"/>
           </a:p>
@@ -1006,7 +1006,7 @@
             <a:fld id="{1D8BD707-D9CF-40AE-B4C6-C98DA3205C09}" type="datetimeFigureOut">
               <a:rPr lang="en-US" smtClean="0"/>
               <a:pPr/>
-              <a:t>2016/07/12</a:t>
+              <a:t>2016/07/13</a:t>
             </a:fld>
             <a:endParaRPr lang="en-US"/>
           </a:p>
@@ -1171,7 +1171,7 @@
             <a:fld id="{1D8BD707-D9CF-40AE-B4C6-C98DA3205C09}" type="datetimeFigureOut">
               <a:rPr lang="en-US" smtClean="0"/>
               <a:pPr/>
-              <a:t>2016/07/12</a:t>
+              <a:t>2016/07/13</a:t>
             </a:fld>
             <a:endParaRPr lang="en-US"/>
           </a:p>
@@ -1413,7 +1413,7 @@
             <a:fld id="{1D8BD707-D9CF-40AE-B4C6-C98DA3205C09}" type="datetimeFigureOut">
               <a:rPr lang="en-US" smtClean="0"/>
               <a:pPr/>
-              <a:t>2016/07/12</a:t>
+              <a:t>2016/07/13</a:t>
             </a:fld>
             <a:endParaRPr lang="en-US"/>
           </a:p>
@@ -1695,7 +1695,7 @@
             <a:fld id="{1D8BD707-D9CF-40AE-B4C6-C98DA3205C09}" type="datetimeFigureOut">
               <a:rPr lang="en-US" smtClean="0"/>
               <a:pPr/>
-              <a:t>2016/07/12</a:t>
+              <a:t>2016/07/13</a:t>
             </a:fld>
             <a:endParaRPr lang="en-US"/>
           </a:p>
@@ -2111,7 +2111,7 @@
             <a:fld id="{1D8BD707-D9CF-40AE-B4C6-C98DA3205C09}" type="datetimeFigureOut">
               <a:rPr lang="en-US" smtClean="0"/>
               <a:pPr/>
-              <a:t>2016/07/12</a:t>
+              <a:t>2016/07/13</a:t>
             </a:fld>
             <a:endParaRPr lang="en-US"/>
           </a:p>
@@ -2225,7 +2225,7 @@
             <a:fld id="{1D8BD707-D9CF-40AE-B4C6-C98DA3205C09}" type="datetimeFigureOut">
               <a:rPr lang="en-US" smtClean="0"/>
               <a:pPr/>
-              <a:t>2016/07/12</a:t>
+              <a:t>2016/07/13</a:t>
             </a:fld>
             <a:endParaRPr lang="en-US"/>
           </a:p>
@@ -2317,7 +2317,7 @@
             <a:fld id="{1D8BD707-D9CF-40AE-B4C6-C98DA3205C09}" type="datetimeFigureOut">
               <a:rPr lang="en-US" smtClean="0"/>
               <a:pPr/>
-              <a:t>2016/07/12</a:t>
+              <a:t>2016/07/13</a:t>
             </a:fld>
             <a:endParaRPr lang="en-US"/>
           </a:p>
@@ -2589,7 +2589,7 @@
             <a:fld id="{1D8BD707-D9CF-40AE-B4C6-C98DA3205C09}" type="datetimeFigureOut">
               <a:rPr lang="en-US" smtClean="0"/>
               <a:pPr/>
-              <a:t>2016/07/12</a:t>
+              <a:t>2016/07/13</a:t>
             </a:fld>
             <a:endParaRPr lang="en-US"/>
           </a:p>
@@ -2838,7 +2838,7 @@
             <a:fld id="{1D8BD707-D9CF-40AE-B4C6-C98DA3205C09}" type="datetimeFigureOut">
               <a:rPr lang="en-US" smtClean="0"/>
               <a:pPr/>
-              <a:t>2016/07/12</a:t>
+              <a:t>2016/07/13</a:t>
             </a:fld>
             <a:endParaRPr lang="en-US"/>
           </a:p>
@@ -3049,7 +3049,7 @@
             <a:fld id="{1D8BD707-D9CF-40AE-B4C6-C98DA3205C09}" type="datetimeFigureOut">
               <a:rPr lang="en-US" smtClean="0"/>
               <a:pPr/>
-              <a:t>2016/07/12</a:t>
+              <a:t>2016/07/13</a:t>
             </a:fld>
             <a:endParaRPr lang="en-US"/>
           </a:p>
@@ -8941,7 +8941,7 @@
       </p:sp>
       <p:grpSp>
         <p:nvGrpSpPr>
-          <p:cNvPr id="6" name="Group 5"/>
+          <p:cNvPr id="10" name="Group 9"/>
           <p:cNvGrpSpPr/>
           <p:nvPr/>
         </p:nvGrpSpPr>
@@ -8961,8 +8961,8 @@
           </p:nvSpPr>
           <p:spPr>
             <a:xfrm rot="4575288">
-              <a:off x="3166336" y="3584657"/>
-              <a:ext cx="409575" cy="84933"/>
+              <a:off x="3166336" y="3571957"/>
+              <a:ext cx="409575" cy="110333"/>
             </a:xfrm>
             <a:prstGeom prst="rect">
               <a:avLst/>
@@ -9012,8 +9012,8 @@
           </p:nvSpPr>
           <p:spPr>
             <a:xfrm>
-              <a:off x="3166337" y="3587871"/>
-              <a:ext cx="409575" cy="84933"/>
+              <a:off x="3166337" y="3575171"/>
+              <a:ext cx="409575" cy="110333"/>
             </a:xfrm>
             <a:prstGeom prst="rect">
               <a:avLst/>
@@ -10123,28 +10123,28 @@
       </p:grpSp>
       <p:grpSp>
         <p:nvGrpSpPr>
-          <p:cNvPr id="7" name="Group 6"/>
+          <p:cNvPr id="12" name="Group 11"/>
           <p:cNvGrpSpPr/>
           <p:nvPr/>
         </p:nvGrpSpPr>
         <p:grpSpPr>
           <a:xfrm>
-            <a:off x="5482593" y="3411216"/>
+            <a:off x="5476379" y="3429580"/>
             <a:ext cx="409575" cy="409575"/>
-            <a:chOff x="5482593" y="3411216"/>
+            <a:chOff x="5476379" y="3429580"/>
             <a:chExt cx="409575" cy="409575"/>
           </a:xfrm>
         </p:grpSpPr>
         <p:sp>
           <p:nvSpPr>
-            <p:cNvPr id="51" name="Rectangle 50"/>
+            <p:cNvPr id="47" name="Rectangle 46"/>
             <p:cNvSpPr/>
             <p:nvPr/>
           </p:nvSpPr>
           <p:spPr>
             <a:xfrm rot="20775288">
-              <a:off x="5482593" y="3573538"/>
-              <a:ext cx="409575" cy="84933"/>
+              <a:off x="5476379" y="3579202"/>
+              <a:ext cx="409575" cy="110333"/>
             </a:xfrm>
             <a:prstGeom prst="rect">
               <a:avLst/>
@@ -10188,14 +10188,14 @@
         </p:sp>
         <p:sp>
           <p:nvSpPr>
-            <p:cNvPr id="52" name="Rectangle 51"/>
+            <p:cNvPr id="48" name="Rectangle 47"/>
             <p:cNvSpPr/>
             <p:nvPr/>
           </p:nvSpPr>
           <p:spPr>
             <a:xfrm rot="16200000">
-              <a:off x="5485807" y="3573537"/>
-              <a:ext cx="409575" cy="84933"/>
+              <a:off x="5479593" y="3579201"/>
+              <a:ext cx="409575" cy="110333"/>
             </a:xfrm>
             <a:prstGeom prst="rect">
               <a:avLst/>

</xml_diff>